<commit_message>
Added Poetreat to "Made With Kraken" section
</commit_message>
<xml_diff>
--- a/made-with-kraken.pptx
+++ b/made-with-kraken.pptx
@@ -10,6 +10,7 @@
     <p:sldId id="256" r:id="rId4"/>
     <p:sldId id="258" r:id="rId5"/>
     <p:sldId id="260" r:id="rId6"/>
+    <p:sldId id="261" r:id="rId7"/>
   </p:sldIdLst>
   <p:sldSz cx="1938338" cy="1087438"/>
   <p:notesSz cx="6858000" cy="9144000"/>
@@ -292,7 +293,7 @@
           <a:p>
             <a:fld id="{34C6AA67-E7EC-BD42-94FC-5443D25F9C23}" type="datetimeFigureOut">
               <a:rPr lang="en-US" smtClean="0"/>
-              <a:t>3/7/13</a:t>
+              <a:t>5/18/13</a:t>
             </a:fld>
             <a:endParaRPr lang="en-US"/>
           </a:p>
@@ -462,7 +463,7 @@
           <a:p>
             <a:fld id="{34C6AA67-E7EC-BD42-94FC-5443D25F9C23}" type="datetimeFigureOut">
               <a:rPr lang="en-US" smtClean="0"/>
-              <a:t>3/7/13</a:t>
+              <a:t>5/18/13</a:t>
             </a:fld>
             <a:endParaRPr lang="en-US"/>
           </a:p>
@@ -642,7 +643,7 @@
           <a:p>
             <a:fld id="{34C6AA67-E7EC-BD42-94FC-5443D25F9C23}" type="datetimeFigureOut">
               <a:rPr lang="en-US" smtClean="0"/>
-              <a:t>3/7/13</a:t>
+              <a:t>5/18/13</a:t>
             </a:fld>
             <a:endParaRPr lang="en-US"/>
           </a:p>
@@ -1238,7 +1239,7 @@
                 <a:latin typeface="Calibri"/>
               </a:rPr>
               <a:pPr/>
-              <a:t>3/7/13</a:t>
+              <a:t>5/18/13</a:t>
             </a:fld>
             <a:endParaRPr lang="en-US">
               <a:solidFill>
@@ -1445,7 +1446,7 @@
                 <a:latin typeface="Calibri"/>
               </a:rPr>
               <a:pPr/>
-              <a:t>3/7/13</a:t>
+              <a:t>5/18/13</a:t>
             </a:fld>
             <a:endParaRPr lang="en-US">
               <a:solidFill>
@@ -1728,7 +1729,7 @@
                 <a:latin typeface="Calibri"/>
               </a:rPr>
               <a:pPr/>
-              <a:t>3/7/13</a:t>
+              <a:t>5/18/13</a:t>
             </a:fld>
             <a:endParaRPr lang="en-US">
               <a:solidFill>
@@ -2053,7 +2054,7 @@
                 <a:latin typeface="Calibri"/>
               </a:rPr>
               <a:pPr/>
-              <a:t>3/7/13</a:t>
+              <a:t>5/18/13</a:t>
             </a:fld>
             <a:endParaRPr lang="en-US">
               <a:solidFill>
@@ -2517,7 +2518,7 @@
                 <a:latin typeface="Calibri"/>
               </a:rPr>
               <a:pPr/>
-              <a:t>3/7/13</a:t>
+              <a:t>5/18/13</a:t>
             </a:fld>
             <a:endParaRPr lang="en-US">
               <a:solidFill>
@@ -2672,7 +2673,7 @@
                 <a:latin typeface="Calibri"/>
               </a:rPr>
               <a:pPr/>
-              <a:t>3/7/13</a:t>
+              <a:t>5/18/13</a:t>
             </a:fld>
             <a:endParaRPr lang="en-US">
               <a:solidFill>
@@ -2804,7 +2805,7 @@
                 <a:latin typeface="Calibri"/>
               </a:rPr>
               <a:pPr/>
-              <a:t>3/7/13</a:t>
+              <a:t>5/18/13</a:t>
             </a:fld>
             <a:endParaRPr lang="en-US">
               <a:solidFill>
@@ -3003,7 +3004,7 @@
           <a:p>
             <a:fld id="{34C6AA67-E7EC-BD42-94FC-5443D25F9C23}" type="datetimeFigureOut">
               <a:rPr lang="en-US" smtClean="0"/>
-              <a:t>3/7/13</a:t>
+              <a:t>5/18/13</a:t>
             </a:fld>
             <a:endParaRPr lang="en-US"/>
           </a:p>
@@ -3288,7 +3289,7 @@
                 <a:latin typeface="Calibri"/>
               </a:rPr>
               <a:pPr/>
-              <a:t>3/7/13</a:t>
+              <a:t>5/18/13</a:t>
             </a:fld>
             <a:endParaRPr lang="en-US">
               <a:solidFill>
@@ -3578,7 +3579,7 @@
                 <a:latin typeface="Calibri"/>
               </a:rPr>
               <a:pPr/>
-              <a:t>3/7/13</a:t>
+              <a:t>5/18/13</a:t>
             </a:fld>
             <a:endParaRPr lang="en-US">
               <a:solidFill>
@@ -3785,7 +3786,7 @@
                 <a:latin typeface="Calibri"/>
               </a:rPr>
               <a:pPr/>
-              <a:t>3/7/13</a:t>
+              <a:t>5/18/13</a:t>
             </a:fld>
             <a:endParaRPr lang="en-US">
               <a:solidFill>
@@ -4002,7 +4003,7 @@
                 <a:latin typeface="Calibri"/>
               </a:rPr>
               <a:pPr/>
-              <a:t>3/7/13</a:t>
+              <a:t>5/18/13</a:t>
             </a:fld>
             <a:endParaRPr lang="en-US">
               <a:solidFill>
@@ -4281,7 +4282,7 @@
                 <a:latin typeface="Calibri"/>
               </a:rPr>
               <a:pPr/>
-              <a:t>3/7/13</a:t>
+              <a:t>5/18/13</a:t>
             </a:fld>
             <a:endParaRPr lang="en-US">
               <a:solidFill>
@@ -4488,7 +4489,7 @@
                 <a:latin typeface="Calibri"/>
               </a:rPr>
               <a:pPr/>
-              <a:t>3/7/13</a:t>
+              <a:t>5/18/13</a:t>
             </a:fld>
             <a:endParaRPr lang="en-US">
               <a:solidFill>
@@ -4771,7 +4772,7 @@
                 <a:latin typeface="Calibri"/>
               </a:rPr>
               <a:pPr/>
-              <a:t>3/7/13</a:t>
+              <a:t>5/18/13</a:t>
             </a:fld>
             <a:endParaRPr lang="en-US">
               <a:solidFill>
@@ -5096,7 +5097,7 @@
                 <a:latin typeface="Calibri"/>
               </a:rPr>
               <a:pPr/>
-              <a:t>3/7/13</a:t>
+              <a:t>5/18/13</a:t>
             </a:fld>
             <a:endParaRPr lang="en-US">
               <a:solidFill>
@@ -5555,7 +5556,7 @@
                 <a:latin typeface="Calibri"/>
               </a:rPr>
               <a:pPr/>
-              <a:t>3/7/13</a:t>
+              <a:t>5/18/13</a:t>
             </a:fld>
             <a:endParaRPr lang="en-US">
               <a:solidFill>
@@ -5710,7 +5711,7 @@
                 <a:latin typeface="Calibri"/>
               </a:rPr>
               <a:pPr/>
-              <a:t>3/7/13</a:t>
+              <a:t>5/18/13</a:t>
             </a:fld>
             <a:endParaRPr lang="en-US">
               <a:solidFill>
@@ -5995,7 +5996,7 @@
           <a:p>
             <a:fld id="{34C6AA67-E7EC-BD42-94FC-5443D25F9C23}" type="datetimeFigureOut">
               <a:rPr lang="en-US" smtClean="0"/>
-              <a:t>3/7/13</a:t>
+              <a:t>5/18/13</a:t>
             </a:fld>
             <a:endParaRPr lang="en-US"/>
           </a:p>
@@ -6098,7 +6099,7 @@
                 <a:latin typeface="Calibri"/>
               </a:rPr>
               <a:pPr/>
-              <a:t>3/7/13</a:t>
+              <a:t>5/18/13</a:t>
             </a:fld>
             <a:endParaRPr lang="en-US">
               <a:solidFill>
@@ -6412,7 +6413,7 @@
                 <a:latin typeface="Calibri"/>
               </a:rPr>
               <a:pPr/>
-              <a:t>3/7/13</a:t>
+              <a:t>5/18/13</a:t>
             </a:fld>
             <a:endParaRPr lang="en-US">
               <a:solidFill>
@@ -6702,7 +6703,7 @@
                 <a:latin typeface="Calibri"/>
               </a:rPr>
               <a:pPr/>
-              <a:t>3/7/13</a:t>
+              <a:t>5/18/13</a:t>
             </a:fld>
             <a:endParaRPr lang="en-US">
               <a:solidFill>
@@ -6909,7 +6910,7 @@
                 <a:latin typeface="Calibri"/>
               </a:rPr>
               <a:pPr/>
-              <a:t>3/7/13</a:t>
+              <a:t>5/18/13</a:t>
             </a:fld>
             <a:endParaRPr lang="en-US">
               <a:solidFill>
@@ -7126,7 +7127,7 @@
                 <a:latin typeface="Calibri"/>
               </a:rPr>
               <a:pPr/>
-              <a:t>3/7/13</a:t>
+              <a:t>5/18/13</a:t>
             </a:fld>
             <a:endParaRPr lang="en-US">
               <a:solidFill>
@@ -7794,7 +7795,7 @@
           <a:p>
             <a:fld id="{34C6AA67-E7EC-BD42-94FC-5443D25F9C23}" type="datetimeFigureOut">
               <a:rPr lang="en-US" smtClean="0"/>
-              <a:t>3/7/13</a:t>
+              <a:t>5/18/13</a:t>
             </a:fld>
             <a:endParaRPr lang="en-US"/>
           </a:p>
@@ -8216,7 +8217,7 @@
           <a:p>
             <a:fld id="{34C6AA67-E7EC-BD42-94FC-5443D25F9C23}" type="datetimeFigureOut">
               <a:rPr lang="en-US" smtClean="0"/>
-              <a:t>3/7/13</a:t>
+              <a:t>5/18/13</a:t>
             </a:fld>
             <a:endParaRPr lang="en-US"/>
           </a:p>
@@ -8334,7 +8335,7 @@
           <a:p>
             <a:fld id="{34C6AA67-E7EC-BD42-94FC-5443D25F9C23}" type="datetimeFigureOut">
               <a:rPr lang="en-US" smtClean="0"/>
-              <a:t>3/7/13</a:t>
+              <a:t>5/18/13</a:t>
             </a:fld>
             <a:endParaRPr lang="en-US"/>
           </a:p>
@@ -8439,7 +8440,7 @@
           <a:p>
             <a:fld id="{34C6AA67-E7EC-BD42-94FC-5443D25F9C23}" type="datetimeFigureOut">
               <a:rPr lang="en-US" smtClean="0"/>
-              <a:t>3/7/13</a:t>
+              <a:t>5/18/13</a:t>
             </a:fld>
             <a:endParaRPr lang="en-US"/>
           </a:p>
@@ -8716,7 +8717,7 @@
           <a:p>
             <a:fld id="{34C6AA67-E7EC-BD42-94FC-5443D25F9C23}" type="datetimeFigureOut">
               <a:rPr lang="en-US" smtClean="0"/>
-              <a:t>3/7/13</a:t>
+              <a:t>5/18/13</a:t>
             </a:fld>
             <a:endParaRPr lang="en-US"/>
           </a:p>
@@ -8969,7 +8970,7 @@
           <a:p>
             <a:fld id="{34C6AA67-E7EC-BD42-94FC-5443D25F9C23}" type="datetimeFigureOut">
               <a:rPr lang="en-US" smtClean="0"/>
-              <a:t>3/7/13</a:t>
+              <a:t>5/18/13</a:t>
             </a:fld>
             <a:endParaRPr lang="en-US"/>
           </a:p>
@@ -9182,7 +9183,7 @@
           <a:p>
             <a:fld id="{34C6AA67-E7EC-BD42-94FC-5443D25F9C23}" type="datetimeFigureOut">
               <a:rPr lang="en-US" smtClean="0"/>
-              <a:t>3/7/13</a:t>
+              <a:t>5/18/13</a:t>
             </a:fld>
             <a:endParaRPr lang="en-US"/>
           </a:p>
@@ -9715,7 +9716,7 @@
                 <a:latin typeface="Calibri"/>
               </a:rPr>
               <a:pPr defTabSz="86263"/>
-              <a:t>3/7/13</a:t>
+              <a:t>5/18/13</a:t>
             </a:fld>
             <a:endParaRPr lang="en-US">
               <a:solidFill>
@@ -10264,7 +10265,7 @@
                 <a:latin typeface="Calibri"/>
               </a:rPr>
               <a:pPr/>
-              <a:t>3/7/13</a:t>
+              <a:t>5/18/13</a:t>
             </a:fld>
             <a:endParaRPr lang="en-US">
               <a:solidFill>
@@ -10940,13 +10941,6 @@
                 </a:rPr>
                 <a:t>PAWS New England</a:t>
               </a:r>
-              <a:endParaRPr lang="en-US" sz="1300" dirty="0">
-                <a:solidFill>
-                  <a:schemeClr val="bg1"/>
-                </a:solidFill>
-                <a:latin typeface="Museo Slab 500"/>
-                <a:cs typeface="Museo Slab 500"/>
-              </a:endParaRPr>
             </a:p>
           </p:txBody>
         </p:sp>
@@ -11084,6 +11078,209 @@
   <p:transition xmlns:p14="http://schemas.microsoft.com/office/powerpoint/2010/main">
     <p:fade/>
   </p:transition>
+  <p:timing>
+    <p:tnLst>
+      <p:par>
+        <p:cTn xmlns:p14="http://schemas.microsoft.com/office/powerpoint/2010/main" id="1" dur="indefinite" restart="never" nodeType="tmRoot"/>
+      </p:par>
+    </p:tnLst>
+  </p:timing>
+</p:sld>
+</file>
+
+<file path=ppt/slides/slide4.xml><?xml version="1.0" encoding="utf-8"?>
+<p:sld xmlns:a="http://schemas.openxmlformats.org/drawingml/2006/main" xmlns:r="http://schemas.openxmlformats.org/officeDocument/2006/relationships" xmlns:p="http://schemas.openxmlformats.org/presentationml/2006/main">
+  <p:cSld>
+    <p:bg>
+      <p:bgPr>
+        <a:solidFill>
+          <a:srgbClr val="033746"/>
+        </a:solidFill>
+        <a:effectLst/>
+      </p:bgPr>
+    </p:bg>
+    <p:spTree>
+      <p:nvGrpSpPr>
+        <p:cNvPr id="1" name=""/>
+        <p:cNvGrpSpPr/>
+        <p:nvPr/>
+      </p:nvGrpSpPr>
+      <p:grpSpPr>
+        <a:xfrm>
+          <a:off x="0" y="0"/>
+          <a:ext cx="0" cy="0"/>
+          <a:chOff x="0" y="0"/>
+          <a:chExt cx="0" cy="0"/>
+        </a:xfrm>
+      </p:grpSpPr>
+      <p:grpSp>
+        <p:nvGrpSpPr>
+          <p:cNvPr id="10" name="Group 9"/>
+          <p:cNvGrpSpPr/>
+          <p:nvPr/>
+        </p:nvGrpSpPr>
+        <p:grpSpPr>
+          <a:xfrm>
+            <a:off x="155575" y="275173"/>
+            <a:ext cx="1701800" cy="546100"/>
+            <a:chOff x="152400" y="259298"/>
+            <a:chExt cx="1701800" cy="546100"/>
+          </a:xfrm>
+        </p:grpSpPr>
+        <p:sp>
+          <p:nvSpPr>
+            <p:cNvPr id="8" name="Rounded Rectangle 7"/>
+            <p:cNvSpPr/>
+            <p:nvPr/>
+          </p:nvSpPr>
+          <p:spPr>
+            <a:xfrm>
+              <a:off x="152400" y="259298"/>
+              <a:ext cx="546100" cy="546100"/>
+            </a:xfrm>
+            <a:prstGeom prst="roundRect">
+              <a:avLst/>
+            </a:prstGeom>
+            <a:gradFill flip="none" rotWithShape="1">
+              <a:gsLst>
+                <a:gs pos="0">
+                  <a:schemeClr val="bg1"/>
+                </a:gs>
+                <a:gs pos="100000">
+                  <a:schemeClr val="bg1">
+                    <a:lumMod val="85000"/>
+                  </a:schemeClr>
+                </a:gs>
+              </a:gsLst>
+              <a:lin ang="5400000" scaled="0"/>
+              <a:tileRect/>
+            </a:gradFill>
+            <a:ln>
+              <a:noFill/>
+            </a:ln>
+            <a:effectLst>
+              <a:outerShdw blurRad="40000" dist="6350" dir="5400000" rotWithShape="0">
+                <a:srgbClr val="000000">
+                  <a:alpha val="35000"/>
+                </a:srgbClr>
+              </a:outerShdw>
+            </a:effectLst>
+          </p:spPr>
+          <p:style>
+            <a:lnRef idx="1">
+              <a:schemeClr val="accent1"/>
+            </a:lnRef>
+            <a:fillRef idx="3">
+              <a:schemeClr val="accent1"/>
+            </a:fillRef>
+            <a:effectRef idx="2">
+              <a:schemeClr val="accent1"/>
+            </a:effectRef>
+            <a:fontRef idx="minor">
+              <a:schemeClr val="lt1"/>
+            </a:fontRef>
+          </p:style>
+          <p:txBody>
+            <a:bodyPr rtlCol="0" anchor="ctr"/>
+            <a:lstStyle/>
+            <a:p>
+              <a:pPr algn="ctr"/>
+              <a:endParaRPr lang="en-US"/>
+            </a:p>
+          </p:txBody>
+        </p:sp>
+        <p:sp>
+          <p:nvSpPr>
+            <p:cNvPr id="5" name="TextBox 4"/>
+            <p:cNvSpPr txBox="1"/>
+            <p:nvPr/>
+          </p:nvSpPr>
+          <p:spPr>
+            <a:xfrm>
+              <a:off x="701674" y="315932"/>
+              <a:ext cx="1152526" cy="400110"/>
+            </a:xfrm>
+            <a:prstGeom prst="rect">
+              <a:avLst/>
+            </a:prstGeom>
+            <a:noFill/>
+          </p:spPr>
+          <p:txBody>
+            <a:bodyPr wrap="square" rtlCol="0">
+              <a:spAutoFit/>
+            </a:bodyPr>
+            <a:lstStyle/>
+            <a:p>
+              <a:r>
+                <a:rPr lang="en-US" sz="2000" dirty="0" err="1" smtClean="0">
+                  <a:solidFill>
+                    <a:prstClr val="white"/>
+                  </a:solidFill>
+                  <a:latin typeface="Helvetica Neue"/>
+                  <a:cs typeface="Helvetica Neue"/>
+                </a:rPr>
+                <a:t>Poetreat</a:t>
+              </a:r>
+              <a:endParaRPr lang="en-US" sz="2000" dirty="0">
+                <a:solidFill>
+                  <a:prstClr val="white"/>
+                </a:solidFill>
+                <a:latin typeface="Helvetica Neue"/>
+                <a:cs typeface="Helvetica Neue"/>
+              </a:endParaRPr>
+            </a:p>
+          </p:txBody>
+        </p:sp>
+        <p:pic>
+          <p:nvPicPr>
+            <p:cNvPr id="2" name="Picture 1" descr="icon-large.png"/>
+            <p:cNvPicPr>
+              <a:picLocks noChangeAspect="1"/>
+            </p:cNvPicPr>
+            <p:nvPr/>
+          </p:nvPicPr>
+          <p:blipFill rotWithShape="1">
+            <a:blip r:embed="rId2">
+              <a:extLst>
+                <a:ext uri="{BEBA8EAE-BF5A-486C-A8C5-ECC9F3942E4B}">
+                  <a14:imgProps xmlns:a14="http://schemas.microsoft.com/office/drawing/2010/main">
+                    <a14:imgLayer r:embed="rId3">
+                      <a14:imgEffect>
+                        <a14:backgroundRemoval t="10000" b="90000" l="10000" r="90000"/>
+                      </a14:imgEffect>
+                    </a14:imgLayer>
+                  </a14:imgProps>
+                </a:ext>
+                <a:ext uri="{28A0092B-C50C-407E-A947-70E740481C1C}">
+                  <a14:useLocalDpi xmlns:a14="http://schemas.microsoft.com/office/drawing/2010/main" val="0"/>
+                </a:ext>
+              </a:extLst>
+            </a:blip>
+            <a:srcRect l="13953" t="4844" r="15698" b="5621"/>
+            <a:stretch/>
+          </p:blipFill>
+          <p:spPr>
+            <a:xfrm>
+              <a:off x="228600" y="285750"/>
+              <a:ext cx="384175" cy="488950"/>
+            </a:xfrm>
+            <a:prstGeom prst="rect">
+              <a:avLst/>
+            </a:prstGeom>
+            <a:noFill/>
+          </p:spPr>
+        </p:pic>
+      </p:grpSp>
+    </p:spTree>
+    <p:extLst>
+      <p:ext uri="{BB962C8B-B14F-4D97-AF65-F5344CB8AC3E}">
+        <p14:creationId xmlns:p14="http://schemas.microsoft.com/office/powerpoint/2010/main" val="1552141325"/>
+      </p:ext>
+    </p:extLst>
+  </p:cSld>
+  <p:clrMapOvr>
+    <a:masterClrMapping/>
+  </p:clrMapOvr>
   <p:timing>
     <p:tnLst>
       <p:par>

</xml_diff>

<commit_message>
Added TonyLuong.com to "Made with Kraken" section
</commit_message>
<xml_diff>
--- a/made-with-kraken.pptx
+++ b/made-with-kraken.pptx
@@ -5,12 +5,14 @@
     <p:sldMasterId id="2147483687" r:id="rId1"/>
     <p:sldMasterId id="2147483700" r:id="rId2"/>
     <p:sldMasterId id="2147483712" r:id="rId3"/>
+    <p:sldMasterId id="2147483725" r:id="rId4"/>
   </p:sldMasterIdLst>
   <p:sldIdLst>
-    <p:sldId id="256" r:id="rId4"/>
-    <p:sldId id="258" r:id="rId5"/>
-    <p:sldId id="260" r:id="rId6"/>
-    <p:sldId id="261" r:id="rId7"/>
+    <p:sldId id="256" r:id="rId5"/>
+    <p:sldId id="258" r:id="rId6"/>
+    <p:sldId id="260" r:id="rId7"/>
+    <p:sldId id="261" r:id="rId8"/>
+    <p:sldId id="262" r:id="rId9"/>
   </p:sldIdLst>
   <p:sldSz cx="1938338" cy="1087438"/>
   <p:notesSz cx="6858000" cy="9144000"/>
@@ -293,7 +295,7 @@
           <a:p>
             <a:fld id="{34C6AA67-E7EC-BD42-94FC-5443D25F9C23}" type="datetimeFigureOut">
               <a:rPr lang="en-US" smtClean="0"/>
-              <a:t>5/18/13</a:t>
+              <a:t>8/5/13</a:t>
             </a:fld>
             <a:endParaRPr lang="en-US"/>
           </a:p>
@@ -463,7 +465,7 @@
           <a:p>
             <a:fld id="{34C6AA67-E7EC-BD42-94FC-5443D25F9C23}" type="datetimeFigureOut">
               <a:rPr lang="en-US" smtClean="0"/>
-              <a:t>5/18/13</a:t>
+              <a:t>8/5/13</a:t>
             </a:fld>
             <a:endParaRPr lang="en-US"/>
           </a:p>
@@ -643,7 +645,7 @@
           <a:p>
             <a:fld id="{34C6AA67-E7EC-BD42-94FC-5443D25F9C23}" type="datetimeFigureOut">
               <a:rPr lang="en-US" smtClean="0"/>
-              <a:t>5/18/13</a:t>
+              <a:t>8/5/13</a:t>
             </a:fld>
             <a:endParaRPr lang="en-US"/>
           </a:p>
@@ -1239,7 +1241,7 @@
                 <a:latin typeface="Calibri"/>
               </a:rPr>
               <a:pPr/>
-              <a:t>5/18/13</a:t>
+              <a:t>8/5/13</a:t>
             </a:fld>
             <a:endParaRPr lang="en-US">
               <a:solidFill>
@@ -1446,7 +1448,7 @@
                 <a:latin typeface="Calibri"/>
               </a:rPr>
               <a:pPr/>
-              <a:t>5/18/13</a:t>
+              <a:t>8/5/13</a:t>
             </a:fld>
             <a:endParaRPr lang="en-US">
               <a:solidFill>
@@ -1729,7 +1731,7 @@
                 <a:latin typeface="Calibri"/>
               </a:rPr>
               <a:pPr/>
-              <a:t>5/18/13</a:t>
+              <a:t>8/5/13</a:t>
             </a:fld>
             <a:endParaRPr lang="en-US">
               <a:solidFill>
@@ -2054,7 +2056,7 @@
                 <a:latin typeface="Calibri"/>
               </a:rPr>
               <a:pPr/>
-              <a:t>5/18/13</a:t>
+              <a:t>8/5/13</a:t>
             </a:fld>
             <a:endParaRPr lang="en-US">
               <a:solidFill>
@@ -2518,7 +2520,7 @@
                 <a:latin typeface="Calibri"/>
               </a:rPr>
               <a:pPr/>
-              <a:t>5/18/13</a:t>
+              <a:t>8/5/13</a:t>
             </a:fld>
             <a:endParaRPr lang="en-US">
               <a:solidFill>
@@ -2673,7 +2675,7 @@
                 <a:latin typeface="Calibri"/>
               </a:rPr>
               <a:pPr/>
-              <a:t>5/18/13</a:t>
+              <a:t>8/5/13</a:t>
             </a:fld>
             <a:endParaRPr lang="en-US">
               <a:solidFill>
@@ -2805,7 +2807,7 @@
                 <a:latin typeface="Calibri"/>
               </a:rPr>
               <a:pPr/>
-              <a:t>5/18/13</a:t>
+              <a:t>8/5/13</a:t>
             </a:fld>
             <a:endParaRPr lang="en-US">
               <a:solidFill>
@@ -3004,7 +3006,7 @@
           <a:p>
             <a:fld id="{34C6AA67-E7EC-BD42-94FC-5443D25F9C23}" type="datetimeFigureOut">
               <a:rPr lang="en-US" smtClean="0"/>
-              <a:t>5/18/13</a:t>
+              <a:t>8/5/13</a:t>
             </a:fld>
             <a:endParaRPr lang="en-US"/>
           </a:p>
@@ -3289,7 +3291,7 @@
                 <a:latin typeface="Calibri"/>
               </a:rPr>
               <a:pPr/>
-              <a:t>5/18/13</a:t>
+              <a:t>8/5/13</a:t>
             </a:fld>
             <a:endParaRPr lang="en-US">
               <a:solidFill>
@@ -3579,7 +3581,7 @@
                 <a:latin typeface="Calibri"/>
               </a:rPr>
               <a:pPr/>
-              <a:t>5/18/13</a:t>
+              <a:t>8/5/13</a:t>
             </a:fld>
             <a:endParaRPr lang="en-US">
               <a:solidFill>
@@ -3786,7 +3788,7 @@
                 <a:latin typeface="Calibri"/>
               </a:rPr>
               <a:pPr/>
-              <a:t>5/18/13</a:t>
+              <a:t>8/5/13</a:t>
             </a:fld>
             <a:endParaRPr lang="en-US">
               <a:solidFill>
@@ -4003,7 +4005,7 @@
                 <a:latin typeface="Calibri"/>
               </a:rPr>
               <a:pPr/>
-              <a:t>5/18/13</a:t>
+              <a:t>8/5/13</a:t>
             </a:fld>
             <a:endParaRPr lang="en-US">
               <a:solidFill>
@@ -4282,7 +4284,7 @@
                 <a:latin typeface="Calibri"/>
               </a:rPr>
               <a:pPr/>
-              <a:t>5/18/13</a:t>
+              <a:t>8/5/13</a:t>
             </a:fld>
             <a:endParaRPr lang="en-US">
               <a:solidFill>
@@ -4489,7 +4491,7 @@
                 <a:latin typeface="Calibri"/>
               </a:rPr>
               <a:pPr/>
-              <a:t>5/18/13</a:t>
+              <a:t>8/5/13</a:t>
             </a:fld>
             <a:endParaRPr lang="en-US">
               <a:solidFill>
@@ -4772,7 +4774,7 @@
                 <a:latin typeface="Calibri"/>
               </a:rPr>
               <a:pPr/>
-              <a:t>5/18/13</a:t>
+              <a:t>8/5/13</a:t>
             </a:fld>
             <a:endParaRPr lang="en-US">
               <a:solidFill>
@@ -5097,7 +5099,7 @@
                 <a:latin typeface="Calibri"/>
               </a:rPr>
               <a:pPr/>
-              <a:t>5/18/13</a:t>
+              <a:t>8/5/13</a:t>
             </a:fld>
             <a:endParaRPr lang="en-US">
               <a:solidFill>
@@ -5556,7 +5558,7 @@
                 <a:latin typeface="Calibri"/>
               </a:rPr>
               <a:pPr/>
-              <a:t>5/18/13</a:t>
+              <a:t>8/5/13</a:t>
             </a:fld>
             <a:endParaRPr lang="en-US">
               <a:solidFill>
@@ -5711,7 +5713,7 @@
                 <a:latin typeface="Calibri"/>
               </a:rPr>
               <a:pPr/>
-              <a:t>5/18/13</a:t>
+              <a:t>8/5/13</a:t>
             </a:fld>
             <a:endParaRPr lang="en-US">
               <a:solidFill>
@@ -5996,7 +5998,7 @@
           <a:p>
             <a:fld id="{34C6AA67-E7EC-BD42-94FC-5443D25F9C23}" type="datetimeFigureOut">
               <a:rPr lang="en-US" smtClean="0"/>
-              <a:t>5/18/13</a:t>
+              <a:t>8/5/13</a:t>
             </a:fld>
             <a:endParaRPr lang="en-US"/>
           </a:p>
@@ -6099,7 +6101,7 @@
                 <a:latin typeface="Calibri"/>
               </a:rPr>
               <a:pPr/>
-              <a:t>5/18/13</a:t>
+              <a:t>8/5/13</a:t>
             </a:fld>
             <a:endParaRPr lang="en-US">
               <a:solidFill>
@@ -6413,7 +6415,7 @@
                 <a:latin typeface="Calibri"/>
               </a:rPr>
               <a:pPr/>
-              <a:t>5/18/13</a:t>
+              <a:t>8/5/13</a:t>
             </a:fld>
             <a:endParaRPr lang="en-US">
               <a:solidFill>
@@ -6703,7 +6705,7 @@
                 <a:latin typeface="Calibri"/>
               </a:rPr>
               <a:pPr/>
-              <a:t>5/18/13</a:t>
+              <a:t>8/5/13</a:t>
             </a:fld>
             <a:endParaRPr lang="en-US">
               <a:solidFill>
@@ -6910,7 +6912,7 @@
                 <a:latin typeface="Calibri"/>
               </a:rPr>
               <a:pPr/>
-              <a:t>5/18/13</a:t>
+              <a:t>8/5/13</a:t>
             </a:fld>
             <a:endParaRPr lang="en-US">
               <a:solidFill>
@@ -7127,7 +7129,7 @@
                 <a:latin typeface="Calibri"/>
               </a:rPr>
               <a:pPr/>
-              <a:t>5/18/13</a:t>
+              <a:t>8/5/13</a:t>
             </a:fld>
             <a:endParaRPr lang="en-US">
               <a:solidFill>
@@ -7568,7 +7570,776 @@
 </p:sldLayout>
 </file>
 
-<file path=ppt/slideLayouts/slideLayout4.xml><?xml version="1.0" encoding="utf-8"?>
+<file path=ppt/slideLayouts/slideLayout36.xml><?xml version="1.0" encoding="utf-8"?>
+<p:sldLayout xmlns:a="http://schemas.openxmlformats.org/drawingml/2006/main" xmlns:r="http://schemas.openxmlformats.org/officeDocument/2006/relationships" xmlns:p="http://schemas.openxmlformats.org/presentationml/2006/main" type="title" preserve="1">
+  <p:cSld name="Title Slide">
+    <p:spTree>
+      <p:nvGrpSpPr>
+        <p:cNvPr id="1" name=""/>
+        <p:cNvGrpSpPr/>
+        <p:nvPr/>
+      </p:nvGrpSpPr>
+      <p:grpSpPr>
+        <a:xfrm>
+          <a:off x="0" y="0"/>
+          <a:ext cx="0" cy="0"/>
+          <a:chOff x="0" y="0"/>
+          <a:chExt cx="0" cy="0"/>
+        </a:xfrm>
+      </p:grpSpPr>
+      <p:sp>
+        <p:nvSpPr>
+          <p:cNvPr id="2" name="Title 1"/>
+          <p:cNvSpPr>
+            <a:spLocks noGrp="1"/>
+          </p:cNvSpPr>
+          <p:nvPr>
+            <p:ph type="ctrTitle"/>
+          </p:nvPr>
+        </p:nvSpPr>
+        <p:spPr>
+          <a:xfrm>
+            <a:off x="145380" y="337810"/>
+            <a:ext cx="1647587" cy="233095"/>
+          </a:xfrm>
+        </p:spPr>
+        <p:txBody>
+          <a:bodyPr/>
+          <a:lstStyle/>
+          <a:p>
+            <a:r>
+              <a:rPr lang="en-US" smtClean="0"/>
+              <a:t>Click to edit Master title style</a:t>
+            </a:r>
+            <a:endParaRPr lang="en-US"/>
+          </a:p>
+        </p:txBody>
+      </p:sp>
+      <p:sp>
+        <p:nvSpPr>
+          <p:cNvPr id="3" name="Subtitle 2"/>
+          <p:cNvSpPr>
+            <a:spLocks noGrp="1"/>
+          </p:cNvSpPr>
+          <p:nvPr>
+            <p:ph type="subTitle" idx="1"/>
+          </p:nvPr>
+        </p:nvSpPr>
+        <p:spPr>
+          <a:xfrm>
+            <a:off x="290752" y="616219"/>
+            <a:ext cx="1356837" cy="277901"/>
+          </a:xfrm>
+        </p:spPr>
+        <p:txBody>
+          <a:bodyPr/>
+          <a:lstStyle>
+            <a:lvl1pPr marL="0" indent="0" algn="ctr">
+              <a:buNone/>
+              <a:defRPr>
+                <a:solidFill>
+                  <a:schemeClr val="tx1">
+                    <a:tint val="75000"/>
+                  </a:schemeClr>
+                </a:solidFill>
+              </a:defRPr>
+            </a:lvl1pPr>
+            <a:lvl2pPr marL="96641" indent="0" algn="ctr">
+              <a:buNone/>
+              <a:defRPr>
+                <a:solidFill>
+                  <a:schemeClr val="tx1">
+                    <a:tint val="75000"/>
+                  </a:schemeClr>
+                </a:solidFill>
+              </a:defRPr>
+            </a:lvl2pPr>
+            <a:lvl3pPr marL="193280" indent="0" algn="ctr">
+              <a:buNone/>
+              <a:defRPr>
+                <a:solidFill>
+                  <a:schemeClr val="tx1">
+                    <a:tint val="75000"/>
+                  </a:schemeClr>
+                </a:solidFill>
+              </a:defRPr>
+            </a:lvl3pPr>
+            <a:lvl4pPr marL="289922" indent="0" algn="ctr">
+              <a:buNone/>
+              <a:defRPr>
+                <a:solidFill>
+                  <a:schemeClr val="tx1">
+                    <a:tint val="75000"/>
+                  </a:schemeClr>
+                </a:solidFill>
+              </a:defRPr>
+            </a:lvl4pPr>
+            <a:lvl5pPr marL="386557" indent="0" algn="ctr">
+              <a:buNone/>
+              <a:defRPr>
+                <a:solidFill>
+                  <a:schemeClr val="tx1">
+                    <a:tint val="75000"/>
+                  </a:schemeClr>
+                </a:solidFill>
+              </a:defRPr>
+            </a:lvl5pPr>
+            <a:lvl6pPr marL="483197" indent="0" algn="ctr">
+              <a:buNone/>
+              <a:defRPr>
+                <a:solidFill>
+                  <a:schemeClr val="tx1">
+                    <a:tint val="75000"/>
+                  </a:schemeClr>
+                </a:solidFill>
+              </a:defRPr>
+            </a:lvl6pPr>
+            <a:lvl7pPr marL="579838" indent="0" algn="ctr">
+              <a:buNone/>
+              <a:defRPr>
+                <a:solidFill>
+                  <a:schemeClr val="tx1">
+                    <a:tint val="75000"/>
+                  </a:schemeClr>
+                </a:solidFill>
+              </a:defRPr>
+            </a:lvl7pPr>
+            <a:lvl8pPr marL="676477" indent="0" algn="ctr">
+              <a:buNone/>
+              <a:defRPr>
+                <a:solidFill>
+                  <a:schemeClr val="tx1">
+                    <a:tint val="75000"/>
+                  </a:schemeClr>
+                </a:solidFill>
+              </a:defRPr>
+            </a:lvl8pPr>
+            <a:lvl9pPr marL="773119" indent="0" algn="ctr">
+              <a:buNone/>
+              <a:defRPr>
+                <a:solidFill>
+                  <a:schemeClr val="tx1">
+                    <a:tint val="75000"/>
+                  </a:schemeClr>
+                </a:solidFill>
+              </a:defRPr>
+            </a:lvl9pPr>
+          </a:lstStyle>
+          <a:p>
+            <a:r>
+              <a:rPr lang="en-US" smtClean="0"/>
+              <a:t>Click to edit Master subtitle style</a:t>
+            </a:r>
+            <a:endParaRPr lang="en-US"/>
+          </a:p>
+        </p:txBody>
+      </p:sp>
+      <p:sp>
+        <p:nvSpPr>
+          <p:cNvPr id="4" name="Date Placeholder 3"/>
+          <p:cNvSpPr>
+            <a:spLocks noGrp="1"/>
+          </p:cNvSpPr>
+          <p:nvPr>
+            <p:ph type="dt" sz="half" idx="10"/>
+          </p:nvPr>
+        </p:nvSpPr>
+        <p:spPr/>
+        <p:txBody>
+          <a:bodyPr/>
+          <a:lstStyle/>
+          <a:p>
+            <a:fld id="{34C6AA67-E7EC-BD42-94FC-5443D25F9C23}" type="datetimeFigureOut">
+              <a:rPr lang="en-US" smtClean="0">
+                <a:solidFill>
+                  <a:prstClr val="black">
+                    <a:tint val="75000"/>
+                  </a:prstClr>
+                </a:solidFill>
+                <a:latin typeface="Calibri"/>
+              </a:rPr>
+              <a:pPr/>
+              <a:t>8/5/13</a:t>
+            </a:fld>
+            <a:endParaRPr lang="en-US">
+              <a:solidFill>
+                <a:prstClr val="black">
+                  <a:tint val="75000"/>
+                </a:prstClr>
+              </a:solidFill>
+              <a:latin typeface="Calibri"/>
+            </a:endParaRPr>
+          </a:p>
+        </p:txBody>
+      </p:sp>
+      <p:sp>
+        <p:nvSpPr>
+          <p:cNvPr id="5" name="Footer Placeholder 4"/>
+          <p:cNvSpPr>
+            <a:spLocks noGrp="1"/>
+          </p:cNvSpPr>
+          <p:nvPr>
+            <p:ph type="ftr" sz="quarter" idx="11"/>
+          </p:nvPr>
+        </p:nvSpPr>
+        <p:spPr/>
+        <p:txBody>
+          <a:bodyPr/>
+          <a:lstStyle/>
+          <a:p>
+            <a:endParaRPr lang="en-US">
+              <a:solidFill>
+                <a:prstClr val="black">
+                  <a:tint val="75000"/>
+                </a:prstClr>
+              </a:solidFill>
+              <a:latin typeface="Calibri"/>
+            </a:endParaRPr>
+          </a:p>
+        </p:txBody>
+      </p:sp>
+      <p:sp>
+        <p:nvSpPr>
+          <p:cNvPr id="6" name="Slide Number Placeholder 5"/>
+          <p:cNvSpPr>
+            <a:spLocks noGrp="1"/>
+          </p:cNvSpPr>
+          <p:nvPr>
+            <p:ph type="sldNum" sz="quarter" idx="12"/>
+          </p:nvPr>
+        </p:nvSpPr>
+        <p:spPr/>
+        <p:txBody>
+          <a:bodyPr/>
+          <a:lstStyle/>
+          <a:p>
+            <a:fld id="{0C6BB7FD-57BC-BF44-AE3F-8E441ADAAD8D}" type="slidenum">
+              <a:rPr lang="en-US" smtClean="0">
+                <a:solidFill>
+                  <a:prstClr val="black">
+                    <a:tint val="75000"/>
+                  </a:prstClr>
+                </a:solidFill>
+                <a:latin typeface="Calibri"/>
+              </a:rPr>
+              <a:pPr/>
+              <a:t>‹#›</a:t>
+            </a:fld>
+            <a:endParaRPr lang="en-US">
+              <a:solidFill>
+                <a:prstClr val="black">
+                  <a:tint val="75000"/>
+                </a:prstClr>
+              </a:solidFill>
+              <a:latin typeface="Calibri"/>
+            </a:endParaRPr>
+          </a:p>
+        </p:txBody>
+      </p:sp>
+    </p:spTree>
+    <p:extLst>
+      <p:ext uri="{BB962C8B-B14F-4D97-AF65-F5344CB8AC3E}">
+        <p14:creationId xmlns:p14="http://schemas.microsoft.com/office/powerpoint/2010/main" val="4000997503"/>
+      </p:ext>
+    </p:extLst>
+  </p:cSld>
+  <p:clrMapOvr>
+    <a:masterClrMapping/>
+  </p:clrMapOvr>
+</p:sldLayout>
+</file>
+
+<file path=ppt/slideLayouts/slideLayout37.xml><?xml version="1.0" encoding="utf-8"?>
+<p:sldLayout xmlns:a="http://schemas.openxmlformats.org/drawingml/2006/main" xmlns:r="http://schemas.openxmlformats.org/officeDocument/2006/relationships" xmlns:p="http://schemas.openxmlformats.org/presentationml/2006/main" type="obj" preserve="1">
+  <p:cSld name="Title and Content">
+    <p:spTree>
+      <p:nvGrpSpPr>
+        <p:cNvPr id="1" name=""/>
+        <p:cNvGrpSpPr/>
+        <p:nvPr/>
+      </p:nvGrpSpPr>
+      <p:grpSpPr>
+        <a:xfrm>
+          <a:off x="0" y="0"/>
+          <a:ext cx="0" cy="0"/>
+          <a:chOff x="0" y="0"/>
+          <a:chExt cx="0" cy="0"/>
+        </a:xfrm>
+      </p:grpSpPr>
+      <p:sp>
+        <p:nvSpPr>
+          <p:cNvPr id="2" name="Title 1"/>
+          <p:cNvSpPr>
+            <a:spLocks noGrp="1"/>
+          </p:cNvSpPr>
+          <p:nvPr>
+            <p:ph type="title"/>
+          </p:nvPr>
+        </p:nvSpPr>
+        <p:spPr/>
+        <p:txBody>
+          <a:bodyPr/>
+          <a:lstStyle/>
+          <a:p>
+            <a:r>
+              <a:rPr lang="en-US" smtClean="0"/>
+              <a:t>Click to edit Master title style</a:t>
+            </a:r>
+            <a:endParaRPr lang="en-US"/>
+          </a:p>
+        </p:txBody>
+      </p:sp>
+      <p:sp>
+        <p:nvSpPr>
+          <p:cNvPr id="3" name="Content Placeholder 2"/>
+          <p:cNvSpPr>
+            <a:spLocks noGrp="1"/>
+          </p:cNvSpPr>
+          <p:nvPr>
+            <p:ph idx="1"/>
+          </p:nvPr>
+        </p:nvSpPr>
+        <p:spPr/>
+        <p:txBody>
+          <a:bodyPr/>
+          <a:lstStyle/>
+          <a:p>
+            <a:pPr lvl="0"/>
+            <a:r>
+              <a:rPr lang="en-US" smtClean="0"/>
+              <a:t>Click to edit Master text styles</a:t>
+            </a:r>
+          </a:p>
+          <a:p>
+            <a:pPr lvl="1"/>
+            <a:r>
+              <a:rPr lang="en-US" smtClean="0"/>
+              <a:t>Second level</a:t>
+            </a:r>
+          </a:p>
+          <a:p>
+            <a:pPr lvl="2"/>
+            <a:r>
+              <a:rPr lang="en-US" smtClean="0"/>
+              <a:t>Third level</a:t>
+            </a:r>
+          </a:p>
+          <a:p>
+            <a:pPr lvl="3"/>
+            <a:r>
+              <a:rPr lang="en-US" smtClean="0"/>
+              <a:t>Fourth level</a:t>
+            </a:r>
+          </a:p>
+          <a:p>
+            <a:pPr lvl="4"/>
+            <a:r>
+              <a:rPr lang="en-US" smtClean="0"/>
+              <a:t>Fifth level</a:t>
+            </a:r>
+            <a:endParaRPr lang="en-US"/>
+          </a:p>
+        </p:txBody>
+      </p:sp>
+      <p:sp>
+        <p:nvSpPr>
+          <p:cNvPr id="4" name="Date Placeholder 3"/>
+          <p:cNvSpPr>
+            <a:spLocks noGrp="1"/>
+          </p:cNvSpPr>
+          <p:nvPr>
+            <p:ph type="dt" sz="half" idx="10"/>
+          </p:nvPr>
+        </p:nvSpPr>
+        <p:spPr/>
+        <p:txBody>
+          <a:bodyPr/>
+          <a:lstStyle/>
+          <a:p>
+            <a:fld id="{34C6AA67-E7EC-BD42-94FC-5443D25F9C23}" type="datetimeFigureOut">
+              <a:rPr lang="en-US" smtClean="0">
+                <a:solidFill>
+                  <a:prstClr val="black">
+                    <a:tint val="75000"/>
+                  </a:prstClr>
+                </a:solidFill>
+                <a:latin typeface="Calibri"/>
+              </a:rPr>
+              <a:pPr/>
+              <a:t>8/5/13</a:t>
+            </a:fld>
+            <a:endParaRPr lang="en-US">
+              <a:solidFill>
+                <a:prstClr val="black">
+                  <a:tint val="75000"/>
+                </a:prstClr>
+              </a:solidFill>
+              <a:latin typeface="Calibri"/>
+            </a:endParaRPr>
+          </a:p>
+        </p:txBody>
+      </p:sp>
+      <p:sp>
+        <p:nvSpPr>
+          <p:cNvPr id="5" name="Footer Placeholder 4"/>
+          <p:cNvSpPr>
+            <a:spLocks noGrp="1"/>
+          </p:cNvSpPr>
+          <p:nvPr>
+            <p:ph type="ftr" sz="quarter" idx="11"/>
+          </p:nvPr>
+        </p:nvSpPr>
+        <p:spPr/>
+        <p:txBody>
+          <a:bodyPr/>
+          <a:lstStyle/>
+          <a:p>
+            <a:endParaRPr lang="en-US">
+              <a:solidFill>
+                <a:prstClr val="black">
+                  <a:tint val="75000"/>
+                </a:prstClr>
+              </a:solidFill>
+              <a:latin typeface="Calibri"/>
+            </a:endParaRPr>
+          </a:p>
+        </p:txBody>
+      </p:sp>
+      <p:sp>
+        <p:nvSpPr>
+          <p:cNvPr id="6" name="Slide Number Placeholder 5"/>
+          <p:cNvSpPr>
+            <a:spLocks noGrp="1"/>
+          </p:cNvSpPr>
+          <p:nvPr>
+            <p:ph type="sldNum" sz="quarter" idx="12"/>
+          </p:nvPr>
+        </p:nvSpPr>
+        <p:spPr/>
+        <p:txBody>
+          <a:bodyPr/>
+          <a:lstStyle/>
+          <a:p>
+            <a:fld id="{0C6BB7FD-57BC-BF44-AE3F-8E441ADAAD8D}" type="slidenum">
+              <a:rPr lang="en-US" smtClean="0">
+                <a:solidFill>
+                  <a:prstClr val="black">
+                    <a:tint val="75000"/>
+                  </a:prstClr>
+                </a:solidFill>
+                <a:latin typeface="Calibri"/>
+              </a:rPr>
+              <a:pPr/>
+              <a:t>‹#›</a:t>
+            </a:fld>
+            <a:endParaRPr lang="en-US">
+              <a:solidFill>
+                <a:prstClr val="black">
+                  <a:tint val="75000"/>
+                </a:prstClr>
+              </a:solidFill>
+              <a:latin typeface="Calibri"/>
+            </a:endParaRPr>
+          </a:p>
+        </p:txBody>
+      </p:sp>
+    </p:spTree>
+    <p:extLst>
+      <p:ext uri="{BB962C8B-B14F-4D97-AF65-F5344CB8AC3E}">
+        <p14:creationId xmlns:p14="http://schemas.microsoft.com/office/powerpoint/2010/main" val="1933035871"/>
+      </p:ext>
+    </p:extLst>
+  </p:cSld>
+  <p:clrMapOvr>
+    <a:masterClrMapping/>
+  </p:clrMapOvr>
+</p:sldLayout>
+</file>
+
+<file path=ppt/slideLayouts/slideLayout38.xml><?xml version="1.0" encoding="utf-8"?>
+<p:sldLayout xmlns:a="http://schemas.openxmlformats.org/drawingml/2006/main" xmlns:r="http://schemas.openxmlformats.org/officeDocument/2006/relationships" xmlns:p="http://schemas.openxmlformats.org/presentationml/2006/main" type="secHead" preserve="1">
+  <p:cSld name="Section Header">
+    <p:spTree>
+      <p:nvGrpSpPr>
+        <p:cNvPr id="1" name=""/>
+        <p:cNvGrpSpPr/>
+        <p:nvPr/>
+      </p:nvGrpSpPr>
+      <p:grpSpPr>
+        <a:xfrm>
+          <a:off x="0" y="0"/>
+          <a:ext cx="0" cy="0"/>
+          <a:chOff x="0" y="0"/>
+          <a:chExt cx="0" cy="0"/>
+        </a:xfrm>
+      </p:grpSpPr>
+      <p:sp>
+        <p:nvSpPr>
+          <p:cNvPr id="2" name="Title 1"/>
+          <p:cNvSpPr>
+            <a:spLocks noGrp="1"/>
+          </p:cNvSpPr>
+          <p:nvPr>
+            <p:ph type="title"/>
+          </p:nvPr>
+        </p:nvSpPr>
+        <p:spPr>
+          <a:xfrm>
+            <a:off x="153120" y="698784"/>
+            <a:ext cx="1647587" cy="215977"/>
+          </a:xfrm>
+        </p:spPr>
+        <p:txBody>
+          <a:bodyPr anchor="t"/>
+          <a:lstStyle>
+            <a:lvl1pPr algn="l">
+              <a:defRPr sz="800" b="1" cap="all"/>
+            </a:lvl1pPr>
+          </a:lstStyle>
+          <a:p>
+            <a:r>
+              <a:rPr lang="en-US" smtClean="0"/>
+              <a:t>Click to edit Master title style</a:t>
+            </a:r>
+            <a:endParaRPr lang="en-US"/>
+          </a:p>
+        </p:txBody>
+      </p:sp>
+      <p:sp>
+        <p:nvSpPr>
+          <p:cNvPr id="3" name="Text Placeholder 2"/>
+          <p:cNvSpPr>
+            <a:spLocks noGrp="1"/>
+          </p:cNvSpPr>
+          <p:nvPr>
+            <p:ph type="body" idx="1"/>
+          </p:nvPr>
+        </p:nvSpPr>
+        <p:spPr>
+          <a:xfrm>
+            <a:off x="153120" y="460902"/>
+            <a:ext cx="1647587" cy="237877"/>
+          </a:xfrm>
+        </p:spPr>
+        <p:txBody>
+          <a:bodyPr anchor="b"/>
+          <a:lstStyle>
+            <a:lvl1pPr marL="0" indent="0">
+              <a:buNone/>
+              <a:defRPr sz="400">
+                <a:solidFill>
+                  <a:schemeClr val="tx1">
+                    <a:tint val="75000"/>
+                  </a:schemeClr>
+                </a:solidFill>
+              </a:defRPr>
+            </a:lvl1pPr>
+            <a:lvl2pPr marL="96641" indent="0">
+              <a:buNone/>
+              <a:defRPr sz="400">
+                <a:solidFill>
+                  <a:schemeClr val="tx1">
+                    <a:tint val="75000"/>
+                  </a:schemeClr>
+                </a:solidFill>
+              </a:defRPr>
+            </a:lvl2pPr>
+            <a:lvl3pPr marL="193280" indent="0">
+              <a:buNone/>
+              <a:defRPr sz="300">
+                <a:solidFill>
+                  <a:schemeClr val="tx1">
+                    <a:tint val="75000"/>
+                  </a:schemeClr>
+                </a:solidFill>
+              </a:defRPr>
+            </a:lvl3pPr>
+            <a:lvl4pPr marL="289922" indent="0">
+              <a:buNone/>
+              <a:defRPr sz="300">
+                <a:solidFill>
+                  <a:schemeClr val="tx1">
+                    <a:tint val="75000"/>
+                  </a:schemeClr>
+                </a:solidFill>
+              </a:defRPr>
+            </a:lvl4pPr>
+            <a:lvl5pPr marL="386557" indent="0">
+              <a:buNone/>
+              <a:defRPr sz="300">
+                <a:solidFill>
+                  <a:schemeClr val="tx1">
+                    <a:tint val="75000"/>
+                  </a:schemeClr>
+                </a:solidFill>
+              </a:defRPr>
+            </a:lvl5pPr>
+            <a:lvl6pPr marL="483197" indent="0">
+              <a:buNone/>
+              <a:defRPr sz="300">
+                <a:solidFill>
+                  <a:schemeClr val="tx1">
+                    <a:tint val="75000"/>
+                  </a:schemeClr>
+                </a:solidFill>
+              </a:defRPr>
+            </a:lvl6pPr>
+            <a:lvl7pPr marL="579838" indent="0">
+              <a:buNone/>
+              <a:defRPr sz="300">
+                <a:solidFill>
+                  <a:schemeClr val="tx1">
+                    <a:tint val="75000"/>
+                  </a:schemeClr>
+                </a:solidFill>
+              </a:defRPr>
+            </a:lvl7pPr>
+            <a:lvl8pPr marL="676477" indent="0">
+              <a:buNone/>
+              <a:defRPr sz="300">
+                <a:solidFill>
+                  <a:schemeClr val="tx1">
+                    <a:tint val="75000"/>
+                  </a:schemeClr>
+                </a:solidFill>
+              </a:defRPr>
+            </a:lvl8pPr>
+            <a:lvl9pPr marL="773119" indent="0">
+              <a:buNone/>
+              <a:defRPr sz="300">
+                <a:solidFill>
+                  <a:schemeClr val="tx1">
+                    <a:tint val="75000"/>
+                  </a:schemeClr>
+                </a:solidFill>
+              </a:defRPr>
+            </a:lvl9pPr>
+          </a:lstStyle>
+          <a:p>
+            <a:pPr lvl="0"/>
+            <a:r>
+              <a:rPr lang="en-US" smtClean="0"/>
+              <a:t>Click to edit Master text styles</a:t>
+            </a:r>
+          </a:p>
+        </p:txBody>
+      </p:sp>
+      <p:sp>
+        <p:nvSpPr>
+          <p:cNvPr id="4" name="Date Placeholder 3"/>
+          <p:cNvSpPr>
+            <a:spLocks noGrp="1"/>
+          </p:cNvSpPr>
+          <p:nvPr>
+            <p:ph type="dt" sz="half" idx="10"/>
+          </p:nvPr>
+        </p:nvSpPr>
+        <p:spPr/>
+        <p:txBody>
+          <a:bodyPr/>
+          <a:lstStyle/>
+          <a:p>
+            <a:fld id="{34C6AA67-E7EC-BD42-94FC-5443D25F9C23}" type="datetimeFigureOut">
+              <a:rPr lang="en-US" smtClean="0">
+                <a:solidFill>
+                  <a:prstClr val="black">
+                    <a:tint val="75000"/>
+                  </a:prstClr>
+                </a:solidFill>
+                <a:latin typeface="Calibri"/>
+              </a:rPr>
+              <a:pPr/>
+              <a:t>8/5/13</a:t>
+            </a:fld>
+            <a:endParaRPr lang="en-US">
+              <a:solidFill>
+                <a:prstClr val="black">
+                  <a:tint val="75000"/>
+                </a:prstClr>
+              </a:solidFill>
+              <a:latin typeface="Calibri"/>
+            </a:endParaRPr>
+          </a:p>
+        </p:txBody>
+      </p:sp>
+      <p:sp>
+        <p:nvSpPr>
+          <p:cNvPr id="5" name="Footer Placeholder 4"/>
+          <p:cNvSpPr>
+            <a:spLocks noGrp="1"/>
+          </p:cNvSpPr>
+          <p:nvPr>
+            <p:ph type="ftr" sz="quarter" idx="11"/>
+          </p:nvPr>
+        </p:nvSpPr>
+        <p:spPr/>
+        <p:txBody>
+          <a:bodyPr/>
+          <a:lstStyle/>
+          <a:p>
+            <a:endParaRPr lang="en-US">
+              <a:solidFill>
+                <a:prstClr val="black">
+                  <a:tint val="75000"/>
+                </a:prstClr>
+              </a:solidFill>
+              <a:latin typeface="Calibri"/>
+            </a:endParaRPr>
+          </a:p>
+        </p:txBody>
+      </p:sp>
+      <p:sp>
+        <p:nvSpPr>
+          <p:cNvPr id="6" name="Slide Number Placeholder 5"/>
+          <p:cNvSpPr>
+            <a:spLocks noGrp="1"/>
+          </p:cNvSpPr>
+          <p:nvPr>
+            <p:ph type="sldNum" sz="quarter" idx="12"/>
+          </p:nvPr>
+        </p:nvSpPr>
+        <p:spPr/>
+        <p:txBody>
+          <a:bodyPr/>
+          <a:lstStyle/>
+          <a:p>
+            <a:fld id="{0C6BB7FD-57BC-BF44-AE3F-8E441ADAAD8D}" type="slidenum">
+              <a:rPr lang="en-US" smtClean="0">
+                <a:solidFill>
+                  <a:prstClr val="black">
+                    <a:tint val="75000"/>
+                  </a:prstClr>
+                </a:solidFill>
+                <a:latin typeface="Calibri"/>
+              </a:rPr>
+              <a:pPr/>
+              <a:t>‹#›</a:t>
+            </a:fld>
+            <a:endParaRPr lang="en-US">
+              <a:solidFill>
+                <a:prstClr val="black">
+                  <a:tint val="75000"/>
+                </a:prstClr>
+              </a:solidFill>
+              <a:latin typeface="Calibri"/>
+            </a:endParaRPr>
+          </a:p>
+        </p:txBody>
+      </p:sp>
+    </p:spTree>
+    <p:extLst>
+      <p:ext uri="{BB962C8B-B14F-4D97-AF65-F5344CB8AC3E}">
+        <p14:creationId xmlns:p14="http://schemas.microsoft.com/office/powerpoint/2010/main" val="159418031"/>
+      </p:ext>
+    </p:extLst>
+  </p:cSld>
+  <p:clrMapOvr>
+    <a:masterClrMapping/>
+  </p:clrMapOvr>
+</p:sldLayout>
+</file>
+
+<file path=ppt/slideLayouts/slideLayout39.xml><?xml version="1.0" encoding="utf-8"?>
 <p:sldLayout xmlns:a="http://schemas.openxmlformats.org/drawingml/2006/main" xmlns:r="http://schemas.openxmlformats.org/officeDocument/2006/relationships" xmlns:p="http://schemas.openxmlformats.org/presentationml/2006/main" type="twoObj" preserve="1">
   <p:cSld name="Two Content">
     <p:spTree>
@@ -7794,8 +8565,333 @@
           <a:lstStyle/>
           <a:p>
             <a:fld id="{34C6AA67-E7EC-BD42-94FC-5443D25F9C23}" type="datetimeFigureOut">
-              <a:rPr lang="en-US" smtClean="0"/>
-              <a:t>5/18/13</a:t>
+              <a:rPr lang="en-US" smtClean="0">
+                <a:solidFill>
+                  <a:prstClr val="black">
+                    <a:tint val="75000"/>
+                  </a:prstClr>
+                </a:solidFill>
+                <a:latin typeface="Calibri"/>
+              </a:rPr>
+              <a:pPr/>
+              <a:t>8/5/13</a:t>
+            </a:fld>
+            <a:endParaRPr lang="en-US">
+              <a:solidFill>
+                <a:prstClr val="black">
+                  <a:tint val="75000"/>
+                </a:prstClr>
+              </a:solidFill>
+              <a:latin typeface="Calibri"/>
+            </a:endParaRPr>
+          </a:p>
+        </p:txBody>
+      </p:sp>
+      <p:sp>
+        <p:nvSpPr>
+          <p:cNvPr id="6" name="Footer Placeholder 5"/>
+          <p:cNvSpPr>
+            <a:spLocks noGrp="1"/>
+          </p:cNvSpPr>
+          <p:nvPr>
+            <p:ph type="ftr" sz="quarter" idx="11"/>
+          </p:nvPr>
+        </p:nvSpPr>
+        <p:spPr/>
+        <p:txBody>
+          <a:bodyPr/>
+          <a:lstStyle/>
+          <a:p>
+            <a:endParaRPr lang="en-US">
+              <a:solidFill>
+                <a:prstClr val="black">
+                  <a:tint val="75000"/>
+                </a:prstClr>
+              </a:solidFill>
+              <a:latin typeface="Calibri"/>
+            </a:endParaRPr>
+          </a:p>
+        </p:txBody>
+      </p:sp>
+      <p:sp>
+        <p:nvSpPr>
+          <p:cNvPr id="7" name="Slide Number Placeholder 6"/>
+          <p:cNvSpPr>
+            <a:spLocks noGrp="1"/>
+          </p:cNvSpPr>
+          <p:nvPr>
+            <p:ph type="sldNum" sz="quarter" idx="12"/>
+          </p:nvPr>
+        </p:nvSpPr>
+        <p:spPr/>
+        <p:txBody>
+          <a:bodyPr/>
+          <a:lstStyle/>
+          <a:p>
+            <a:fld id="{0C6BB7FD-57BC-BF44-AE3F-8E441ADAAD8D}" type="slidenum">
+              <a:rPr lang="en-US" smtClean="0">
+                <a:solidFill>
+                  <a:prstClr val="black">
+                    <a:tint val="75000"/>
+                  </a:prstClr>
+                </a:solidFill>
+                <a:latin typeface="Calibri"/>
+              </a:rPr>
+              <a:pPr/>
+              <a:t>‹#›</a:t>
+            </a:fld>
+            <a:endParaRPr lang="en-US">
+              <a:solidFill>
+                <a:prstClr val="black">
+                  <a:tint val="75000"/>
+                </a:prstClr>
+              </a:solidFill>
+              <a:latin typeface="Calibri"/>
+            </a:endParaRPr>
+          </a:p>
+        </p:txBody>
+      </p:sp>
+    </p:spTree>
+    <p:extLst>
+      <p:ext uri="{BB962C8B-B14F-4D97-AF65-F5344CB8AC3E}">
+        <p14:creationId xmlns:p14="http://schemas.microsoft.com/office/powerpoint/2010/main" val="888141420"/>
+      </p:ext>
+    </p:extLst>
+  </p:cSld>
+  <p:clrMapOvr>
+    <a:masterClrMapping/>
+  </p:clrMapOvr>
+</p:sldLayout>
+</file>
+
+<file path=ppt/slideLayouts/slideLayout4.xml><?xml version="1.0" encoding="utf-8"?>
+<p:sldLayout xmlns:a="http://schemas.openxmlformats.org/drawingml/2006/main" xmlns:r="http://schemas.openxmlformats.org/officeDocument/2006/relationships" xmlns:p="http://schemas.openxmlformats.org/presentationml/2006/main" type="twoObj" preserve="1">
+  <p:cSld name="Two Content">
+    <p:spTree>
+      <p:nvGrpSpPr>
+        <p:cNvPr id="1" name=""/>
+        <p:cNvGrpSpPr/>
+        <p:nvPr/>
+      </p:nvGrpSpPr>
+      <p:grpSpPr>
+        <a:xfrm>
+          <a:off x="0" y="0"/>
+          <a:ext cx="0" cy="0"/>
+          <a:chOff x="0" y="0"/>
+          <a:chExt cx="0" cy="0"/>
+        </a:xfrm>
+      </p:grpSpPr>
+      <p:sp>
+        <p:nvSpPr>
+          <p:cNvPr id="2" name="Title 1"/>
+          <p:cNvSpPr>
+            <a:spLocks noGrp="1"/>
+          </p:cNvSpPr>
+          <p:nvPr>
+            <p:ph type="title"/>
+          </p:nvPr>
+        </p:nvSpPr>
+        <p:spPr/>
+        <p:txBody>
+          <a:bodyPr/>
+          <a:lstStyle/>
+          <a:p>
+            <a:r>
+              <a:rPr lang="en-US" smtClean="0"/>
+              <a:t>Click to edit Master title style</a:t>
+            </a:r>
+            <a:endParaRPr lang="en-US"/>
+          </a:p>
+        </p:txBody>
+      </p:sp>
+      <p:sp>
+        <p:nvSpPr>
+          <p:cNvPr id="3" name="Content Placeholder 2"/>
+          <p:cNvSpPr>
+            <a:spLocks noGrp="1"/>
+          </p:cNvSpPr>
+          <p:nvPr>
+            <p:ph sz="half" idx="1"/>
+          </p:nvPr>
+        </p:nvSpPr>
+        <p:spPr>
+          <a:xfrm>
+            <a:off x="96921" y="253742"/>
+            <a:ext cx="856099" cy="717659"/>
+          </a:xfrm>
+        </p:spPr>
+        <p:txBody>
+          <a:bodyPr/>
+          <a:lstStyle>
+            <a:lvl1pPr>
+              <a:defRPr sz="600"/>
+            </a:lvl1pPr>
+            <a:lvl2pPr>
+              <a:defRPr sz="500"/>
+            </a:lvl2pPr>
+            <a:lvl3pPr>
+              <a:defRPr sz="400"/>
+            </a:lvl3pPr>
+            <a:lvl4pPr>
+              <a:defRPr sz="400"/>
+            </a:lvl4pPr>
+            <a:lvl5pPr>
+              <a:defRPr sz="400"/>
+            </a:lvl5pPr>
+            <a:lvl6pPr>
+              <a:defRPr sz="400"/>
+            </a:lvl6pPr>
+            <a:lvl7pPr>
+              <a:defRPr sz="400"/>
+            </a:lvl7pPr>
+            <a:lvl8pPr>
+              <a:defRPr sz="400"/>
+            </a:lvl8pPr>
+            <a:lvl9pPr>
+              <a:defRPr sz="400"/>
+            </a:lvl9pPr>
+          </a:lstStyle>
+          <a:p>
+            <a:pPr lvl="0"/>
+            <a:r>
+              <a:rPr lang="en-US" smtClean="0"/>
+              <a:t>Click to edit Master text styles</a:t>
+            </a:r>
+          </a:p>
+          <a:p>
+            <a:pPr lvl="1"/>
+            <a:r>
+              <a:rPr lang="en-US" smtClean="0"/>
+              <a:t>Second level</a:t>
+            </a:r>
+          </a:p>
+          <a:p>
+            <a:pPr lvl="2"/>
+            <a:r>
+              <a:rPr lang="en-US" smtClean="0"/>
+              <a:t>Third level</a:t>
+            </a:r>
+          </a:p>
+          <a:p>
+            <a:pPr lvl="3"/>
+            <a:r>
+              <a:rPr lang="en-US" smtClean="0"/>
+              <a:t>Fourth level</a:t>
+            </a:r>
+          </a:p>
+          <a:p>
+            <a:pPr lvl="4"/>
+            <a:r>
+              <a:rPr lang="en-US" smtClean="0"/>
+              <a:t>Fifth level</a:t>
+            </a:r>
+            <a:endParaRPr lang="en-US"/>
+          </a:p>
+        </p:txBody>
+      </p:sp>
+      <p:sp>
+        <p:nvSpPr>
+          <p:cNvPr id="4" name="Content Placeholder 3"/>
+          <p:cNvSpPr>
+            <a:spLocks noGrp="1"/>
+          </p:cNvSpPr>
+          <p:nvPr>
+            <p:ph sz="half" idx="2"/>
+          </p:nvPr>
+        </p:nvSpPr>
+        <p:spPr>
+          <a:xfrm>
+            <a:off x="985326" y="253742"/>
+            <a:ext cx="856099" cy="717659"/>
+          </a:xfrm>
+        </p:spPr>
+        <p:txBody>
+          <a:bodyPr/>
+          <a:lstStyle>
+            <a:lvl1pPr>
+              <a:defRPr sz="600"/>
+            </a:lvl1pPr>
+            <a:lvl2pPr>
+              <a:defRPr sz="500"/>
+            </a:lvl2pPr>
+            <a:lvl3pPr>
+              <a:defRPr sz="400"/>
+            </a:lvl3pPr>
+            <a:lvl4pPr>
+              <a:defRPr sz="400"/>
+            </a:lvl4pPr>
+            <a:lvl5pPr>
+              <a:defRPr sz="400"/>
+            </a:lvl5pPr>
+            <a:lvl6pPr>
+              <a:defRPr sz="400"/>
+            </a:lvl6pPr>
+            <a:lvl7pPr>
+              <a:defRPr sz="400"/>
+            </a:lvl7pPr>
+            <a:lvl8pPr>
+              <a:defRPr sz="400"/>
+            </a:lvl8pPr>
+            <a:lvl9pPr>
+              <a:defRPr sz="400"/>
+            </a:lvl9pPr>
+          </a:lstStyle>
+          <a:p>
+            <a:pPr lvl="0"/>
+            <a:r>
+              <a:rPr lang="en-US" smtClean="0"/>
+              <a:t>Click to edit Master text styles</a:t>
+            </a:r>
+          </a:p>
+          <a:p>
+            <a:pPr lvl="1"/>
+            <a:r>
+              <a:rPr lang="en-US" smtClean="0"/>
+              <a:t>Second level</a:t>
+            </a:r>
+          </a:p>
+          <a:p>
+            <a:pPr lvl="2"/>
+            <a:r>
+              <a:rPr lang="en-US" smtClean="0"/>
+              <a:t>Third level</a:t>
+            </a:r>
+          </a:p>
+          <a:p>
+            <a:pPr lvl="3"/>
+            <a:r>
+              <a:rPr lang="en-US" smtClean="0"/>
+              <a:t>Fourth level</a:t>
+            </a:r>
+          </a:p>
+          <a:p>
+            <a:pPr lvl="4"/>
+            <a:r>
+              <a:rPr lang="en-US" smtClean="0"/>
+              <a:t>Fifth level</a:t>
+            </a:r>
+            <a:endParaRPr lang="en-US"/>
+          </a:p>
+        </p:txBody>
+      </p:sp>
+      <p:sp>
+        <p:nvSpPr>
+          <p:cNvPr id="5" name="Date Placeholder 4"/>
+          <p:cNvSpPr>
+            <a:spLocks noGrp="1"/>
+          </p:cNvSpPr>
+          <p:nvPr>
+            <p:ph type="dt" sz="half" idx="10"/>
+          </p:nvPr>
+        </p:nvSpPr>
+        <p:spPr/>
+        <p:txBody>
+          <a:bodyPr/>
+          <a:lstStyle/>
+          <a:p>
+            <a:fld id="{34C6AA67-E7EC-BD42-94FC-5443D25F9C23}" type="datetimeFigureOut">
+              <a:rPr lang="en-US" smtClean="0"/>
+              <a:t>8/5/13</a:t>
             </a:fld>
             <a:endParaRPr lang="en-US"/>
           </a:p>
@@ -7856,7 +8952,7 @@
 </p:sldLayout>
 </file>
 
-<file path=ppt/slideLayouts/slideLayout5.xml><?xml version="1.0" encoding="utf-8"?>
+<file path=ppt/slideLayouts/slideLayout40.xml><?xml version="1.0" encoding="utf-8"?>
 <p:sldLayout xmlns:a="http://schemas.openxmlformats.org/drawingml/2006/main" xmlns:r="http://schemas.openxmlformats.org/officeDocument/2006/relationships" xmlns:p="http://schemas.openxmlformats.org/presentationml/2006/main" type="twoTxTwoObj" preserve="1">
   <p:cSld name="Comparison">
     <p:spTree>
@@ -8216,8 +9312,2143 @@
           <a:lstStyle/>
           <a:p>
             <a:fld id="{34C6AA67-E7EC-BD42-94FC-5443D25F9C23}" type="datetimeFigureOut">
-              <a:rPr lang="en-US" smtClean="0"/>
-              <a:t>5/18/13</a:t>
+              <a:rPr lang="en-US" smtClean="0">
+                <a:solidFill>
+                  <a:prstClr val="black">
+                    <a:tint val="75000"/>
+                  </a:prstClr>
+                </a:solidFill>
+                <a:latin typeface="Calibri"/>
+              </a:rPr>
+              <a:pPr/>
+              <a:t>8/5/13</a:t>
+            </a:fld>
+            <a:endParaRPr lang="en-US">
+              <a:solidFill>
+                <a:prstClr val="black">
+                  <a:tint val="75000"/>
+                </a:prstClr>
+              </a:solidFill>
+              <a:latin typeface="Calibri"/>
+            </a:endParaRPr>
+          </a:p>
+        </p:txBody>
+      </p:sp>
+      <p:sp>
+        <p:nvSpPr>
+          <p:cNvPr id="8" name="Footer Placeholder 7"/>
+          <p:cNvSpPr>
+            <a:spLocks noGrp="1"/>
+          </p:cNvSpPr>
+          <p:nvPr>
+            <p:ph type="ftr" sz="quarter" idx="11"/>
+          </p:nvPr>
+        </p:nvSpPr>
+        <p:spPr/>
+        <p:txBody>
+          <a:bodyPr/>
+          <a:lstStyle/>
+          <a:p>
+            <a:endParaRPr lang="en-US">
+              <a:solidFill>
+                <a:prstClr val="black">
+                  <a:tint val="75000"/>
+                </a:prstClr>
+              </a:solidFill>
+              <a:latin typeface="Calibri"/>
+            </a:endParaRPr>
+          </a:p>
+        </p:txBody>
+      </p:sp>
+      <p:sp>
+        <p:nvSpPr>
+          <p:cNvPr id="9" name="Slide Number Placeholder 8"/>
+          <p:cNvSpPr>
+            <a:spLocks noGrp="1"/>
+          </p:cNvSpPr>
+          <p:nvPr>
+            <p:ph type="sldNum" sz="quarter" idx="12"/>
+          </p:nvPr>
+        </p:nvSpPr>
+        <p:spPr/>
+        <p:txBody>
+          <a:bodyPr/>
+          <a:lstStyle/>
+          <a:p>
+            <a:fld id="{0C6BB7FD-57BC-BF44-AE3F-8E441ADAAD8D}" type="slidenum">
+              <a:rPr lang="en-US" smtClean="0">
+                <a:solidFill>
+                  <a:prstClr val="black">
+                    <a:tint val="75000"/>
+                  </a:prstClr>
+                </a:solidFill>
+                <a:latin typeface="Calibri"/>
+              </a:rPr>
+              <a:pPr/>
+              <a:t>‹#›</a:t>
+            </a:fld>
+            <a:endParaRPr lang="en-US">
+              <a:solidFill>
+                <a:prstClr val="black">
+                  <a:tint val="75000"/>
+                </a:prstClr>
+              </a:solidFill>
+              <a:latin typeface="Calibri"/>
+            </a:endParaRPr>
+          </a:p>
+        </p:txBody>
+      </p:sp>
+    </p:spTree>
+    <p:extLst>
+      <p:ext uri="{BB962C8B-B14F-4D97-AF65-F5344CB8AC3E}">
+        <p14:creationId xmlns:p14="http://schemas.microsoft.com/office/powerpoint/2010/main" val="3787458931"/>
+      </p:ext>
+    </p:extLst>
+  </p:cSld>
+  <p:clrMapOvr>
+    <a:masterClrMapping/>
+  </p:clrMapOvr>
+</p:sldLayout>
+</file>
+
+<file path=ppt/slideLayouts/slideLayout41.xml><?xml version="1.0" encoding="utf-8"?>
+<p:sldLayout xmlns:a="http://schemas.openxmlformats.org/drawingml/2006/main" xmlns:r="http://schemas.openxmlformats.org/officeDocument/2006/relationships" xmlns:p="http://schemas.openxmlformats.org/presentationml/2006/main" type="titleOnly" preserve="1">
+  <p:cSld name="Title Only">
+    <p:spTree>
+      <p:nvGrpSpPr>
+        <p:cNvPr id="1" name=""/>
+        <p:cNvGrpSpPr/>
+        <p:nvPr/>
+      </p:nvGrpSpPr>
+      <p:grpSpPr>
+        <a:xfrm>
+          <a:off x="0" y="0"/>
+          <a:ext cx="0" cy="0"/>
+          <a:chOff x="0" y="0"/>
+          <a:chExt cx="0" cy="0"/>
+        </a:xfrm>
+      </p:grpSpPr>
+      <p:sp>
+        <p:nvSpPr>
+          <p:cNvPr id="2" name="Title 1"/>
+          <p:cNvSpPr>
+            <a:spLocks noGrp="1"/>
+          </p:cNvSpPr>
+          <p:nvPr>
+            <p:ph type="title"/>
+          </p:nvPr>
+        </p:nvSpPr>
+        <p:spPr/>
+        <p:txBody>
+          <a:bodyPr/>
+          <a:lstStyle/>
+          <a:p>
+            <a:r>
+              <a:rPr lang="en-US" smtClean="0"/>
+              <a:t>Click to edit Master title style</a:t>
+            </a:r>
+            <a:endParaRPr lang="en-US"/>
+          </a:p>
+        </p:txBody>
+      </p:sp>
+      <p:sp>
+        <p:nvSpPr>
+          <p:cNvPr id="3" name="Date Placeholder 2"/>
+          <p:cNvSpPr>
+            <a:spLocks noGrp="1"/>
+          </p:cNvSpPr>
+          <p:nvPr>
+            <p:ph type="dt" sz="half" idx="10"/>
+          </p:nvPr>
+        </p:nvSpPr>
+        <p:spPr/>
+        <p:txBody>
+          <a:bodyPr/>
+          <a:lstStyle/>
+          <a:p>
+            <a:fld id="{34C6AA67-E7EC-BD42-94FC-5443D25F9C23}" type="datetimeFigureOut">
+              <a:rPr lang="en-US" smtClean="0">
+                <a:solidFill>
+                  <a:prstClr val="black">
+                    <a:tint val="75000"/>
+                  </a:prstClr>
+                </a:solidFill>
+                <a:latin typeface="Calibri"/>
+              </a:rPr>
+              <a:pPr/>
+              <a:t>8/5/13</a:t>
+            </a:fld>
+            <a:endParaRPr lang="en-US">
+              <a:solidFill>
+                <a:prstClr val="black">
+                  <a:tint val="75000"/>
+                </a:prstClr>
+              </a:solidFill>
+              <a:latin typeface="Calibri"/>
+            </a:endParaRPr>
+          </a:p>
+        </p:txBody>
+      </p:sp>
+      <p:sp>
+        <p:nvSpPr>
+          <p:cNvPr id="4" name="Footer Placeholder 3"/>
+          <p:cNvSpPr>
+            <a:spLocks noGrp="1"/>
+          </p:cNvSpPr>
+          <p:nvPr>
+            <p:ph type="ftr" sz="quarter" idx="11"/>
+          </p:nvPr>
+        </p:nvSpPr>
+        <p:spPr/>
+        <p:txBody>
+          <a:bodyPr/>
+          <a:lstStyle/>
+          <a:p>
+            <a:endParaRPr lang="en-US">
+              <a:solidFill>
+                <a:prstClr val="black">
+                  <a:tint val="75000"/>
+                </a:prstClr>
+              </a:solidFill>
+              <a:latin typeface="Calibri"/>
+            </a:endParaRPr>
+          </a:p>
+        </p:txBody>
+      </p:sp>
+      <p:sp>
+        <p:nvSpPr>
+          <p:cNvPr id="5" name="Slide Number Placeholder 4"/>
+          <p:cNvSpPr>
+            <a:spLocks noGrp="1"/>
+          </p:cNvSpPr>
+          <p:nvPr>
+            <p:ph type="sldNum" sz="quarter" idx="12"/>
+          </p:nvPr>
+        </p:nvSpPr>
+        <p:spPr/>
+        <p:txBody>
+          <a:bodyPr/>
+          <a:lstStyle/>
+          <a:p>
+            <a:fld id="{0C6BB7FD-57BC-BF44-AE3F-8E441ADAAD8D}" type="slidenum">
+              <a:rPr lang="en-US" smtClean="0">
+                <a:solidFill>
+                  <a:prstClr val="black">
+                    <a:tint val="75000"/>
+                  </a:prstClr>
+                </a:solidFill>
+                <a:latin typeface="Calibri"/>
+              </a:rPr>
+              <a:pPr/>
+              <a:t>‹#›</a:t>
+            </a:fld>
+            <a:endParaRPr lang="en-US">
+              <a:solidFill>
+                <a:prstClr val="black">
+                  <a:tint val="75000"/>
+                </a:prstClr>
+              </a:solidFill>
+              <a:latin typeface="Calibri"/>
+            </a:endParaRPr>
+          </a:p>
+        </p:txBody>
+      </p:sp>
+    </p:spTree>
+    <p:extLst>
+      <p:ext uri="{BB962C8B-B14F-4D97-AF65-F5344CB8AC3E}">
+        <p14:creationId xmlns:p14="http://schemas.microsoft.com/office/powerpoint/2010/main" val="2591891489"/>
+      </p:ext>
+    </p:extLst>
+  </p:cSld>
+  <p:clrMapOvr>
+    <a:masterClrMapping/>
+  </p:clrMapOvr>
+  <p:transition xmlns:p14="http://schemas.microsoft.com/office/powerpoint/2010/main">
+    <p:fade/>
+  </p:transition>
+  <p:timing>
+    <p:tnLst>
+      <p:par>
+        <p:cTn xmlns:p14="http://schemas.microsoft.com/office/powerpoint/2010/main" id="1" dur="indefinite" restart="never" nodeType="tmRoot"/>
+      </p:par>
+    </p:tnLst>
+  </p:timing>
+</p:sldLayout>
+</file>
+
+<file path=ppt/slideLayouts/slideLayout42.xml><?xml version="1.0" encoding="utf-8"?>
+<p:sldLayout xmlns:a="http://schemas.openxmlformats.org/drawingml/2006/main" xmlns:r="http://schemas.openxmlformats.org/officeDocument/2006/relationships" xmlns:p="http://schemas.openxmlformats.org/presentationml/2006/main" type="blank" preserve="1">
+  <p:cSld name="Blank">
+    <p:spTree>
+      <p:nvGrpSpPr>
+        <p:cNvPr id="1" name=""/>
+        <p:cNvGrpSpPr/>
+        <p:nvPr/>
+      </p:nvGrpSpPr>
+      <p:grpSpPr>
+        <a:xfrm>
+          <a:off x="0" y="0"/>
+          <a:ext cx="0" cy="0"/>
+          <a:chOff x="0" y="0"/>
+          <a:chExt cx="0" cy="0"/>
+        </a:xfrm>
+      </p:grpSpPr>
+      <p:sp>
+        <p:nvSpPr>
+          <p:cNvPr id="2" name="Date Placeholder 1"/>
+          <p:cNvSpPr>
+            <a:spLocks noGrp="1"/>
+          </p:cNvSpPr>
+          <p:nvPr>
+            <p:ph type="dt" sz="half" idx="10"/>
+          </p:nvPr>
+        </p:nvSpPr>
+        <p:spPr/>
+        <p:txBody>
+          <a:bodyPr/>
+          <a:lstStyle/>
+          <a:p>
+            <a:fld id="{34C6AA67-E7EC-BD42-94FC-5443D25F9C23}" type="datetimeFigureOut">
+              <a:rPr lang="en-US" smtClean="0">
+                <a:solidFill>
+                  <a:prstClr val="black">
+                    <a:tint val="75000"/>
+                  </a:prstClr>
+                </a:solidFill>
+                <a:latin typeface="Calibri"/>
+              </a:rPr>
+              <a:pPr/>
+              <a:t>8/5/13</a:t>
+            </a:fld>
+            <a:endParaRPr lang="en-US">
+              <a:solidFill>
+                <a:prstClr val="black">
+                  <a:tint val="75000"/>
+                </a:prstClr>
+              </a:solidFill>
+              <a:latin typeface="Calibri"/>
+            </a:endParaRPr>
+          </a:p>
+        </p:txBody>
+      </p:sp>
+      <p:sp>
+        <p:nvSpPr>
+          <p:cNvPr id="3" name="Footer Placeholder 2"/>
+          <p:cNvSpPr>
+            <a:spLocks noGrp="1"/>
+          </p:cNvSpPr>
+          <p:nvPr>
+            <p:ph type="ftr" sz="quarter" idx="11"/>
+          </p:nvPr>
+        </p:nvSpPr>
+        <p:spPr/>
+        <p:txBody>
+          <a:bodyPr/>
+          <a:lstStyle/>
+          <a:p>
+            <a:endParaRPr lang="en-US">
+              <a:solidFill>
+                <a:prstClr val="black">
+                  <a:tint val="75000"/>
+                </a:prstClr>
+              </a:solidFill>
+              <a:latin typeface="Calibri"/>
+            </a:endParaRPr>
+          </a:p>
+        </p:txBody>
+      </p:sp>
+      <p:sp>
+        <p:nvSpPr>
+          <p:cNvPr id="4" name="Slide Number Placeholder 3"/>
+          <p:cNvSpPr>
+            <a:spLocks noGrp="1"/>
+          </p:cNvSpPr>
+          <p:nvPr>
+            <p:ph type="sldNum" sz="quarter" idx="12"/>
+          </p:nvPr>
+        </p:nvSpPr>
+        <p:spPr/>
+        <p:txBody>
+          <a:bodyPr/>
+          <a:lstStyle/>
+          <a:p>
+            <a:fld id="{0C6BB7FD-57BC-BF44-AE3F-8E441ADAAD8D}" type="slidenum">
+              <a:rPr lang="en-US" smtClean="0">
+                <a:solidFill>
+                  <a:prstClr val="black">
+                    <a:tint val="75000"/>
+                  </a:prstClr>
+                </a:solidFill>
+                <a:latin typeface="Calibri"/>
+              </a:rPr>
+              <a:pPr/>
+              <a:t>‹#›</a:t>
+            </a:fld>
+            <a:endParaRPr lang="en-US">
+              <a:solidFill>
+                <a:prstClr val="black">
+                  <a:tint val="75000"/>
+                </a:prstClr>
+              </a:solidFill>
+              <a:latin typeface="Calibri"/>
+            </a:endParaRPr>
+          </a:p>
+        </p:txBody>
+      </p:sp>
+    </p:spTree>
+    <p:extLst>
+      <p:ext uri="{BB962C8B-B14F-4D97-AF65-F5344CB8AC3E}">
+        <p14:creationId xmlns:p14="http://schemas.microsoft.com/office/powerpoint/2010/main" val="2263255590"/>
+      </p:ext>
+    </p:extLst>
+  </p:cSld>
+  <p:clrMapOvr>
+    <a:masterClrMapping/>
+  </p:clrMapOvr>
+</p:sldLayout>
+</file>
+
+<file path=ppt/slideLayouts/slideLayout43.xml><?xml version="1.0" encoding="utf-8"?>
+<p:sldLayout xmlns:a="http://schemas.openxmlformats.org/drawingml/2006/main" xmlns:r="http://schemas.openxmlformats.org/officeDocument/2006/relationships" xmlns:p="http://schemas.openxmlformats.org/presentationml/2006/main" type="objTx" preserve="1">
+  <p:cSld name="Content with Caption">
+    <p:spTree>
+      <p:nvGrpSpPr>
+        <p:cNvPr id="1" name=""/>
+        <p:cNvGrpSpPr/>
+        <p:nvPr/>
+      </p:nvGrpSpPr>
+      <p:grpSpPr>
+        <a:xfrm>
+          <a:off x="0" y="0"/>
+          <a:ext cx="0" cy="0"/>
+          <a:chOff x="0" y="0"/>
+          <a:chExt cx="0" cy="0"/>
+        </a:xfrm>
+      </p:grpSpPr>
+      <p:sp>
+        <p:nvSpPr>
+          <p:cNvPr id="2" name="Title 1"/>
+          <p:cNvSpPr>
+            <a:spLocks noGrp="1"/>
+          </p:cNvSpPr>
+          <p:nvPr>
+            <p:ph type="title"/>
+          </p:nvPr>
+        </p:nvSpPr>
+        <p:spPr>
+          <a:xfrm>
+            <a:off x="96921" y="43296"/>
+            <a:ext cx="637700" cy="184260"/>
+          </a:xfrm>
+        </p:spPr>
+        <p:txBody>
+          <a:bodyPr anchor="b"/>
+          <a:lstStyle>
+            <a:lvl1pPr algn="l">
+              <a:defRPr sz="400" b="1"/>
+            </a:lvl1pPr>
+          </a:lstStyle>
+          <a:p>
+            <a:r>
+              <a:rPr lang="en-US" smtClean="0"/>
+              <a:t>Click to edit Master title style</a:t>
+            </a:r>
+            <a:endParaRPr lang="en-US"/>
+          </a:p>
+        </p:txBody>
+      </p:sp>
+      <p:sp>
+        <p:nvSpPr>
+          <p:cNvPr id="3" name="Content Placeholder 2"/>
+          <p:cNvSpPr>
+            <a:spLocks noGrp="1"/>
+          </p:cNvSpPr>
+          <p:nvPr>
+            <p:ph idx="1"/>
+          </p:nvPr>
+        </p:nvSpPr>
+        <p:spPr>
+          <a:xfrm>
+            <a:off x="757840" y="43297"/>
+            <a:ext cx="1083585" cy="928098"/>
+          </a:xfrm>
+        </p:spPr>
+        <p:txBody>
+          <a:bodyPr/>
+          <a:lstStyle>
+            <a:lvl1pPr>
+              <a:defRPr sz="700"/>
+            </a:lvl1pPr>
+            <a:lvl2pPr>
+              <a:defRPr sz="600"/>
+            </a:lvl2pPr>
+            <a:lvl3pPr>
+              <a:defRPr sz="500"/>
+            </a:lvl3pPr>
+            <a:lvl4pPr>
+              <a:defRPr sz="400"/>
+            </a:lvl4pPr>
+            <a:lvl5pPr>
+              <a:defRPr sz="400"/>
+            </a:lvl5pPr>
+            <a:lvl6pPr>
+              <a:defRPr sz="400"/>
+            </a:lvl6pPr>
+            <a:lvl7pPr>
+              <a:defRPr sz="400"/>
+            </a:lvl7pPr>
+            <a:lvl8pPr>
+              <a:defRPr sz="400"/>
+            </a:lvl8pPr>
+            <a:lvl9pPr>
+              <a:defRPr sz="400"/>
+            </a:lvl9pPr>
+          </a:lstStyle>
+          <a:p>
+            <a:pPr lvl="0"/>
+            <a:r>
+              <a:rPr lang="en-US" smtClean="0"/>
+              <a:t>Click to edit Master text styles</a:t>
+            </a:r>
+          </a:p>
+          <a:p>
+            <a:pPr lvl="1"/>
+            <a:r>
+              <a:rPr lang="en-US" smtClean="0"/>
+              <a:t>Second level</a:t>
+            </a:r>
+          </a:p>
+          <a:p>
+            <a:pPr lvl="2"/>
+            <a:r>
+              <a:rPr lang="en-US" smtClean="0"/>
+              <a:t>Third level</a:t>
+            </a:r>
+          </a:p>
+          <a:p>
+            <a:pPr lvl="3"/>
+            <a:r>
+              <a:rPr lang="en-US" smtClean="0"/>
+              <a:t>Fourth level</a:t>
+            </a:r>
+          </a:p>
+          <a:p>
+            <a:pPr lvl="4"/>
+            <a:r>
+              <a:rPr lang="en-US" smtClean="0"/>
+              <a:t>Fifth level</a:t>
+            </a:r>
+            <a:endParaRPr lang="en-US"/>
+          </a:p>
+        </p:txBody>
+      </p:sp>
+      <p:sp>
+        <p:nvSpPr>
+          <p:cNvPr id="4" name="Text Placeholder 3"/>
+          <p:cNvSpPr>
+            <a:spLocks noGrp="1"/>
+          </p:cNvSpPr>
+          <p:nvPr>
+            <p:ph type="body" sz="half" idx="2"/>
+          </p:nvPr>
+        </p:nvSpPr>
+        <p:spPr>
+          <a:xfrm>
+            <a:off x="96921" y="227557"/>
+            <a:ext cx="637700" cy="743838"/>
+          </a:xfrm>
+        </p:spPr>
+        <p:txBody>
+          <a:bodyPr/>
+          <a:lstStyle>
+            <a:lvl1pPr marL="0" indent="0">
+              <a:buNone/>
+              <a:defRPr sz="300"/>
+            </a:lvl1pPr>
+            <a:lvl2pPr marL="96641" indent="0">
+              <a:buNone/>
+              <a:defRPr sz="300"/>
+            </a:lvl2pPr>
+            <a:lvl3pPr marL="193280" indent="0">
+              <a:buNone/>
+              <a:defRPr sz="300"/>
+            </a:lvl3pPr>
+            <a:lvl4pPr marL="289922" indent="0">
+              <a:buNone/>
+              <a:defRPr sz="200"/>
+            </a:lvl4pPr>
+            <a:lvl5pPr marL="386557" indent="0">
+              <a:buNone/>
+              <a:defRPr sz="200"/>
+            </a:lvl5pPr>
+            <a:lvl6pPr marL="483197" indent="0">
+              <a:buNone/>
+              <a:defRPr sz="200"/>
+            </a:lvl6pPr>
+            <a:lvl7pPr marL="579838" indent="0">
+              <a:buNone/>
+              <a:defRPr sz="200"/>
+            </a:lvl7pPr>
+            <a:lvl8pPr marL="676477" indent="0">
+              <a:buNone/>
+              <a:defRPr sz="200"/>
+            </a:lvl8pPr>
+            <a:lvl9pPr marL="773119" indent="0">
+              <a:buNone/>
+              <a:defRPr sz="200"/>
+            </a:lvl9pPr>
+          </a:lstStyle>
+          <a:p>
+            <a:pPr lvl="0"/>
+            <a:r>
+              <a:rPr lang="en-US" smtClean="0"/>
+              <a:t>Click to edit Master text styles</a:t>
+            </a:r>
+          </a:p>
+        </p:txBody>
+      </p:sp>
+      <p:sp>
+        <p:nvSpPr>
+          <p:cNvPr id="5" name="Date Placeholder 4"/>
+          <p:cNvSpPr>
+            <a:spLocks noGrp="1"/>
+          </p:cNvSpPr>
+          <p:nvPr>
+            <p:ph type="dt" sz="half" idx="10"/>
+          </p:nvPr>
+        </p:nvSpPr>
+        <p:spPr/>
+        <p:txBody>
+          <a:bodyPr/>
+          <a:lstStyle/>
+          <a:p>
+            <a:fld id="{34C6AA67-E7EC-BD42-94FC-5443D25F9C23}" type="datetimeFigureOut">
+              <a:rPr lang="en-US" smtClean="0">
+                <a:solidFill>
+                  <a:prstClr val="black">
+                    <a:tint val="75000"/>
+                  </a:prstClr>
+                </a:solidFill>
+                <a:latin typeface="Calibri"/>
+              </a:rPr>
+              <a:pPr/>
+              <a:t>8/5/13</a:t>
+            </a:fld>
+            <a:endParaRPr lang="en-US">
+              <a:solidFill>
+                <a:prstClr val="black">
+                  <a:tint val="75000"/>
+                </a:prstClr>
+              </a:solidFill>
+              <a:latin typeface="Calibri"/>
+            </a:endParaRPr>
+          </a:p>
+        </p:txBody>
+      </p:sp>
+      <p:sp>
+        <p:nvSpPr>
+          <p:cNvPr id="6" name="Footer Placeholder 5"/>
+          <p:cNvSpPr>
+            <a:spLocks noGrp="1"/>
+          </p:cNvSpPr>
+          <p:nvPr>
+            <p:ph type="ftr" sz="quarter" idx="11"/>
+          </p:nvPr>
+        </p:nvSpPr>
+        <p:spPr/>
+        <p:txBody>
+          <a:bodyPr/>
+          <a:lstStyle/>
+          <a:p>
+            <a:endParaRPr lang="en-US">
+              <a:solidFill>
+                <a:prstClr val="black">
+                  <a:tint val="75000"/>
+                </a:prstClr>
+              </a:solidFill>
+              <a:latin typeface="Calibri"/>
+            </a:endParaRPr>
+          </a:p>
+        </p:txBody>
+      </p:sp>
+      <p:sp>
+        <p:nvSpPr>
+          <p:cNvPr id="7" name="Slide Number Placeholder 6"/>
+          <p:cNvSpPr>
+            <a:spLocks noGrp="1"/>
+          </p:cNvSpPr>
+          <p:nvPr>
+            <p:ph type="sldNum" sz="quarter" idx="12"/>
+          </p:nvPr>
+        </p:nvSpPr>
+        <p:spPr/>
+        <p:txBody>
+          <a:bodyPr/>
+          <a:lstStyle/>
+          <a:p>
+            <a:fld id="{0C6BB7FD-57BC-BF44-AE3F-8E441ADAAD8D}" type="slidenum">
+              <a:rPr lang="en-US" smtClean="0">
+                <a:solidFill>
+                  <a:prstClr val="black">
+                    <a:tint val="75000"/>
+                  </a:prstClr>
+                </a:solidFill>
+                <a:latin typeface="Calibri"/>
+              </a:rPr>
+              <a:pPr/>
+              <a:t>‹#›</a:t>
+            </a:fld>
+            <a:endParaRPr lang="en-US">
+              <a:solidFill>
+                <a:prstClr val="black">
+                  <a:tint val="75000"/>
+                </a:prstClr>
+              </a:solidFill>
+              <a:latin typeface="Calibri"/>
+            </a:endParaRPr>
+          </a:p>
+        </p:txBody>
+      </p:sp>
+    </p:spTree>
+    <p:extLst>
+      <p:ext uri="{BB962C8B-B14F-4D97-AF65-F5344CB8AC3E}">
+        <p14:creationId xmlns:p14="http://schemas.microsoft.com/office/powerpoint/2010/main" val="3869601476"/>
+      </p:ext>
+    </p:extLst>
+  </p:cSld>
+  <p:clrMapOvr>
+    <a:masterClrMapping/>
+  </p:clrMapOvr>
+</p:sldLayout>
+</file>
+
+<file path=ppt/slideLayouts/slideLayout44.xml><?xml version="1.0" encoding="utf-8"?>
+<p:sldLayout xmlns:a="http://schemas.openxmlformats.org/drawingml/2006/main" xmlns:r="http://schemas.openxmlformats.org/officeDocument/2006/relationships" xmlns:p="http://schemas.openxmlformats.org/presentationml/2006/main" type="picTx" preserve="1">
+  <p:cSld name="Picture with Caption">
+    <p:spTree>
+      <p:nvGrpSpPr>
+        <p:cNvPr id="1" name=""/>
+        <p:cNvGrpSpPr/>
+        <p:nvPr/>
+      </p:nvGrpSpPr>
+      <p:grpSpPr>
+        <a:xfrm>
+          <a:off x="0" y="0"/>
+          <a:ext cx="0" cy="0"/>
+          <a:chOff x="0" y="0"/>
+          <a:chExt cx="0" cy="0"/>
+        </a:xfrm>
+      </p:grpSpPr>
+      <p:sp>
+        <p:nvSpPr>
+          <p:cNvPr id="2" name="Title 1"/>
+          <p:cNvSpPr>
+            <a:spLocks noGrp="1"/>
+          </p:cNvSpPr>
+          <p:nvPr>
+            <p:ph type="title"/>
+          </p:nvPr>
+        </p:nvSpPr>
+        <p:spPr>
+          <a:xfrm>
+            <a:off x="379932" y="761211"/>
+            <a:ext cx="1163003" cy="89865"/>
+          </a:xfrm>
+        </p:spPr>
+        <p:txBody>
+          <a:bodyPr anchor="b"/>
+          <a:lstStyle>
+            <a:lvl1pPr algn="l">
+              <a:defRPr sz="400" b="1"/>
+            </a:lvl1pPr>
+          </a:lstStyle>
+          <a:p>
+            <a:r>
+              <a:rPr lang="en-US" smtClean="0"/>
+              <a:t>Click to edit Master title style</a:t>
+            </a:r>
+            <a:endParaRPr lang="en-US"/>
+          </a:p>
+        </p:txBody>
+      </p:sp>
+      <p:sp>
+        <p:nvSpPr>
+          <p:cNvPr id="3" name="Picture Placeholder 2"/>
+          <p:cNvSpPr>
+            <a:spLocks noGrp="1"/>
+          </p:cNvSpPr>
+          <p:nvPr>
+            <p:ph type="pic" idx="1"/>
+          </p:nvPr>
+        </p:nvSpPr>
+        <p:spPr>
+          <a:xfrm>
+            <a:off x="379932" y="97169"/>
+            <a:ext cx="1163003" cy="652463"/>
+          </a:xfrm>
+        </p:spPr>
+        <p:txBody>
+          <a:bodyPr/>
+          <a:lstStyle>
+            <a:lvl1pPr marL="0" indent="0">
+              <a:buNone/>
+              <a:defRPr sz="700"/>
+            </a:lvl1pPr>
+            <a:lvl2pPr marL="96641" indent="0">
+              <a:buNone/>
+              <a:defRPr sz="600"/>
+            </a:lvl2pPr>
+            <a:lvl3pPr marL="193280" indent="0">
+              <a:buNone/>
+              <a:defRPr sz="500"/>
+            </a:lvl3pPr>
+            <a:lvl4pPr marL="289922" indent="0">
+              <a:buNone/>
+              <a:defRPr sz="400"/>
+            </a:lvl4pPr>
+            <a:lvl5pPr marL="386557" indent="0">
+              <a:buNone/>
+              <a:defRPr sz="400"/>
+            </a:lvl5pPr>
+            <a:lvl6pPr marL="483197" indent="0">
+              <a:buNone/>
+              <a:defRPr sz="400"/>
+            </a:lvl6pPr>
+            <a:lvl7pPr marL="579838" indent="0">
+              <a:buNone/>
+              <a:defRPr sz="400"/>
+            </a:lvl7pPr>
+            <a:lvl8pPr marL="676477" indent="0">
+              <a:buNone/>
+              <a:defRPr sz="400"/>
+            </a:lvl8pPr>
+            <a:lvl9pPr marL="773119" indent="0">
+              <a:buNone/>
+              <a:defRPr sz="400"/>
+            </a:lvl9pPr>
+          </a:lstStyle>
+          <a:p>
+            <a:endParaRPr lang="en-US"/>
+          </a:p>
+        </p:txBody>
+      </p:sp>
+      <p:sp>
+        <p:nvSpPr>
+          <p:cNvPr id="4" name="Text Placeholder 3"/>
+          <p:cNvSpPr>
+            <a:spLocks noGrp="1"/>
+          </p:cNvSpPr>
+          <p:nvPr>
+            <p:ph type="body" sz="half" idx="2"/>
+          </p:nvPr>
+        </p:nvSpPr>
+        <p:spPr>
+          <a:xfrm>
+            <a:off x="379932" y="851075"/>
+            <a:ext cx="1163003" cy="127623"/>
+          </a:xfrm>
+        </p:spPr>
+        <p:txBody>
+          <a:bodyPr/>
+          <a:lstStyle>
+            <a:lvl1pPr marL="0" indent="0">
+              <a:buNone/>
+              <a:defRPr sz="300"/>
+            </a:lvl1pPr>
+            <a:lvl2pPr marL="96641" indent="0">
+              <a:buNone/>
+              <a:defRPr sz="300"/>
+            </a:lvl2pPr>
+            <a:lvl3pPr marL="193280" indent="0">
+              <a:buNone/>
+              <a:defRPr sz="300"/>
+            </a:lvl3pPr>
+            <a:lvl4pPr marL="289922" indent="0">
+              <a:buNone/>
+              <a:defRPr sz="200"/>
+            </a:lvl4pPr>
+            <a:lvl5pPr marL="386557" indent="0">
+              <a:buNone/>
+              <a:defRPr sz="200"/>
+            </a:lvl5pPr>
+            <a:lvl6pPr marL="483197" indent="0">
+              <a:buNone/>
+              <a:defRPr sz="200"/>
+            </a:lvl6pPr>
+            <a:lvl7pPr marL="579838" indent="0">
+              <a:buNone/>
+              <a:defRPr sz="200"/>
+            </a:lvl7pPr>
+            <a:lvl8pPr marL="676477" indent="0">
+              <a:buNone/>
+              <a:defRPr sz="200"/>
+            </a:lvl8pPr>
+            <a:lvl9pPr marL="773119" indent="0">
+              <a:buNone/>
+              <a:defRPr sz="200"/>
+            </a:lvl9pPr>
+          </a:lstStyle>
+          <a:p>
+            <a:pPr lvl="0"/>
+            <a:r>
+              <a:rPr lang="en-US" smtClean="0"/>
+              <a:t>Click to edit Master text styles</a:t>
+            </a:r>
+          </a:p>
+        </p:txBody>
+      </p:sp>
+      <p:sp>
+        <p:nvSpPr>
+          <p:cNvPr id="5" name="Date Placeholder 4"/>
+          <p:cNvSpPr>
+            <a:spLocks noGrp="1"/>
+          </p:cNvSpPr>
+          <p:nvPr>
+            <p:ph type="dt" sz="half" idx="10"/>
+          </p:nvPr>
+        </p:nvSpPr>
+        <p:spPr/>
+        <p:txBody>
+          <a:bodyPr/>
+          <a:lstStyle/>
+          <a:p>
+            <a:fld id="{34C6AA67-E7EC-BD42-94FC-5443D25F9C23}" type="datetimeFigureOut">
+              <a:rPr lang="en-US" smtClean="0">
+                <a:solidFill>
+                  <a:prstClr val="black">
+                    <a:tint val="75000"/>
+                  </a:prstClr>
+                </a:solidFill>
+                <a:latin typeface="Calibri"/>
+              </a:rPr>
+              <a:pPr/>
+              <a:t>8/5/13</a:t>
+            </a:fld>
+            <a:endParaRPr lang="en-US">
+              <a:solidFill>
+                <a:prstClr val="black">
+                  <a:tint val="75000"/>
+                </a:prstClr>
+              </a:solidFill>
+              <a:latin typeface="Calibri"/>
+            </a:endParaRPr>
+          </a:p>
+        </p:txBody>
+      </p:sp>
+      <p:sp>
+        <p:nvSpPr>
+          <p:cNvPr id="6" name="Footer Placeholder 5"/>
+          <p:cNvSpPr>
+            <a:spLocks noGrp="1"/>
+          </p:cNvSpPr>
+          <p:nvPr>
+            <p:ph type="ftr" sz="quarter" idx="11"/>
+          </p:nvPr>
+        </p:nvSpPr>
+        <p:spPr/>
+        <p:txBody>
+          <a:bodyPr/>
+          <a:lstStyle/>
+          <a:p>
+            <a:endParaRPr lang="en-US">
+              <a:solidFill>
+                <a:prstClr val="black">
+                  <a:tint val="75000"/>
+                </a:prstClr>
+              </a:solidFill>
+              <a:latin typeface="Calibri"/>
+            </a:endParaRPr>
+          </a:p>
+        </p:txBody>
+      </p:sp>
+      <p:sp>
+        <p:nvSpPr>
+          <p:cNvPr id="7" name="Slide Number Placeholder 6"/>
+          <p:cNvSpPr>
+            <a:spLocks noGrp="1"/>
+          </p:cNvSpPr>
+          <p:nvPr>
+            <p:ph type="sldNum" sz="quarter" idx="12"/>
+          </p:nvPr>
+        </p:nvSpPr>
+        <p:spPr/>
+        <p:txBody>
+          <a:bodyPr/>
+          <a:lstStyle/>
+          <a:p>
+            <a:fld id="{0C6BB7FD-57BC-BF44-AE3F-8E441ADAAD8D}" type="slidenum">
+              <a:rPr lang="en-US" smtClean="0">
+                <a:solidFill>
+                  <a:prstClr val="black">
+                    <a:tint val="75000"/>
+                  </a:prstClr>
+                </a:solidFill>
+                <a:latin typeface="Calibri"/>
+              </a:rPr>
+              <a:pPr/>
+              <a:t>‹#›</a:t>
+            </a:fld>
+            <a:endParaRPr lang="en-US">
+              <a:solidFill>
+                <a:prstClr val="black">
+                  <a:tint val="75000"/>
+                </a:prstClr>
+              </a:solidFill>
+              <a:latin typeface="Calibri"/>
+            </a:endParaRPr>
+          </a:p>
+        </p:txBody>
+      </p:sp>
+    </p:spTree>
+    <p:extLst>
+      <p:ext uri="{BB962C8B-B14F-4D97-AF65-F5344CB8AC3E}">
+        <p14:creationId xmlns:p14="http://schemas.microsoft.com/office/powerpoint/2010/main" val="3157048002"/>
+      </p:ext>
+    </p:extLst>
+  </p:cSld>
+  <p:clrMapOvr>
+    <a:masterClrMapping/>
+  </p:clrMapOvr>
+</p:sldLayout>
+</file>
+
+<file path=ppt/slideLayouts/slideLayout45.xml><?xml version="1.0" encoding="utf-8"?>
+<p:sldLayout xmlns:a="http://schemas.openxmlformats.org/drawingml/2006/main" xmlns:r="http://schemas.openxmlformats.org/officeDocument/2006/relationships" xmlns:p="http://schemas.openxmlformats.org/presentationml/2006/main" type="vertTx" preserve="1">
+  <p:cSld name="Title and Vertical Text">
+    <p:spTree>
+      <p:nvGrpSpPr>
+        <p:cNvPr id="1" name=""/>
+        <p:cNvGrpSpPr/>
+        <p:nvPr/>
+      </p:nvGrpSpPr>
+      <p:grpSpPr>
+        <a:xfrm>
+          <a:off x="0" y="0"/>
+          <a:ext cx="0" cy="0"/>
+          <a:chOff x="0" y="0"/>
+          <a:chExt cx="0" cy="0"/>
+        </a:xfrm>
+      </p:grpSpPr>
+      <p:sp>
+        <p:nvSpPr>
+          <p:cNvPr id="2" name="Title 1"/>
+          <p:cNvSpPr>
+            <a:spLocks noGrp="1"/>
+          </p:cNvSpPr>
+          <p:nvPr>
+            <p:ph type="title"/>
+          </p:nvPr>
+        </p:nvSpPr>
+        <p:spPr/>
+        <p:txBody>
+          <a:bodyPr/>
+          <a:lstStyle/>
+          <a:p>
+            <a:r>
+              <a:rPr lang="en-US" smtClean="0"/>
+              <a:t>Click to edit Master title style</a:t>
+            </a:r>
+            <a:endParaRPr lang="en-US"/>
+          </a:p>
+        </p:txBody>
+      </p:sp>
+      <p:sp>
+        <p:nvSpPr>
+          <p:cNvPr id="3" name="Vertical Text Placeholder 2"/>
+          <p:cNvSpPr>
+            <a:spLocks noGrp="1"/>
+          </p:cNvSpPr>
+          <p:nvPr>
+            <p:ph type="body" orient="vert" idx="1"/>
+          </p:nvPr>
+        </p:nvSpPr>
+        <p:spPr/>
+        <p:txBody>
+          <a:bodyPr vert="eaVert"/>
+          <a:lstStyle/>
+          <a:p>
+            <a:pPr lvl="0"/>
+            <a:r>
+              <a:rPr lang="en-US" smtClean="0"/>
+              <a:t>Click to edit Master text styles</a:t>
+            </a:r>
+          </a:p>
+          <a:p>
+            <a:pPr lvl="1"/>
+            <a:r>
+              <a:rPr lang="en-US" smtClean="0"/>
+              <a:t>Second level</a:t>
+            </a:r>
+          </a:p>
+          <a:p>
+            <a:pPr lvl="2"/>
+            <a:r>
+              <a:rPr lang="en-US" smtClean="0"/>
+              <a:t>Third level</a:t>
+            </a:r>
+          </a:p>
+          <a:p>
+            <a:pPr lvl="3"/>
+            <a:r>
+              <a:rPr lang="en-US" smtClean="0"/>
+              <a:t>Fourth level</a:t>
+            </a:r>
+          </a:p>
+          <a:p>
+            <a:pPr lvl="4"/>
+            <a:r>
+              <a:rPr lang="en-US" smtClean="0"/>
+              <a:t>Fifth level</a:t>
+            </a:r>
+            <a:endParaRPr lang="en-US"/>
+          </a:p>
+        </p:txBody>
+      </p:sp>
+      <p:sp>
+        <p:nvSpPr>
+          <p:cNvPr id="4" name="Date Placeholder 3"/>
+          <p:cNvSpPr>
+            <a:spLocks noGrp="1"/>
+          </p:cNvSpPr>
+          <p:nvPr>
+            <p:ph type="dt" sz="half" idx="10"/>
+          </p:nvPr>
+        </p:nvSpPr>
+        <p:spPr/>
+        <p:txBody>
+          <a:bodyPr/>
+          <a:lstStyle/>
+          <a:p>
+            <a:fld id="{34C6AA67-E7EC-BD42-94FC-5443D25F9C23}" type="datetimeFigureOut">
+              <a:rPr lang="en-US" smtClean="0">
+                <a:solidFill>
+                  <a:prstClr val="black">
+                    <a:tint val="75000"/>
+                  </a:prstClr>
+                </a:solidFill>
+                <a:latin typeface="Calibri"/>
+              </a:rPr>
+              <a:pPr/>
+              <a:t>8/5/13</a:t>
+            </a:fld>
+            <a:endParaRPr lang="en-US">
+              <a:solidFill>
+                <a:prstClr val="black">
+                  <a:tint val="75000"/>
+                </a:prstClr>
+              </a:solidFill>
+              <a:latin typeface="Calibri"/>
+            </a:endParaRPr>
+          </a:p>
+        </p:txBody>
+      </p:sp>
+      <p:sp>
+        <p:nvSpPr>
+          <p:cNvPr id="5" name="Footer Placeholder 4"/>
+          <p:cNvSpPr>
+            <a:spLocks noGrp="1"/>
+          </p:cNvSpPr>
+          <p:nvPr>
+            <p:ph type="ftr" sz="quarter" idx="11"/>
+          </p:nvPr>
+        </p:nvSpPr>
+        <p:spPr/>
+        <p:txBody>
+          <a:bodyPr/>
+          <a:lstStyle/>
+          <a:p>
+            <a:endParaRPr lang="en-US">
+              <a:solidFill>
+                <a:prstClr val="black">
+                  <a:tint val="75000"/>
+                </a:prstClr>
+              </a:solidFill>
+              <a:latin typeface="Calibri"/>
+            </a:endParaRPr>
+          </a:p>
+        </p:txBody>
+      </p:sp>
+      <p:sp>
+        <p:nvSpPr>
+          <p:cNvPr id="6" name="Slide Number Placeholder 5"/>
+          <p:cNvSpPr>
+            <a:spLocks noGrp="1"/>
+          </p:cNvSpPr>
+          <p:nvPr>
+            <p:ph type="sldNum" sz="quarter" idx="12"/>
+          </p:nvPr>
+        </p:nvSpPr>
+        <p:spPr/>
+        <p:txBody>
+          <a:bodyPr/>
+          <a:lstStyle/>
+          <a:p>
+            <a:fld id="{0C6BB7FD-57BC-BF44-AE3F-8E441ADAAD8D}" type="slidenum">
+              <a:rPr lang="en-US" smtClean="0">
+                <a:solidFill>
+                  <a:prstClr val="black">
+                    <a:tint val="75000"/>
+                  </a:prstClr>
+                </a:solidFill>
+                <a:latin typeface="Calibri"/>
+              </a:rPr>
+              <a:pPr/>
+              <a:t>‹#›</a:t>
+            </a:fld>
+            <a:endParaRPr lang="en-US">
+              <a:solidFill>
+                <a:prstClr val="black">
+                  <a:tint val="75000"/>
+                </a:prstClr>
+              </a:solidFill>
+              <a:latin typeface="Calibri"/>
+            </a:endParaRPr>
+          </a:p>
+        </p:txBody>
+      </p:sp>
+    </p:spTree>
+    <p:extLst>
+      <p:ext uri="{BB962C8B-B14F-4D97-AF65-F5344CB8AC3E}">
+        <p14:creationId xmlns:p14="http://schemas.microsoft.com/office/powerpoint/2010/main" val="1863372559"/>
+      </p:ext>
+    </p:extLst>
+  </p:cSld>
+  <p:clrMapOvr>
+    <a:masterClrMapping/>
+  </p:clrMapOvr>
+</p:sldLayout>
+</file>
+
+<file path=ppt/slideLayouts/slideLayout46.xml><?xml version="1.0" encoding="utf-8"?>
+<p:sldLayout xmlns:a="http://schemas.openxmlformats.org/drawingml/2006/main" xmlns:r="http://schemas.openxmlformats.org/officeDocument/2006/relationships" xmlns:p="http://schemas.openxmlformats.org/presentationml/2006/main" type="vertTitleAndTx" preserve="1">
+  <p:cSld name="Vertical Title and Text">
+    <p:spTree>
+      <p:nvGrpSpPr>
+        <p:cNvPr id="1" name=""/>
+        <p:cNvGrpSpPr/>
+        <p:nvPr/>
+      </p:nvGrpSpPr>
+      <p:grpSpPr>
+        <a:xfrm>
+          <a:off x="0" y="0"/>
+          <a:ext cx="0" cy="0"/>
+          <a:chOff x="0" y="0"/>
+          <a:chExt cx="0" cy="0"/>
+        </a:xfrm>
+      </p:grpSpPr>
+      <p:sp>
+        <p:nvSpPr>
+          <p:cNvPr id="2" name="Vertical Title 1"/>
+          <p:cNvSpPr>
+            <a:spLocks noGrp="1"/>
+          </p:cNvSpPr>
+          <p:nvPr>
+            <p:ph type="title" orient="vert"/>
+          </p:nvPr>
+        </p:nvSpPr>
+        <p:spPr>
+          <a:xfrm>
+            <a:off x="1405295" y="43554"/>
+            <a:ext cx="436126" cy="927847"/>
+          </a:xfrm>
+        </p:spPr>
+        <p:txBody>
+          <a:bodyPr vert="eaVert"/>
+          <a:lstStyle/>
+          <a:p>
+            <a:r>
+              <a:rPr lang="en-US" smtClean="0"/>
+              <a:t>Click to edit Master title style</a:t>
+            </a:r>
+            <a:endParaRPr lang="en-US"/>
+          </a:p>
+        </p:txBody>
+      </p:sp>
+      <p:sp>
+        <p:nvSpPr>
+          <p:cNvPr id="3" name="Vertical Text Placeholder 2"/>
+          <p:cNvSpPr>
+            <a:spLocks noGrp="1"/>
+          </p:cNvSpPr>
+          <p:nvPr>
+            <p:ph type="body" orient="vert" idx="1"/>
+          </p:nvPr>
+        </p:nvSpPr>
+        <p:spPr>
+          <a:xfrm>
+            <a:off x="96919" y="43554"/>
+            <a:ext cx="1276073" cy="927847"/>
+          </a:xfrm>
+        </p:spPr>
+        <p:txBody>
+          <a:bodyPr vert="eaVert"/>
+          <a:lstStyle/>
+          <a:p>
+            <a:pPr lvl="0"/>
+            <a:r>
+              <a:rPr lang="en-US" smtClean="0"/>
+              <a:t>Click to edit Master text styles</a:t>
+            </a:r>
+          </a:p>
+          <a:p>
+            <a:pPr lvl="1"/>
+            <a:r>
+              <a:rPr lang="en-US" smtClean="0"/>
+              <a:t>Second level</a:t>
+            </a:r>
+          </a:p>
+          <a:p>
+            <a:pPr lvl="2"/>
+            <a:r>
+              <a:rPr lang="en-US" smtClean="0"/>
+              <a:t>Third level</a:t>
+            </a:r>
+          </a:p>
+          <a:p>
+            <a:pPr lvl="3"/>
+            <a:r>
+              <a:rPr lang="en-US" smtClean="0"/>
+              <a:t>Fourth level</a:t>
+            </a:r>
+          </a:p>
+          <a:p>
+            <a:pPr lvl="4"/>
+            <a:r>
+              <a:rPr lang="en-US" smtClean="0"/>
+              <a:t>Fifth level</a:t>
+            </a:r>
+            <a:endParaRPr lang="en-US"/>
+          </a:p>
+        </p:txBody>
+      </p:sp>
+      <p:sp>
+        <p:nvSpPr>
+          <p:cNvPr id="4" name="Date Placeholder 3"/>
+          <p:cNvSpPr>
+            <a:spLocks noGrp="1"/>
+          </p:cNvSpPr>
+          <p:nvPr>
+            <p:ph type="dt" sz="half" idx="10"/>
+          </p:nvPr>
+        </p:nvSpPr>
+        <p:spPr/>
+        <p:txBody>
+          <a:bodyPr/>
+          <a:lstStyle/>
+          <a:p>
+            <a:fld id="{34C6AA67-E7EC-BD42-94FC-5443D25F9C23}" type="datetimeFigureOut">
+              <a:rPr lang="en-US" smtClean="0">
+                <a:solidFill>
+                  <a:prstClr val="black">
+                    <a:tint val="75000"/>
+                  </a:prstClr>
+                </a:solidFill>
+                <a:latin typeface="Calibri"/>
+              </a:rPr>
+              <a:pPr/>
+              <a:t>8/5/13</a:t>
+            </a:fld>
+            <a:endParaRPr lang="en-US">
+              <a:solidFill>
+                <a:prstClr val="black">
+                  <a:tint val="75000"/>
+                </a:prstClr>
+              </a:solidFill>
+              <a:latin typeface="Calibri"/>
+            </a:endParaRPr>
+          </a:p>
+        </p:txBody>
+      </p:sp>
+      <p:sp>
+        <p:nvSpPr>
+          <p:cNvPr id="5" name="Footer Placeholder 4"/>
+          <p:cNvSpPr>
+            <a:spLocks noGrp="1"/>
+          </p:cNvSpPr>
+          <p:nvPr>
+            <p:ph type="ftr" sz="quarter" idx="11"/>
+          </p:nvPr>
+        </p:nvSpPr>
+        <p:spPr/>
+        <p:txBody>
+          <a:bodyPr/>
+          <a:lstStyle/>
+          <a:p>
+            <a:endParaRPr lang="en-US">
+              <a:solidFill>
+                <a:prstClr val="black">
+                  <a:tint val="75000"/>
+                </a:prstClr>
+              </a:solidFill>
+              <a:latin typeface="Calibri"/>
+            </a:endParaRPr>
+          </a:p>
+        </p:txBody>
+      </p:sp>
+      <p:sp>
+        <p:nvSpPr>
+          <p:cNvPr id="6" name="Slide Number Placeholder 5"/>
+          <p:cNvSpPr>
+            <a:spLocks noGrp="1"/>
+          </p:cNvSpPr>
+          <p:nvPr>
+            <p:ph type="sldNum" sz="quarter" idx="12"/>
+          </p:nvPr>
+        </p:nvSpPr>
+        <p:spPr/>
+        <p:txBody>
+          <a:bodyPr/>
+          <a:lstStyle/>
+          <a:p>
+            <a:fld id="{0C6BB7FD-57BC-BF44-AE3F-8E441ADAAD8D}" type="slidenum">
+              <a:rPr lang="en-US" smtClean="0">
+                <a:solidFill>
+                  <a:prstClr val="black">
+                    <a:tint val="75000"/>
+                  </a:prstClr>
+                </a:solidFill>
+                <a:latin typeface="Calibri"/>
+              </a:rPr>
+              <a:pPr/>
+              <a:t>‹#›</a:t>
+            </a:fld>
+            <a:endParaRPr lang="en-US">
+              <a:solidFill>
+                <a:prstClr val="black">
+                  <a:tint val="75000"/>
+                </a:prstClr>
+              </a:solidFill>
+              <a:latin typeface="Calibri"/>
+            </a:endParaRPr>
+          </a:p>
+        </p:txBody>
+      </p:sp>
+    </p:spTree>
+    <p:extLst>
+      <p:ext uri="{BB962C8B-B14F-4D97-AF65-F5344CB8AC3E}">
+        <p14:creationId xmlns:p14="http://schemas.microsoft.com/office/powerpoint/2010/main" val="3659431030"/>
+      </p:ext>
+    </p:extLst>
+  </p:cSld>
+  <p:clrMapOvr>
+    <a:masterClrMapping/>
+  </p:clrMapOvr>
+</p:sldLayout>
+</file>
+
+<file path=ppt/slideLayouts/slideLayout47.xml><?xml version="1.0" encoding="utf-8"?>
+<p:sldLayout xmlns:a="http://schemas.openxmlformats.org/drawingml/2006/main" xmlns:r="http://schemas.openxmlformats.org/officeDocument/2006/relationships" xmlns:p="http://schemas.openxmlformats.org/presentationml/2006/main">
+  <p:cSld name="1_Title Slide">
+    <p:spTree>
+      <p:nvGrpSpPr>
+        <p:cNvPr id="1" name=""/>
+        <p:cNvGrpSpPr/>
+        <p:nvPr/>
+      </p:nvGrpSpPr>
+      <p:grpSpPr>
+        <a:xfrm>
+          <a:off x="0" y="0"/>
+          <a:ext cx="0" cy="0"/>
+          <a:chOff x="0" y="0"/>
+          <a:chExt cx="0" cy="0"/>
+        </a:xfrm>
+      </p:grpSpPr>
+      <p:sp>
+        <p:nvSpPr>
+          <p:cNvPr id="2" name="Title 1"/>
+          <p:cNvSpPr>
+            <a:spLocks noGrp="1"/>
+          </p:cNvSpPr>
+          <p:nvPr>
+            <p:ph type="ctrTitle" hasCustomPrompt="1"/>
+          </p:nvPr>
+        </p:nvSpPr>
+        <p:spPr bwMode="gray">
+          <a:xfrm>
+            <a:off x="578477" y="131527"/>
+            <a:ext cx="1282130" cy="279801"/>
+          </a:xfrm>
+          <a:prstGeom prst="rect">
+            <a:avLst/>
+          </a:prstGeom>
+          <a:noFill/>
+        </p:spPr>
+        <p:txBody>
+          <a:bodyPr lIns="0" tIns="0" rIns="0" bIns="0" anchor="b" anchorCtr="0">
+            <a:spAutoFit/>
+          </a:bodyPr>
+          <a:lstStyle>
+            <a:lvl1pPr>
+              <a:defRPr sz="900">
+                <a:solidFill>
+                  <a:schemeClr val="tx2"/>
+                </a:solidFill>
+                <a:latin typeface="Verdana" pitchFamily="34" charset="0"/>
+              </a:defRPr>
+            </a:lvl1pPr>
+          </a:lstStyle>
+          <a:p>
+            <a:r>
+              <a:rPr lang="en-US" dirty="0" smtClean="0"/>
+              <a:t>CLICK TO EDIT MASTER TITLE STYLE</a:t>
+            </a:r>
+            <a:endParaRPr lang="en-US" dirty="0"/>
+          </a:p>
+        </p:txBody>
+      </p:sp>
+      <p:sp>
+        <p:nvSpPr>
+          <p:cNvPr id="3" name="Subtitle 2"/>
+          <p:cNvSpPr>
+            <a:spLocks noGrp="1"/>
+          </p:cNvSpPr>
+          <p:nvPr>
+            <p:ph type="subTitle" idx="1" hasCustomPrompt="1"/>
+          </p:nvPr>
+        </p:nvSpPr>
+        <p:spPr bwMode="gray">
+          <a:xfrm>
+            <a:off x="578477" y="479781"/>
+            <a:ext cx="1282130" cy="78084"/>
+          </a:xfrm>
+          <a:prstGeom prst="rect">
+            <a:avLst/>
+          </a:prstGeom>
+          <a:noFill/>
+        </p:spPr>
+        <p:txBody>
+          <a:bodyPr lIns="0" tIns="0" rIns="0" bIns="0">
+            <a:spAutoFit/>
+          </a:bodyPr>
+          <a:lstStyle>
+            <a:lvl1pPr marL="0" indent="0" algn="l">
+              <a:spcBef>
+                <a:spcPts val="0"/>
+              </a:spcBef>
+              <a:buNone/>
+              <a:defRPr sz="500">
+                <a:solidFill>
+                  <a:schemeClr val="bg2"/>
+                </a:solidFill>
+                <a:latin typeface="Verdana" pitchFamily="34" charset="0"/>
+              </a:defRPr>
+            </a:lvl1pPr>
+            <a:lvl2pPr marL="96641" indent="0" algn="ctr">
+              <a:buNone/>
+              <a:defRPr>
+                <a:solidFill>
+                  <a:schemeClr val="tx1">
+                    <a:tint val="75000"/>
+                  </a:schemeClr>
+                </a:solidFill>
+              </a:defRPr>
+            </a:lvl2pPr>
+            <a:lvl3pPr marL="193280" indent="0" algn="ctr">
+              <a:buNone/>
+              <a:defRPr>
+                <a:solidFill>
+                  <a:schemeClr val="tx1">
+                    <a:tint val="75000"/>
+                  </a:schemeClr>
+                </a:solidFill>
+              </a:defRPr>
+            </a:lvl3pPr>
+            <a:lvl4pPr marL="289922" indent="0" algn="ctr">
+              <a:buNone/>
+              <a:defRPr>
+                <a:solidFill>
+                  <a:schemeClr val="tx1">
+                    <a:tint val="75000"/>
+                  </a:schemeClr>
+                </a:solidFill>
+              </a:defRPr>
+            </a:lvl4pPr>
+            <a:lvl5pPr marL="386557" indent="0" algn="ctr">
+              <a:buNone/>
+              <a:defRPr>
+                <a:solidFill>
+                  <a:schemeClr val="tx1">
+                    <a:tint val="75000"/>
+                  </a:schemeClr>
+                </a:solidFill>
+              </a:defRPr>
+            </a:lvl5pPr>
+            <a:lvl6pPr marL="483197" indent="0" algn="ctr">
+              <a:buNone/>
+              <a:defRPr>
+                <a:solidFill>
+                  <a:schemeClr val="tx1">
+                    <a:tint val="75000"/>
+                  </a:schemeClr>
+                </a:solidFill>
+              </a:defRPr>
+            </a:lvl6pPr>
+            <a:lvl7pPr marL="579838" indent="0" algn="ctr">
+              <a:buNone/>
+              <a:defRPr>
+                <a:solidFill>
+                  <a:schemeClr val="tx1">
+                    <a:tint val="75000"/>
+                  </a:schemeClr>
+                </a:solidFill>
+              </a:defRPr>
+            </a:lvl7pPr>
+            <a:lvl8pPr marL="676477" indent="0" algn="ctr">
+              <a:buNone/>
+              <a:defRPr>
+                <a:solidFill>
+                  <a:schemeClr val="tx1">
+                    <a:tint val="75000"/>
+                  </a:schemeClr>
+                </a:solidFill>
+              </a:defRPr>
+            </a:lvl8pPr>
+            <a:lvl9pPr marL="773119" indent="0" algn="ctr">
+              <a:buNone/>
+              <a:defRPr>
+                <a:solidFill>
+                  <a:schemeClr val="tx1">
+                    <a:tint val="75000"/>
+                  </a:schemeClr>
+                </a:solidFill>
+              </a:defRPr>
+            </a:lvl9pPr>
+          </a:lstStyle>
+          <a:p>
+            <a:r>
+              <a:rPr lang="en-US" dirty="0" smtClean="0"/>
+              <a:t>Click to Edit Master Subtitle Style</a:t>
+            </a:r>
+            <a:endParaRPr lang="en-US" dirty="0"/>
+          </a:p>
+        </p:txBody>
+      </p:sp>
+      <p:sp>
+        <p:nvSpPr>
+          <p:cNvPr id="5" name="Picture Placeholder 2"/>
+          <p:cNvSpPr>
+            <a:spLocks noGrp="1"/>
+          </p:cNvSpPr>
+          <p:nvPr>
+            <p:ph type="pic" idx="10"/>
+          </p:nvPr>
+        </p:nvSpPr>
+        <p:spPr bwMode="gray">
+          <a:xfrm>
+            <a:off x="4" y="0"/>
+            <a:ext cx="517227" cy="978694"/>
+          </a:xfrm>
+          <a:prstGeom prst="rect">
+            <a:avLst/>
+          </a:prstGeom>
+        </p:spPr>
+        <p:txBody>
+          <a:bodyPr/>
+          <a:lstStyle>
+            <a:lvl1pPr marL="0" indent="0">
+              <a:buNone/>
+              <a:defRPr sz="300">
+                <a:latin typeface="Verdana" pitchFamily="34" charset="0"/>
+              </a:defRPr>
+            </a:lvl1pPr>
+            <a:lvl2pPr marL="96641" indent="0">
+              <a:buNone/>
+              <a:defRPr sz="600"/>
+            </a:lvl2pPr>
+            <a:lvl3pPr marL="193280" indent="0">
+              <a:buNone/>
+              <a:defRPr sz="500"/>
+            </a:lvl3pPr>
+            <a:lvl4pPr marL="289922" indent="0">
+              <a:buNone/>
+              <a:defRPr sz="400"/>
+            </a:lvl4pPr>
+            <a:lvl5pPr marL="386557" indent="0">
+              <a:buNone/>
+              <a:defRPr sz="400"/>
+            </a:lvl5pPr>
+            <a:lvl6pPr marL="483197" indent="0">
+              <a:buNone/>
+              <a:defRPr sz="400"/>
+            </a:lvl6pPr>
+            <a:lvl7pPr marL="579838" indent="0">
+              <a:buNone/>
+              <a:defRPr sz="400"/>
+            </a:lvl7pPr>
+            <a:lvl8pPr marL="676477" indent="0">
+              <a:buNone/>
+              <a:defRPr sz="400"/>
+            </a:lvl8pPr>
+            <a:lvl9pPr marL="773119" indent="0">
+              <a:buNone/>
+              <a:defRPr sz="400"/>
+            </a:lvl9pPr>
+          </a:lstStyle>
+          <a:p>
+            <a:r>
+              <a:rPr lang="en-US" smtClean="0"/>
+              <a:t>Drag picture to placeholder or click icon to add</a:t>
+            </a:r>
+            <a:endParaRPr lang="en-US" dirty="0"/>
+          </a:p>
+        </p:txBody>
+      </p:sp>
+      <p:sp>
+        <p:nvSpPr>
+          <p:cNvPr id="7" name="Content Placeholder 6"/>
+          <p:cNvSpPr>
+            <a:spLocks noGrp="1"/>
+          </p:cNvSpPr>
+          <p:nvPr>
+            <p:ph sz="quarter" idx="11"/>
+          </p:nvPr>
+        </p:nvSpPr>
+        <p:spPr bwMode="gray">
+          <a:xfrm>
+            <a:off x="578477" y="653337"/>
+            <a:ext cx="1282130" cy="61555"/>
+          </a:xfrm>
+          <a:prstGeom prst="rect">
+            <a:avLst/>
+          </a:prstGeom>
+          <a:noFill/>
+        </p:spPr>
+        <p:txBody>
+          <a:bodyPr vert="horz" wrap="square" lIns="0" tIns="0" rIns="0" bIns="0" rtlCol="0">
+            <a:spAutoFit/>
+          </a:bodyPr>
+          <a:lstStyle>
+            <a:lvl1pPr>
+              <a:spcBef>
+                <a:spcPts val="0"/>
+              </a:spcBef>
+              <a:buNone/>
+              <a:defRPr kumimoji="0" lang="en-US" sz="400" b="0" i="0" u="none" strike="noStrike" kern="1200" cap="none" spc="0" normalizeH="0" baseline="0" noProof="0" dirty="0" smtClean="0">
+                <a:ln>
+                  <a:noFill/>
+                </a:ln>
+                <a:solidFill>
+                  <a:schemeClr val="bg2"/>
+                </a:solidFill>
+                <a:effectLst/>
+                <a:uLnTx/>
+                <a:uFillTx/>
+                <a:latin typeface="Verdana" pitchFamily="34" charset="0"/>
+                <a:ea typeface="+mn-ea"/>
+                <a:cs typeface="+mn-cs"/>
+              </a:defRPr>
+            </a:lvl1pPr>
+          </a:lstStyle>
+          <a:p>
+            <a:pPr marL="0" marR="0" lvl="0" indent="0" algn="l" defTabSz="193280" rtl="0" eaLnBrk="1" fontAlgn="auto" latinLnBrk="0" hangingPunct="1">
+              <a:lnSpc>
+                <a:spcPct val="100000"/>
+              </a:lnSpc>
+              <a:spcBef>
+                <a:spcPct val="20000"/>
+              </a:spcBef>
+              <a:spcAft>
+                <a:spcPts val="0"/>
+              </a:spcAft>
+              <a:buClr>
+                <a:srgbClr val="2C95DD"/>
+              </a:buClr>
+              <a:buSzTx/>
+              <a:tabLst/>
+              <a:defRPr/>
+            </a:pPr>
+            <a:r>
+              <a:rPr lang="en-US" smtClean="0"/>
+              <a:t>Click to edit Master text styles</a:t>
+            </a:r>
+          </a:p>
+        </p:txBody>
+      </p:sp>
+    </p:spTree>
+    <p:extLst>
+      <p:ext uri="{BB962C8B-B14F-4D97-AF65-F5344CB8AC3E}">
+        <p14:creationId xmlns:p14="http://schemas.microsoft.com/office/powerpoint/2010/main" val="3944606131"/>
+      </p:ext>
+    </p:extLst>
+  </p:cSld>
+  <p:clrMapOvr>
+    <a:masterClrMapping/>
+  </p:clrMapOvr>
+  <p:transition xmlns:p14="http://schemas.microsoft.com/office/powerpoint/2010/main">
+    <p:fade/>
+  </p:transition>
+  <p:timing>
+    <p:tnLst>
+      <p:par>
+        <p:cTn xmlns:p14="http://schemas.microsoft.com/office/powerpoint/2010/main" id="1" dur="indefinite" restart="never" nodeType="tmRoot"/>
+      </p:par>
+    </p:tnLst>
+  </p:timing>
+</p:sldLayout>
+</file>
+
+<file path=ppt/slideLayouts/slideLayout5.xml><?xml version="1.0" encoding="utf-8"?>
+<p:sldLayout xmlns:a="http://schemas.openxmlformats.org/drawingml/2006/main" xmlns:r="http://schemas.openxmlformats.org/officeDocument/2006/relationships" xmlns:p="http://schemas.openxmlformats.org/presentationml/2006/main" type="twoTxTwoObj" preserve="1">
+  <p:cSld name="Comparison">
+    <p:spTree>
+      <p:nvGrpSpPr>
+        <p:cNvPr id="1" name=""/>
+        <p:cNvGrpSpPr/>
+        <p:nvPr/>
+      </p:nvGrpSpPr>
+      <p:grpSpPr>
+        <a:xfrm>
+          <a:off x="0" y="0"/>
+          <a:ext cx="0" cy="0"/>
+          <a:chOff x="0" y="0"/>
+          <a:chExt cx="0" cy="0"/>
+        </a:xfrm>
+      </p:grpSpPr>
+      <p:sp>
+        <p:nvSpPr>
+          <p:cNvPr id="2" name="Title 1"/>
+          <p:cNvSpPr>
+            <a:spLocks noGrp="1"/>
+          </p:cNvSpPr>
+          <p:nvPr>
+            <p:ph type="title"/>
+          </p:nvPr>
+        </p:nvSpPr>
+        <p:spPr/>
+        <p:txBody>
+          <a:bodyPr/>
+          <a:lstStyle>
+            <a:lvl1pPr>
+              <a:defRPr/>
+            </a:lvl1pPr>
+          </a:lstStyle>
+          <a:p>
+            <a:r>
+              <a:rPr lang="en-US" smtClean="0"/>
+              <a:t>Click to edit Master title style</a:t>
+            </a:r>
+            <a:endParaRPr lang="en-US"/>
+          </a:p>
+        </p:txBody>
+      </p:sp>
+      <p:sp>
+        <p:nvSpPr>
+          <p:cNvPr id="3" name="Text Placeholder 2"/>
+          <p:cNvSpPr>
+            <a:spLocks noGrp="1"/>
+          </p:cNvSpPr>
+          <p:nvPr>
+            <p:ph type="body" idx="1"/>
+          </p:nvPr>
+        </p:nvSpPr>
+        <p:spPr>
+          <a:xfrm>
+            <a:off x="96917" y="243417"/>
+            <a:ext cx="856436" cy="101444"/>
+          </a:xfrm>
+        </p:spPr>
+        <p:txBody>
+          <a:bodyPr anchor="b"/>
+          <a:lstStyle>
+            <a:lvl1pPr marL="0" indent="0">
+              <a:buNone/>
+              <a:defRPr sz="500" b="1"/>
+            </a:lvl1pPr>
+            <a:lvl2pPr marL="96641" indent="0">
+              <a:buNone/>
+              <a:defRPr sz="400" b="1"/>
+            </a:lvl2pPr>
+            <a:lvl3pPr marL="193280" indent="0">
+              <a:buNone/>
+              <a:defRPr sz="400" b="1"/>
+            </a:lvl3pPr>
+            <a:lvl4pPr marL="289922" indent="0">
+              <a:buNone/>
+              <a:defRPr sz="300" b="1"/>
+            </a:lvl4pPr>
+            <a:lvl5pPr marL="386557" indent="0">
+              <a:buNone/>
+              <a:defRPr sz="300" b="1"/>
+            </a:lvl5pPr>
+            <a:lvl6pPr marL="483197" indent="0">
+              <a:buNone/>
+              <a:defRPr sz="300" b="1"/>
+            </a:lvl6pPr>
+            <a:lvl7pPr marL="579838" indent="0">
+              <a:buNone/>
+              <a:defRPr sz="300" b="1"/>
+            </a:lvl7pPr>
+            <a:lvl8pPr marL="676477" indent="0">
+              <a:buNone/>
+              <a:defRPr sz="300" b="1"/>
+            </a:lvl8pPr>
+            <a:lvl9pPr marL="773119" indent="0">
+              <a:buNone/>
+              <a:defRPr sz="300" b="1"/>
+            </a:lvl9pPr>
+          </a:lstStyle>
+          <a:p>
+            <a:pPr lvl="0"/>
+            <a:r>
+              <a:rPr lang="en-US" smtClean="0"/>
+              <a:t>Click to edit Master text styles</a:t>
+            </a:r>
+          </a:p>
+        </p:txBody>
+      </p:sp>
+      <p:sp>
+        <p:nvSpPr>
+          <p:cNvPr id="4" name="Content Placeholder 3"/>
+          <p:cNvSpPr>
+            <a:spLocks noGrp="1"/>
+          </p:cNvSpPr>
+          <p:nvPr>
+            <p:ph sz="half" idx="2"/>
+          </p:nvPr>
+        </p:nvSpPr>
+        <p:spPr>
+          <a:xfrm>
+            <a:off x="96917" y="344860"/>
+            <a:ext cx="856436" cy="626536"/>
+          </a:xfrm>
+        </p:spPr>
+        <p:txBody>
+          <a:bodyPr/>
+          <a:lstStyle>
+            <a:lvl1pPr>
+              <a:defRPr sz="500"/>
+            </a:lvl1pPr>
+            <a:lvl2pPr>
+              <a:defRPr sz="400"/>
+            </a:lvl2pPr>
+            <a:lvl3pPr>
+              <a:defRPr sz="400"/>
+            </a:lvl3pPr>
+            <a:lvl4pPr>
+              <a:defRPr sz="300"/>
+            </a:lvl4pPr>
+            <a:lvl5pPr>
+              <a:defRPr sz="300"/>
+            </a:lvl5pPr>
+            <a:lvl6pPr>
+              <a:defRPr sz="300"/>
+            </a:lvl6pPr>
+            <a:lvl7pPr>
+              <a:defRPr sz="300"/>
+            </a:lvl7pPr>
+            <a:lvl8pPr>
+              <a:defRPr sz="300"/>
+            </a:lvl8pPr>
+            <a:lvl9pPr>
+              <a:defRPr sz="300"/>
+            </a:lvl9pPr>
+          </a:lstStyle>
+          <a:p>
+            <a:pPr lvl="0"/>
+            <a:r>
+              <a:rPr lang="en-US" smtClean="0"/>
+              <a:t>Click to edit Master text styles</a:t>
+            </a:r>
+          </a:p>
+          <a:p>
+            <a:pPr lvl="1"/>
+            <a:r>
+              <a:rPr lang="en-US" smtClean="0"/>
+              <a:t>Second level</a:t>
+            </a:r>
+          </a:p>
+          <a:p>
+            <a:pPr lvl="2"/>
+            <a:r>
+              <a:rPr lang="en-US" smtClean="0"/>
+              <a:t>Third level</a:t>
+            </a:r>
+          </a:p>
+          <a:p>
+            <a:pPr lvl="3"/>
+            <a:r>
+              <a:rPr lang="en-US" smtClean="0"/>
+              <a:t>Fourth level</a:t>
+            </a:r>
+          </a:p>
+          <a:p>
+            <a:pPr lvl="4"/>
+            <a:r>
+              <a:rPr lang="en-US" smtClean="0"/>
+              <a:t>Fifth level</a:t>
+            </a:r>
+            <a:endParaRPr lang="en-US"/>
+          </a:p>
+        </p:txBody>
+      </p:sp>
+      <p:sp>
+        <p:nvSpPr>
+          <p:cNvPr id="5" name="Text Placeholder 4"/>
+          <p:cNvSpPr>
+            <a:spLocks noGrp="1"/>
+          </p:cNvSpPr>
+          <p:nvPr>
+            <p:ph type="body" sz="quarter" idx="3"/>
+          </p:nvPr>
+        </p:nvSpPr>
+        <p:spPr>
+          <a:xfrm>
+            <a:off x="984653" y="243417"/>
+            <a:ext cx="856772" cy="101444"/>
+          </a:xfrm>
+        </p:spPr>
+        <p:txBody>
+          <a:bodyPr anchor="b"/>
+          <a:lstStyle>
+            <a:lvl1pPr marL="0" indent="0">
+              <a:buNone/>
+              <a:defRPr sz="500" b="1"/>
+            </a:lvl1pPr>
+            <a:lvl2pPr marL="96641" indent="0">
+              <a:buNone/>
+              <a:defRPr sz="400" b="1"/>
+            </a:lvl2pPr>
+            <a:lvl3pPr marL="193280" indent="0">
+              <a:buNone/>
+              <a:defRPr sz="400" b="1"/>
+            </a:lvl3pPr>
+            <a:lvl4pPr marL="289922" indent="0">
+              <a:buNone/>
+              <a:defRPr sz="300" b="1"/>
+            </a:lvl4pPr>
+            <a:lvl5pPr marL="386557" indent="0">
+              <a:buNone/>
+              <a:defRPr sz="300" b="1"/>
+            </a:lvl5pPr>
+            <a:lvl6pPr marL="483197" indent="0">
+              <a:buNone/>
+              <a:defRPr sz="300" b="1"/>
+            </a:lvl6pPr>
+            <a:lvl7pPr marL="579838" indent="0">
+              <a:buNone/>
+              <a:defRPr sz="300" b="1"/>
+            </a:lvl7pPr>
+            <a:lvl8pPr marL="676477" indent="0">
+              <a:buNone/>
+              <a:defRPr sz="300" b="1"/>
+            </a:lvl8pPr>
+            <a:lvl9pPr marL="773119" indent="0">
+              <a:buNone/>
+              <a:defRPr sz="300" b="1"/>
+            </a:lvl9pPr>
+          </a:lstStyle>
+          <a:p>
+            <a:pPr lvl="0"/>
+            <a:r>
+              <a:rPr lang="en-US" smtClean="0"/>
+              <a:t>Click to edit Master text styles</a:t>
+            </a:r>
+          </a:p>
+        </p:txBody>
+      </p:sp>
+      <p:sp>
+        <p:nvSpPr>
+          <p:cNvPr id="6" name="Content Placeholder 5"/>
+          <p:cNvSpPr>
+            <a:spLocks noGrp="1"/>
+          </p:cNvSpPr>
+          <p:nvPr>
+            <p:ph sz="quarter" idx="4"/>
+          </p:nvPr>
+        </p:nvSpPr>
+        <p:spPr>
+          <a:xfrm>
+            <a:off x="984653" y="344860"/>
+            <a:ext cx="856772" cy="626536"/>
+          </a:xfrm>
+        </p:spPr>
+        <p:txBody>
+          <a:bodyPr/>
+          <a:lstStyle>
+            <a:lvl1pPr>
+              <a:defRPr sz="500"/>
+            </a:lvl1pPr>
+            <a:lvl2pPr>
+              <a:defRPr sz="400"/>
+            </a:lvl2pPr>
+            <a:lvl3pPr>
+              <a:defRPr sz="400"/>
+            </a:lvl3pPr>
+            <a:lvl4pPr>
+              <a:defRPr sz="300"/>
+            </a:lvl4pPr>
+            <a:lvl5pPr>
+              <a:defRPr sz="300"/>
+            </a:lvl5pPr>
+            <a:lvl6pPr>
+              <a:defRPr sz="300"/>
+            </a:lvl6pPr>
+            <a:lvl7pPr>
+              <a:defRPr sz="300"/>
+            </a:lvl7pPr>
+            <a:lvl8pPr>
+              <a:defRPr sz="300"/>
+            </a:lvl8pPr>
+            <a:lvl9pPr>
+              <a:defRPr sz="300"/>
+            </a:lvl9pPr>
+          </a:lstStyle>
+          <a:p>
+            <a:pPr lvl="0"/>
+            <a:r>
+              <a:rPr lang="en-US" smtClean="0"/>
+              <a:t>Click to edit Master text styles</a:t>
+            </a:r>
+          </a:p>
+          <a:p>
+            <a:pPr lvl="1"/>
+            <a:r>
+              <a:rPr lang="en-US" smtClean="0"/>
+              <a:t>Second level</a:t>
+            </a:r>
+          </a:p>
+          <a:p>
+            <a:pPr lvl="2"/>
+            <a:r>
+              <a:rPr lang="en-US" smtClean="0"/>
+              <a:t>Third level</a:t>
+            </a:r>
+          </a:p>
+          <a:p>
+            <a:pPr lvl="3"/>
+            <a:r>
+              <a:rPr lang="en-US" smtClean="0"/>
+              <a:t>Fourth level</a:t>
+            </a:r>
+          </a:p>
+          <a:p>
+            <a:pPr lvl="4"/>
+            <a:r>
+              <a:rPr lang="en-US" smtClean="0"/>
+              <a:t>Fifth level</a:t>
+            </a:r>
+            <a:endParaRPr lang="en-US"/>
+          </a:p>
+        </p:txBody>
+      </p:sp>
+      <p:sp>
+        <p:nvSpPr>
+          <p:cNvPr id="7" name="Date Placeholder 6"/>
+          <p:cNvSpPr>
+            <a:spLocks noGrp="1"/>
+          </p:cNvSpPr>
+          <p:nvPr>
+            <p:ph type="dt" sz="half" idx="10"/>
+          </p:nvPr>
+        </p:nvSpPr>
+        <p:spPr/>
+        <p:txBody>
+          <a:bodyPr/>
+          <a:lstStyle/>
+          <a:p>
+            <a:fld id="{34C6AA67-E7EC-BD42-94FC-5443D25F9C23}" type="datetimeFigureOut">
+              <a:rPr lang="en-US" smtClean="0"/>
+              <a:t>8/5/13</a:t>
             </a:fld>
             <a:endParaRPr lang="en-US"/>
           </a:p>
@@ -8335,7 +11566,7 @@
           <a:p>
             <a:fld id="{34C6AA67-E7EC-BD42-94FC-5443D25F9C23}" type="datetimeFigureOut">
               <a:rPr lang="en-US" smtClean="0"/>
-              <a:t>5/18/13</a:t>
+              <a:t>8/5/13</a:t>
             </a:fld>
             <a:endParaRPr lang="en-US"/>
           </a:p>
@@ -8440,7 +11671,7 @@
           <a:p>
             <a:fld id="{34C6AA67-E7EC-BD42-94FC-5443D25F9C23}" type="datetimeFigureOut">
               <a:rPr lang="en-US" smtClean="0"/>
-              <a:t>5/18/13</a:t>
+              <a:t>8/5/13</a:t>
             </a:fld>
             <a:endParaRPr lang="en-US"/>
           </a:p>
@@ -8717,7 +11948,7 @@
           <a:p>
             <a:fld id="{34C6AA67-E7EC-BD42-94FC-5443D25F9C23}" type="datetimeFigureOut">
               <a:rPr lang="en-US" smtClean="0"/>
-              <a:t>5/18/13</a:t>
+              <a:t>8/5/13</a:t>
             </a:fld>
             <a:endParaRPr lang="en-US"/>
           </a:p>
@@ -8970,7 +12201,7 @@
           <a:p>
             <a:fld id="{34C6AA67-E7EC-BD42-94FC-5443D25F9C23}" type="datetimeFigureOut">
               <a:rPr lang="en-US" smtClean="0"/>
-              <a:t>5/18/13</a:t>
+              <a:t>8/5/13</a:t>
             </a:fld>
             <a:endParaRPr lang="en-US"/>
           </a:p>
@@ -9183,7 +12414,7 @@
           <a:p>
             <a:fld id="{34C6AA67-E7EC-BD42-94FC-5443D25F9C23}" type="datetimeFigureOut">
               <a:rPr lang="en-US" smtClean="0"/>
-              <a:t>5/18/13</a:t>
+              <a:t>8/5/13</a:t>
             </a:fld>
             <a:endParaRPr lang="en-US"/>
           </a:p>
@@ -9716,7 +12947,7 @@
                 <a:latin typeface="Calibri"/>
               </a:rPr>
               <a:pPr defTabSz="86263"/>
-              <a:t>5/18/13</a:t>
+              <a:t>8/5/13</a:t>
             </a:fld>
             <a:endParaRPr lang="en-US">
               <a:solidFill>
@@ -10265,7 +13496,7 @@
                 <a:latin typeface="Calibri"/>
               </a:rPr>
               <a:pPr/>
-              <a:t>5/18/13</a:t>
+              <a:t>8/5/13</a:t>
             </a:fld>
             <a:endParaRPr lang="en-US">
               <a:solidFill>
@@ -10399,6 +13630,564 @@
     <p:sldLayoutId id="2147483722" r:id="rId10"/>
     <p:sldLayoutId id="2147483723" r:id="rId11"/>
     <p:sldLayoutId id="2147483724" r:id="rId12"/>
+  </p:sldLayoutIdLst>
+  <p:transition xmlns:p14="http://schemas.microsoft.com/office/powerpoint/2010/main">
+    <p:fade/>
+  </p:transition>
+  <p:timing>
+    <p:tnLst>
+      <p:par>
+        <p:cTn xmlns:p14="http://schemas.microsoft.com/office/powerpoint/2010/main" id="1" dur="indefinite" restart="never" nodeType="tmRoot"/>
+      </p:par>
+    </p:tnLst>
+  </p:timing>
+  <p:txStyles>
+    <p:titleStyle>
+      <a:lvl1pPr algn="ctr" defTabSz="96641" rtl="0" eaLnBrk="1" latinLnBrk="0" hangingPunct="1">
+        <a:spcBef>
+          <a:spcPct val="0"/>
+        </a:spcBef>
+        <a:buNone/>
+        <a:defRPr sz="900" kern="1200">
+          <a:solidFill>
+            <a:schemeClr val="tx1"/>
+          </a:solidFill>
+          <a:latin typeface="+mj-lt"/>
+          <a:ea typeface="+mj-ea"/>
+          <a:cs typeface="+mj-cs"/>
+        </a:defRPr>
+      </a:lvl1pPr>
+    </p:titleStyle>
+    <p:bodyStyle>
+      <a:lvl1pPr marL="72480" indent="-72480" algn="l" defTabSz="96641" rtl="0" eaLnBrk="1" latinLnBrk="0" hangingPunct="1">
+        <a:spcBef>
+          <a:spcPct val="20000"/>
+        </a:spcBef>
+        <a:buFont typeface="Arial"/>
+        <a:buChar char="•"/>
+        <a:defRPr sz="700" kern="1200">
+          <a:solidFill>
+            <a:schemeClr val="tx1"/>
+          </a:solidFill>
+          <a:latin typeface="+mn-lt"/>
+          <a:ea typeface="+mn-ea"/>
+          <a:cs typeface="+mn-cs"/>
+        </a:defRPr>
+      </a:lvl1pPr>
+      <a:lvl2pPr marL="157039" indent="-60399" algn="l" defTabSz="96641" rtl="0" eaLnBrk="1" latinLnBrk="0" hangingPunct="1">
+        <a:spcBef>
+          <a:spcPct val="20000"/>
+        </a:spcBef>
+        <a:buFont typeface="Arial"/>
+        <a:buChar char="–"/>
+        <a:defRPr sz="600" kern="1200">
+          <a:solidFill>
+            <a:schemeClr val="tx1"/>
+          </a:solidFill>
+          <a:latin typeface="+mn-lt"/>
+          <a:ea typeface="+mn-ea"/>
+          <a:cs typeface="+mn-cs"/>
+        </a:defRPr>
+      </a:lvl2pPr>
+      <a:lvl3pPr marL="241600" indent="-48320" algn="l" defTabSz="96641" rtl="0" eaLnBrk="1" latinLnBrk="0" hangingPunct="1">
+        <a:spcBef>
+          <a:spcPct val="20000"/>
+        </a:spcBef>
+        <a:buFont typeface="Arial"/>
+        <a:buChar char="•"/>
+        <a:defRPr sz="500" kern="1200">
+          <a:solidFill>
+            <a:schemeClr val="tx1"/>
+          </a:solidFill>
+          <a:latin typeface="+mn-lt"/>
+          <a:ea typeface="+mn-ea"/>
+          <a:cs typeface="+mn-cs"/>
+        </a:defRPr>
+      </a:lvl3pPr>
+      <a:lvl4pPr marL="338239" indent="-48320" algn="l" defTabSz="96641" rtl="0" eaLnBrk="1" latinLnBrk="0" hangingPunct="1">
+        <a:spcBef>
+          <a:spcPct val="20000"/>
+        </a:spcBef>
+        <a:buFont typeface="Arial"/>
+        <a:buChar char="–"/>
+        <a:defRPr sz="400" kern="1200">
+          <a:solidFill>
+            <a:schemeClr val="tx1"/>
+          </a:solidFill>
+          <a:latin typeface="+mn-lt"/>
+          <a:ea typeface="+mn-ea"/>
+          <a:cs typeface="+mn-cs"/>
+        </a:defRPr>
+      </a:lvl4pPr>
+      <a:lvl5pPr marL="434876" indent="-48320" algn="l" defTabSz="96641" rtl="0" eaLnBrk="1" latinLnBrk="0" hangingPunct="1">
+        <a:spcBef>
+          <a:spcPct val="20000"/>
+        </a:spcBef>
+        <a:buFont typeface="Arial"/>
+        <a:buChar char="»"/>
+        <a:defRPr sz="400" kern="1200">
+          <a:solidFill>
+            <a:schemeClr val="tx1"/>
+          </a:solidFill>
+          <a:latin typeface="+mn-lt"/>
+          <a:ea typeface="+mn-ea"/>
+          <a:cs typeface="+mn-cs"/>
+        </a:defRPr>
+      </a:lvl5pPr>
+      <a:lvl6pPr marL="531519" indent="-48320" algn="l" defTabSz="96641" rtl="0" eaLnBrk="1" latinLnBrk="0" hangingPunct="1">
+        <a:spcBef>
+          <a:spcPct val="20000"/>
+        </a:spcBef>
+        <a:buFont typeface="Arial"/>
+        <a:buChar char="•"/>
+        <a:defRPr sz="400" kern="1200">
+          <a:solidFill>
+            <a:schemeClr val="tx1"/>
+          </a:solidFill>
+          <a:latin typeface="+mn-lt"/>
+          <a:ea typeface="+mn-ea"/>
+          <a:cs typeface="+mn-cs"/>
+        </a:defRPr>
+      </a:lvl6pPr>
+      <a:lvl7pPr marL="628157" indent="-48320" algn="l" defTabSz="96641" rtl="0" eaLnBrk="1" latinLnBrk="0" hangingPunct="1">
+        <a:spcBef>
+          <a:spcPct val="20000"/>
+        </a:spcBef>
+        <a:buFont typeface="Arial"/>
+        <a:buChar char="•"/>
+        <a:defRPr sz="400" kern="1200">
+          <a:solidFill>
+            <a:schemeClr val="tx1"/>
+          </a:solidFill>
+          <a:latin typeface="+mn-lt"/>
+          <a:ea typeface="+mn-ea"/>
+          <a:cs typeface="+mn-cs"/>
+        </a:defRPr>
+      </a:lvl7pPr>
+      <a:lvl8pPr marL="724799" indent="-48320" algn="l" defTabSz="96641" rtl="0" eaLnBrk="1" latinLnBrk="0" hangingPunct="1">
+        <a:spcBef>
+          <a:spcPct val="20000"/>
+        </a:spcBef>
+        <a:buFont typeface="Arial"/>
+        <a:buChar char="•"/>
+        <a:defRPr sz="400" kern="1200">
+          <a:solidFill>
+            <a:schemeClr val="tx1"/>
+          </a:solidFill>
+          <a:latin typeface="+mn-lt"/>
+          <a:ea typeface="+mn-ea"/>
+          <a:cs typeface="+mn-cs"/>
+        </a:defRPr>
+      </a:lvl8pPr>
+      <a:lvl9pPr marL="821438" indent="-48320" algn="l" defTabSz="96641" rtl="0" eaLnBrk="1" latinLnBrk="0" hangingPunct="1">
+        <a:spcBef>
+          <a:spcPct val="20000"/>
+        </a:spcBef>
+        <a:buFont typeface="Arial"/>
+        <a:buChar char="•"/>
+        <a:defRPr sz="400" kern="1200">
+          <a:solidFill>
+            <a:schemeClr val="tx1"/>
+          </a:solidFill>
+          <a:latin typeface="+mn-lt"/>
+          <a:ea typeface="+mn-ea"/>
+          <a:cs typeface="+mn-cs"/>
+        </a:defRPr>
+      </a:lvl9pPr>
+    </p:bodyStyle>
+    <p:otherStyle>
+      <a:defPPr>
+        <a:defRPr lang="en-US"/>
+      </a:defPPr>
+      <a:lvl1pPr marL="0" algn="l" defTabSz="96641" rtl="0" eaLnBrk="1" latinLnBrk="0" hangingPunct="1">
+        <a:defRPr sz="400" kern="1200">
+          <a:solidFill>
+            <a:schemeClr val="tx1"/>
+          </a:solidFill>
+          <a:latin typeface="+mn-lt"/>
+          <a:ea typeface="+mn-ea"/>
+          <a:cs typeface="+mn-cs"/>
+        </a:defRPr>
+      </a:lvl1pPr>
+      <a:lvl2pPr marL="96641" algn="l" defTabSz="96641" rtl="0" eaLnBrk="1" latinLnBrk="0" hangingPunct="1">
+        <a:defRPr sz="400" kern="1200">
+          <a:solidFill>
+            <a:schemeClr val="tx1"/>
+          </a:solidFill>
+          <a:latin typeface="+mn-lt"/>
+          <a:ea typeface="+mn-ea"/>
+          <a:cs typeface="+mn-cs"/>
+        </a:defRPr>
+      </a:lvl2pPr>
+      <a:lvl3pPr marL="193280" algn="l" defTabSz="96641" rtl="0" eaLnBrk="1" latinLnBrk="0" hangingPunct="1">
+        <a:defRPr sz="400" kern="1200">
+          <a:solidFill>
+            <a:schemeClr val="tx1"/>
+          </a:solidFill>
+          <a:latin typeface="+mn-lt"/>
+          <a:ea typeface="+mn-ea"/>
+          <a:cs typeface="+mn-cs"/>
+        </a:defRPr>
+      </a:lvl3pPr>
+      <a:lvl4pPr marL="289922" algn="l" defTabSz="96641" rtl="0" eaLnBrk="1" latinLnBrk="0" hangingPunct="1">
+        <a:defRPr sz="400" kern="1200">
+          <a:solidFill>
+            <a:schemeClr val="tx1"/>
+          </a:solidFill>
+          <a:latin typeface="+mn-lt"/>
+          <a:ea typeface="+mn-ea"/>
+          <a:cs typeface="+mn-cs"/>
+        </a:defRPr>
+      </a:lvl4pPr>
+      <a:lvl5pPr marL="386557" algn="l" defTabSz="96641" rtl="0" eaLnBrk="1" latinLnBrk="0" hangingPunct="1">
+        <a:defRPr sz="400" kern="1200">
+          <a:solidFill>
+            <a:schemeClr val="tx1"/>
+          </a:solidFill>
+          <a:latin typeface="+mn-lt"/>
+          <a:ea typeface="+mn-ea"/>
+          <a:cs typeface="+mn-cs"/>
+        </a:defRPr>
+      </a:lvl5pPr>
+      <a:lvl6pPr marL="483197" algn="l" defTabSz="96641" rtl="0" eaLnBrk="1" latinLnBrk="0" hangingPunct="1">
+        <a:defRPr sz="400" kern="1200">
+          <a:solidFill>
+            <a:schemeClr val="tx1"/>
+          </a:solidFill>
+          <a:latin typeface="+mn-lt"/>
+          <a:ea typeface="+mn-ea"/>
+          <a:cs typeface="+mn-cs"/>
+        </a:defRPr>
+      </a:lvl6pPr>
+      <a:lvl7pPr marL="579838" algn="l" defTabSz="96641" rtl="0" eaLnBrk="1" latinLnBrk="0" hangingPunct="1">
+        <a:defRPr sz="400" kern="1200">
+          <a:solidFill>
+            <a:schemeClr val="tx1"/>
+          </a:solidFill>
+          <a:latin typeface="+mn-lt"/>
+          <a:ea typeface="+mn-ea"/>
+          <a:cs typeface="+mn-cs"/>
+        </a:defRPr>
+      </a:lvl7pPr>
+      <a:lvl8pPr marL="676477" algn="l" defTabSz="96641" rtl="0" eaLnBrk="1" latinLnBrk="0" hangingPunct="1">
+        <a:defRPr sz="400" kern="1200">
+          <a:solidFill>
+            <a:schemeClr val="tx1"/>
+          </a:solidFill>
+          <a:latin typeface="+mn-lt"/>
+          <a:ea typeface="+mn-ea"/>
+          <a:cs typeface="+mn-cs"/>
+        </a:defRPr>
+      </a:lvl8pPr>
+      <a:lvl9pPr marL="773119" algn="l" defTabSz="96641" rtl="0" eaLnBrk="1" latinLnBrk="0" hangingPunct="1">
+        <a:defRPr sz="400" kern="1200">
+          <a:solidFill>
+            <a:schemeClr val="tx1"/>
+          </a:solidFill>
+          <a:latin typeface="+mn-lt"/>
+          <a:ea typeface="+mn-ea"/>
+          <a:cs typeface="+mn-cs"/>
+        </a:defRPr>
+      </a:lvl9pPr>
+    </p:otherStyle>
+  </p:txStyles>
+</p:sldMaster>
+</file>
+
+<file path=ppt/slideMasters/slideMaster4.xml><?xml version="1.0" encoding="utf-8"?>
+<p:sldMaster xmlns:a="http://schemas.openxmlformats.org/drawingml/2006/main" xmlns:r="http://schemas.openxmlformats.org/officeDocument/2006/relationships" xmlns:p="http://schemas.openxmlformats.org/presentationml/2006/main">
+  <p:cSld>
+    <p:bg>
+      <p:bgRef idx="1001">
+        <a:schemeClr val="bg1"/>
+      </p:bgRef>
+    </p:bg>
+    <p:spTree>
+      <p:nvGrpSpPr>
+        <p:cNvPr id="1" name=""/>
+        <p:cNvGrpSpPr/>
+        <p:nvPr/>
+      </p:nvGrpSpPr>
+      <p:grpSpPr>
+        <a:xfrm>
+          <a:off x="0" y="0"/>
+          <a:ext cx="0" cy="0"/>
+          <a:chOff x="0" y="0"/>
+          <a:chExt cx="0" cy="0"/>
+        </a:xfrm>
+      </p:grpSpPr>
+      <p:sp>
+        <p:nvSpPr>
+          <p:cNvPr id="2" name="Title Placeholder 1"/>
+          <p:cNvSpPr>
+            <a:spLocks noGrp="1"/>
+          </p:cNvSpPr>
+          <p:nvPr>
+            <p:ph type="title"/>
+          </p:nvPr>
+        </p:nvSpPr>
+        <p:spPr>
+          <a:xfrm>
+            <a:off x="96917" y="43548"/>
+            <a:ext cx="1744504" cy="181240"/>
+          </a:xfrm>
+          <a:prstGeom prst="rect">
+            <a:avLst/>
+          </a:prstGeom>
+        </p:spPr>
+        <p:txBody>
+          <a:bodyPr vert="horz" lIns="19330" tIns="9663" rIns="19330" bIns="9663" rtlCol="0" anchor="ctr">
+            <a:normAutofit/>
+          </a:bodyPr>
+          <a:lstStyle/>
+          <a:p>
+            <a:r>
+              <a:rPr lang="en-US" smtClean="0"/>
+              <a:t>Click to edit Master title style</a:t>
+            </a:r>
+            <a:endParaRPr lang="en-US"/>
+          </a:p>
+        </p:txBody>
+      </p:sp>
+      <p:sp>
+        <p:nvSpPr>
+          <p:cNvPr id="3" name="Text Placeholder 2"/>
+          <p:cNvSpPr>
+            <a:spLocks noGrp="1"/>
+          </p:cNvSpPr>
+          <p:nvPr>
+            <p:ph type="body" idx="1"/>
+          </p:nvPr>
+        </p:nvSpPr>
+        <p:spPr>
+          <a:xfrm>
+            <a:off x="96917" y="253742"/>
+            <a:ext cx="1744504" cy="717659"/>
+          </a:xfrm>
+          <a:prstGeom prst="rect">
+            <a:avLst/>
+          </a:prstGeom>
+        </p:spPr>
+        <p:txBody>
+          <a:bodyPr vert="horz" lIns="19330" tIns="9663" rIns="19330" bIns="9663" rtlCol="0">
+            <a:normAutofit/>
+          </a:bodyPr>
+          <a:lstStyle/>
+          <a:p>
+            <a:pPr lvl="0"/>
+            <a:r>
+              <a:rPr lang="en-US" smtClean="0"/>
+              <a:t>Click to edit Master text styles</a:t>
+            </a:r>
+          </a:p>
+          <a:p>
+            <a:pPr lvl="1"/>
+            <a:r>
+              <a:rPr lang="en-US" smtClean="0"/>
+              <a:t>Second level</a:t>
+            </a:r>
+          </a:p>
+          <a:p>
+            <a:pPr lvl="2"/>
+            <a:r>
+              <a:rPr lang="en-US" smtClean="0"/>
+              <a:t>Third level</a:t>
+            </a:r>
+          </a:p>
+          <a:p>
+            <a:pPr lvl="3"/>
+            <a:r>
+              <a:rPr lang="en-US" smtClean="0"/>
+              <a:t>Fourth level</a:t>
+            </a:r>
+          </a:p>
+          <a:p>
+            <a:pPr lvl="4"/>
+            <a:r>
+              <a:rPr lang="en-US" smtClean="0"/>
+              <a:t>Fifth level</a:t>
+            </a:r>
+            <a:endParaRPr lang="en-US"/>
+          </a:p>
+        </p:txBody>
+      </p:sp>
+      <p:sp>
+        <p:nvSpPr>
+          <p:cNvPr id="4" name="Date Placeholder 3"/>
+          <p:cNvSpPr>
+            <a:spLocks noGrp="1"/>
+          </p:cNvSpPr>
+          <p:nvPr>
+            <p:ph type="dt" sz="half" idx="2"/>
+          </p:nvPr>
+        </p:nvSpPr>
+        <p:spPr>
+          <a:xfrm>
+            <a:off x="96921" y="1007896"/>
+            <a:ext cx="452279" cy="57896"/>
+          </a:xfrm>
+          <a:prstGeom prst="rect">
+            <a:avLst/>
+          </a:prstGeom>
+        </p:spPr>
+        <p:txBody>
+          <a:bodyPr vert="horz" lIns="19330" tIns="9663" rIns="19330" bIns="9663" rtlCol="0" anchor="ctr"/>
+          <a:lstStyle>
+            <a:lvl1pPr algn="l">
+              <a:defRPr sz="300">
+                <a:solidFill>
+                  <a:schemeClr val="tx1">
+                    <a:tint val="75000"/>
+                  </a:schemeClr>
+                </a:solidFill>
+              </a:defRPr>
+            </a:lvl1pPr>
+          </a:lstStyle>
+          <a:p>
+            <a:fld id="{34C6AA67-E7EC-BD42-94FC-5443D25F9C23}" type="datetimeFigureOut">
+              <a:rPr lang="en-US" smtClean="0">
+                <a:solidFill>
+                  <a:prstClr val="black">
+                    <a:tint val="75000"/>
+                  </a:prstClr>
+                </a:solidFill>
+                <a:latin typeface="Calibri"/>
+              </a:rPr>
+              <a:pPr/>
+              <a:t>8/5/13</a:t>
+            </a:fld>
+            <a:endParaRPr lang="en-US">
+              <a:solidFill>
+                <a:prstClr val="black">
+                  <a:tint val="75000"/>
+                </a:prstClr>
+              </a:solidFill>
+              <a:latin typeface="Calibri"/>
+            </a:endParaRPr>
+          </a:p>
+        </p:txBody>
+      </p:sp>
+      <p:sp>
+        <p:nvSpPr>
+          <p:cNvPr id="5" name="Footer Placeholder 4"/>
+          <p:cNvSpPr>
+            <a:spLocks noGrp="1"/>
+          </p:cNvSpPr>
+          <p:nvPr>
+            <p:ph type="ftr" sz="quarter" idx="3"/>
+          </p:nvPr>
+        </p:nvSpPr>
+        <p:spPr>
+          <a:xfrm>
+            <a:off x="662267" y="1007896"/>
+            <a:ext cx="613807" cy="57896"/>
+          </a:xfrm>
+          <a:prstGeom prst="rect">
+            <a:avLst/>
+          </a:prstGeom>
+        </p:spPr>
+        <p:txBody>
+          <a:bodyPr vert="horz" lIns="19330" tIns="9663" rIns="19330" bIns="9663" rtlCol="0" anchor="ctr"/>
+          <a:lstStyle>
+            <a:lvl1pPr algn="ctr">
+              <a:defRPr sz="300">
+                <a:solidFill>
+                  <a:schemeClr val="tx1">
+                    <a:tint val="75000"/>
+                  </a:schemeClr>
+                </a:solidFill>
+              </a:defRPr>
+            </a:lvl1pPr>
+          </a:lstStyle>
+          <a:p>
+            <a:endParaRPr lang="en-US">
+              <a:solidFill>
+                <a:prstClr val="black">
+                  <a:tint val="75000"/>
+                </a:prstClr>
+              </a:solidFill>
+              <a:latin typeface="Calibri"/>
+            </a:endParaRPr>
+          </a:p>
+        </p:txBody>
+      </p:sp>
+      <p:sp>
+        <p:nvSpPr>
+          <p:cNvPr id="6" name="Slide Number Placeholder 5"/>
+          <p:cNvSpPr>
+            <a:spLocks noGrp="1"/>
+          </p:cNvSpPr>
+          <p:nvPr>
+            <p:ph type="sldNum" sz="quarter" idx="4"/>
+          </p:nvPr>
+        </p:nvSpPr>
+        <p:spPr>
+          <a:xfrm>
+            <a:off x="1389146" y="1007896"/>
+            <a:ext cx="452279" cy="57896"/>
+          </a:xfrm>
+          <a:prstGeom prst="rect">
+            <a:avLst/>
+          </a:prstGeom>
+        </p:spPr>
+        <p:txBody>
+          <a:bodyPr vert="horz" lIns="19330" tIns="9663" rIns="19330" bIns="9663" rtlCol="0" anchor="ctr"/>
+          <a:lstStyle>
+            <a:lvl1pPr algn="r">
+              <a:defRPr sz="300">
+                <a:solidFill>
+                  <a:schemeClr val="tx1">
+                    <a:tint val="75000"/>
+                  </a:schemeClr>
+                </a:solidFill>
+              </a:defRPr>
+            </a:lvl1pPr>
+          </a:lstStyle>
+          <a:p>
+            <a:fld id="{0C6BB7FD-57BC-BF44-AE3F-8E441ADAAD8D}" type="slidenum">
+              <a:rPr lang="en-US" smtClean="0">
+                <a:solidFill>
+                  <a:prstClr val="black">
+                    <a:tint val="75000"/>
+                  </a:prstClr>
+                </a:solidFill>
+                <a:latin typeface="Calibri"/>
+              </a:rPr>
+              <a:pPr/>
+              <a:t>‹#›</a:t>
+            </a:fld>
+            <a:endParaRPr lang="en-US">
+              <a:solidFill>
+                <a:prstClr val="black">
+                  <a:tint val="75000"/>
+                </a:prstClr>
+              </a:solidFill>
+              <a:latin typeface="Calibri"/>
+            </a:endParaRPr>
+          </a:p>
+        </p:txBody>
+      </p:sp>
+    </p:spTree>
+    <p:extLst>
+      <p:ext uri="{BB962C8B-B14F-4D97-AF65-F5344CB8AC3E}">
+        <p14:creationId xmlns:p14="http://schemas.microsoft.com/office/powerpoint/2010/main" val="3195353066"/>
+      </p:ext>
+    </p:extLst>
+  </p:cSld>
+  <p:clrMap bg1="lt1" tx1="dk1" bg2="lt2" tx2="dk2" accent1="accent1" accent2="accent2" accent3="accent3" accent4="accent4" accent5="accent5" accent6="accent6" hlink="hlink" folHlink="folHlink"/>
+  <p:sldLayoutIdLst>
+    <p:sldLayoutId id="2147483726" r:id="rId1"/>
+    <p:sldLayoutId id="2147483727" r:id="rId2"/>
+    <p:sldLayoutId id="2147483728" r:id="rId3"/>
+    <p:sldLayoutId id="2147483729" r:id="rId4"/>
+    <p:sldLayoutId id="2147483730" r:id="rId5"/>
+    <p:sldLayoutId id="2147483731" r:id="rId6"/>
+    <p:sldLayoutId id="2147483732" r:id="rId7"/>
+    <p:sldLayoutId id="2147483733" r:id="rId8"/>
+    <p:sldLayoutId id="2147483734" r:id="rId9"/>
+    <p:sldLayoutId id="2147483735" r:id="rId10"/>
+    <p:sldLayoutId id="2147483736" r:id="rId11"/>
+    <p:sldLayoutId id="2147483737" r:id="rId12"/>
   </p:sldLayoutIdLst>
   <p:transition xmlns:p14="http://schemas.microsoft.com/office/powerpoint/2010/main">
     <p:fade/>
@@ -11281,6 +15070,129 @@
   <p:clrMapOvr>
     <a:masterClrMapping/>
   </p:clrMapOvr>
+  <p:timing>
+    <p:tnLst>
+      <p:par>
+        <p:cTn xmlns:p14="http://schemas.microsoft.com/office/powerpoint/2010/main" id="1" dur="indefinite" restart="never" nodeType="tmRoot"/>
+      </p:par>
+    </p:tnLst>
+  </p:timing>
+</p:sld>
+</file>
+
+<file path=ppt/slides/slide5.xml><?xml version="1.0" encoding="utf-8"?>
+<p:sld xmlns:a="http://schemas.openxmlformats.org/drawingml/2006/main" xmlns:r="http://schemas.openxmlformats.org/officeDocument/2006/relationships" xmlns:p="http://schemas.openxmlformats.org/presentationml/2006/main">
+  <p:cSld>
+    <p:spTree>
+      <p:nvGrpSpPr>
+        <p:cNvPr id="1" name=""/>
+        <p:cNvGrpSpPr/>
+        <p:nvPr/>
+      </p:nvGrpSpPr>
+      <p:grpSpPr>
+        <a:xfrm>
+          <a:off x="0" y="0"/>
+          <a:ext cx="0" cy="0"/>
+          <a:chOff x="0" y="0"/>
+          <a:chExt cx="0" cy="0"/>
+        </a:xfrm>
+      </p:grpSpPr>
+      <p:sp>
+        <p:nvSpPr>
+          <p:cNvPr id="11" name="Rectangle 10"/>
+          <p:cNvSpPr/>
+          <p:nvPr/>
+        </p:nvSpPr>
+        <p:spPr>
+          <a:xfrm>
+            <a:off x="0" y="0"/>
+            <a:ext cx="1938338" cy="1087438"/>
+          </a:xfrm>
+          <a:prstGeom prst="rect">
+            <a:avLst/>
+          </a:prstGeom>
+          <a:noFill/>
+          <a:ln w="12700" cmpd="sng">
+            <a:solidFill>
+              <a:schemeClr val="tx1">
+                <a:lumMod val="65000"/>
+                <a:lumOff val="35000"/>
+              </a:schemeClr>
+            </a:solidFill>
+          </a:ln>
+          <a:effectLst/>
+        </p:spPr>
+        <p:style>
+          <a:lnRef idx="1">
+            <a:schemeClr val="accent1"/>
+          </a:lnRef>
+          <a:fillRef idx="3">
+            <a:schemeClr val="accent1"/>
+          </a:fillRef>
+          <a:effectRef idx="2">
+            <a:schemeClr val="accent1"/>
+          </a:effectRef>
+          <a:fontRef idx="minor">
+            <a:schemeClr val="lt1"/>
+          </a:fontRef>
+        </p:style>
+        <p:txBody>
+          <a:bodyPr lIns="19330" tIns="9663" rIns="19330" bIns="9663" rtlCol="0" anchor="ctr"/>
+          <a:lstStyle/>
+          <a:p>
+            <a:pPr algn="ctr"/>
+            <a:endParaRPr lang="en-US">
+              <a:solidFill>
+                <a:prstClr val="white"/>
+              </a:solidFill>
+              <a:latin typeface="Calibri"/>
+            </a:endParaRPr>
+          </a:p>
+        </p:txBody>
+      </p:sp>
+      <p:pic>
+        <p:nvPicPr>
+          <p:cNvPr id="2" name="Picture 1" descr="tony-logo-web.png"/>
+          <p:cNvPicPr>
+            <a:picLocks noChangeAspect="1"/>
+          </p:cNvPicPr>
+          <p:nvPr/>
+        </p:nvPicPr>
+        <p:blipFill>
+          <a:blip r:embed="rId2">
+            <a:extLst>
+              <a:ext uri="{28A0092B-C50C-407E-A947-70E740481C1C}">
+                <a14:useLocalDpi xmlns:a14="http://schemas.microsoft.com/office/drawing/2010/main" val="0"/>
+              </a:ext>
+            </a:extLst>
+          </a:blip>
+          <a:stretch>
+            <a:fillRect/>
+          </a:stretch>
+        </p:blipFill>
+        <p:spPr>
+          <a:xfrm>
+            <a:off x="163513" y="423470"/>
+            <a:ext cx="1611312" cy="228808"/>
+          </a:xfrm>
+          <a:prstGeom prst="rect">
+            <a:avLst/>
+          </a:prstGeom>
+        </p:spPr>
+      </p:pic>
+    </p:spTree>
+    <p:extLst>
+      <p:ext uri="{BB962C8B-B14F-4D97-AF65-F5344CB8AC3E}">
+        <p14:creationId xmlns:p14="http://schemas.microsoft.com/office/powerpoint/2010/main" val="3579458902"/>
+      </p:ext>
+    </p:extLst>
+  </p:cSld>
+  <p:clrMapOvr>
+    <a:masterClrMapping/>
+  </p:clrMapOvr>
+  <p:transition xmlns:p14="http://schemas.microsoft.com/office/powerpoint/2010/main">
+    <p:fade/>
+  </p:transition>
   <p:timing>
     <p:tnLst>
       <p:par>
@@ -12249,4 +16161,324 @@
   </a:objectDefaults>
   <a:extraClrSchemeLst/>
 </a:theme>
+</file>
+
+<file path=ppt/theme/theme4.xml><?xml version="1.0" encoding="utf-8"?>
+<a:theme xmlns:a="http://schemas.openxmlformats.org/drawingml/2006/main" name="3_Office Theme">
+  <a:themeElements>
+    <a:clrScheme name="Office">
+      <a:dk1>
+        <a:sysClr val="windowText" lastClr="000000"/>
+      </a:dk1>
+      <a:lt1>
+        <a:sysClr val="window" lastClr="FFFFFF"/>
+      </a:lt1>
+      <a:dk2>
+        <a:srgbClr val="1F497D"/>
+      </a:dk2>
+      <a:lt2>
+        <a:srgbClr val="EEECE1"/>
+      </a:lt2>
+      <a:accent1>
+        <a:srgbClr val="4F81BD"/>
+      </a:accent1>
+      <a:accent2>
+        <a:srgbClr val="C0504D"/>
+      </a:accent2>
+      <a:accent3>
+        <a:srgbClr val="9BBB59"/>
+      </a:accent3>
+      <a:accent4>
+        <a:srgbClr val="8064A2"/>
+      </a:accent4>
+      <a:accent5>
+        <a:srgbClr val="4BACC6"/>
+      </a:accent5>
+      <a:accent6>
+        <a:srgbClr val="F79646"/>
+      </a:accent6>
+      <a:hlink>
+        <a:srgbClr val="0000FF"/>
+      </a:hlink>
+      <a:folHlink>
+        <a:srgbClr val="800080"/>
+      </a:folHlink>
+    </a:clrScheme>
+    <a:fontScheme name="Office">
+      <a:majorFont>
+        <a:latin typeface="Calibri"/>
+        <a:ea typeface=""/>
+        <a:cs typeface=""/>
+        <a:font script="Jpan" typeface="ＭＳ Ｐゴシック"/>
+        <a:font script="Hang" typeface="맑은 고딕"/>
+        <a:font script="Hans" typeface="宋体"/>
+        <a:font script="Hant" typeface="新細明體"/>
+        <a:font script="Arab" typeface="Times New Roman"/>
+        <a:font script="Hebr" typeface="Times New Roman"/>
+        <a:font script="Thai" typeface="Angsana New"/>
+        <a:font script="Ethi" typeface="Nyala"/>
+        <a:font script="Beng" typeface="Vrinda"/>
+        <a:font script="Gujr" typeface="Shruti"/>
+        <a:font script="Khmr" typeface="MoolBoran"/>
+        <a:font script="Knda" typeface="Tunga"/>
+        <a:font script="Guru" typeface="Raavi"/>
+        <a:font script="Cans" typeface="Euphemia"/>
+        <a:font script="Cher" typeface="Plantagenet Cherokee"/>
+        <a:font script="Yiii" typeface="Microsoft Yi Baiti"/>
+        <a:font script="Tibt" typeface="Microsoft Himalaya"/>
+        <a:font script="Thaa" typeface="MV Boli"/>
+        <a:font script="Deva" typeface="Mangal"/>
+        <a:font script="Telu" typeface="Gautami"/>
+        <a:font script="Taml" typeface="Latha"/>
+        <a:font script="Syrc" typeface="Estrangelo Edessa"/>
+        <a:font script="Orya" typeface="Kalinga"/>
+        <a:font script="Mlym" typeface="Kartika"/>
+        <a:font script="Laoo" typeface="DokChampa"/>
+        <a:font script="Sinh" typeface="Iskoola Pota"/>
+        <a:font script="Mong" typeface="Mongolian Baiti"/>
+        <a:font script="Viet" typeface="Times New Roman"/>
+        <a:font script="Uigh" typeface="Microsoft Uighur"/>
+        <a:font script="Geor" typeface="Sylfaen"/>
+      </a:majorFont>
+      <a:minorFont>
+        <a:latin typeface="Calibri"/>
+        <a:ea typeface=""/>
+        <a:cs typeface=""/>
+        <a:font script="Jpan" typeface="ＭＳ Ｐゴシック"/>
+        <a:font script="Hang" typeface="맑은 고딕"/>
+        <a:font script="Hans" typeface="宋体"/>
+        <a:font script="Hant" typeface="新細明體"/>
+        <a:font script="Arab" typeface="Arial"/>
+        <a:font script="Hebr" typeface="Arial"/>
+        <a:font script="Thai" typeface="Cordia New"/>
+        <a:font script="Ethi" typeface="Nyala"/>
+        <a:font script="Beng" typeface="Vrinda"/>
+        <a:font script="Gujr" typeface="Shruti"/>
+        <a:font script="Khmr" typeface="DaunPenh"/>
+        <a:font script="Knda" typeface="Tunga"/>
+        <a:font script="Guru" typeface="Raavi"/>
+        <a:font script="Cans" typeface="Euphemia"/>
+        <a:font script="Cher" typeface="Plantagenet Cherokee"/>
+        <a:font script="Yiii" typeface="Microsoft Yi Baiti"/>
+        <a:font script="Tibt" typeface="Microsoft Himalaya"/>
+        <a:font script="Thaa" typeface="MV Boli"/>
+        <a:font script="Deva" typeface="Mangal"/>
+        <a:font script="Telu" typeface="Gautami"/>
+        <a:font script="Taml" typeface="Latha"/>
+        <a:font script="Syrc" typeface="Estrangelo Edessa"/>
+        <a:font script="Orya" typeface="Kalinga"/>
+        <a:font script="Mlym" typeface="Kartika"/>
+        <a:font script="Laoo" typeface="DokChampa"/>
+        <a:font script="Sinh" typeface="Iskoola Pota"/>
+        <a:font script="Mong" typeface="Mongolian Baiti"/>
+        <a:font script="Viet" typeface="Arial"/>
+        <a:font script="Uigh" typeface="Microsoft Uighur"/>
+        <a:font script="Geor" typeface="Sylfaen"/>
+      </a:minorFont>
+    </a:fontScheme>
+    <a:fmtScheme name="Office">
+      <a:fillStyleLst>
+        <a:solidFill>
+          <a:schemeClr val="phClr"/>
+        </a:solidFill>
+        <a:gradFill rotWithShape="1">
+          <a:gsLst>
+            <a:gs pos="0">
+              <a:schemeClr val="phClr">
+                <a:tint val="50000"/>
+                <a:satMod val="300000"/>
+              </a:schemeClr>
+            </a:gs>
+            <a:gs pos="35000">
+              <a:schemeClr val="phClr">
+                <a:tint val="37000"/>
+                <a:satMod val="300000"/>
+              </a:schemeClr>
+            </a:gs>
+            <a:gs pos="100000">
+              <a:schemeClr val="phClr">
+                <a:tint val="15000"/>
+                <a:satMod val="350000"/>
+              </a:schemeClr>
+            </a:gs>
+          </a:gsLst>
+          <a:lin ang="16200000" scaled="1"/>
+        </a:gradFill>
+        <a:gradFill rotWithShape="1">
+          <a:gsLst>
+            <a:gs pos="0">
+              <a:schemeClr val="phClr">
+                <a:tint val="100000"/>
+                <a:shade val="100000"/>
+                <a:satMod val="130000"/>
+              </a:schemeClr>
+            </a:gs>
+            <a:gs pos="100000">
+              <a:schemeClr val="phClr">
+                <a:tint val="50000"/>
+                <a:shade val="100000"/>
+                <a:satMod val="350000"/>
+              </a:schemeClr>
+            </a:gs>
+          </a:gsLst>
+          <a:lin ang="16200000" scaled="0"/>
+        </a:gradFill>
+      </a:fillStyleLst>
+      <a:lnStyleLst>
+        <a:ln w="9525" cap="flat" cmpd="sng" algn="ctr">
+          <a:solidFill>
+            <a:schemeClr val="phClr">
+              <a:shade val="95000"/>
+              <a:satMod val="105000"/>
+            </a:schemeClr>
+          </a:solidFill>
+          <a:prstDash val="solid"/>
+        </a:ln>
+        <a:ln w="25400" cap="flat" cmpd="sng" algn="ctr">
+          <a:solidFill>
+            <a:schemeClr val="phClr"/>
+          </a:solidFill>
+          <a:prstDash val="solid"/>
+        </a:ln>
+        <a:ln w="38100" cap="flat" cmpd="sng" algn="ctr">
+          <a:solidFill>
+            <a:schemeClr val="phClr"/>
+          </a:solidFill>
+          <a:prstDash val="solid"/>
+        </a:ln>
+      </a:lnStyleLst>
+      <a:effectStyleLst>
+        <a:effectStyle>
+          <a:effectLst>
+            <a:outerShdw blurRad="40000" dist="20000" dir="5400000" rotWithShape="0">
+              <a:srgbClr val="000000">
+                <a:alpha val="38000"/>
+              </a:srgbClr>
+            </a:outerShdw>
+          </a:effectLst>
+        </a:effectStyle>
+        <a:effectStyle>
+          <a:effectLst>
+            <a:outerShdw blurRad="40000" dist="23000" dir="5400000" rotWithShape="0">
+              <a:srgbClr val="000000">
+                <a:alpha val="35000"/>
+              </a:srgbClr>
+            </a:outerShdw>
+          </a:effectLst>
+        </a:effectStyle>
+        <a:effectStyle>
+          <a:effectLst>
+            <a:outerShdw blurRad="40000" dist="23000" dir="5400000" rotWithShape="0">
+              <a:srgbClr val="000000">
+                <a:alpha val="35000"/>
+              </a:srgbClr>
+            </a:outerShdw>
+          </a:effectLst>
+          <a:scene3d>
+            <a:camera prst="orthographicFront">
+              <a:rot lat="0" lon="0" rev="0"/>
+            </a:camera>
+            <a:lightRig rig="threePt" dir="t">
+              <a:rot lat="0" lon="0" rev="1200000"/>
+            </a:lightRig>
+          </a:scene3d>
+          <a:sp3d>
+            <a:bevelT w="63500" h="25400"/>
+          </a:sp3d>
+        </a:effectStyle>
+      </a:effectStyleLst>
+      <a:bgFillStyleLst>
+        <a:solidFill>
+          <a:schemeClr val="phClr"/>
+        </a:solidFill>
+        <a:gradFill rotWithShape="1">
+          <a:gsLst>
+            <a:gs pos="0">
+              <a:schemeClr val="phClr">
+                <a:tint val="40000"/>
+                <a:satMod val="350000"/>
+              </a:schemeClr>
+            </a:gs>
+            <a:gs pos="40000">
+              <a:schemeClr val="phClr">
+                <a:tint val="45000"/>
+                <a:shade val="99000"/>
+                <a:satMod val="350000"/>
+              </a:schemeClr>
+            </a:gs>
+            <a:gs pos="100000">
+              <a:schemeClr val="phClr">
+                <a:shade val="20000"/>
+                <a:satMod val="255000"/>
+              </a:schemeClr>
+            </a:gs>
+          </a:gsLst>
+          <a:path path="circle">
+            <a:fillToRect l="50000" t="-80000" r="50000" b="180000"/>
+          </a:path>
+        </a:gradFill>
+        <a:gradFill rotWithShape="1">
+          <a:gsLst>
+            <a:gs pos="0">
+              <a:schemeClr val="phClr">
+                <a:tint val="80000"/>
+                <a:satMod val="300000"/>
+              </a:schemeClr>
+            </a:gs>
+            <a:gs pos="100000">
+              <a:schemeClr val="phClr">
+                <a:shade val="30000"/>
+                <a:satMod val="200000"/>
+              </a:schemeClr>
+            </a:gs>
+          </a:gsLst>
+          <a:path path="circle">
+            <a:fillToRect l="50000" t="50000" r="50000" b="50000"/>
+          </a:path>
+        </a:gradFill>
+      </a:bgFillStyleLst>
+    </a:fmtScheme>
+  </a:themeElements>
+  <a:objectDefaults>
+    <a:spDef>
+      <a:spPr/>
+      <a:bodyPr/>
+      <a:lstStyle/>
+      <a:style>
+        <a:lnRef idx="1">
+          <a:schemeClr val="accent1"/>
+        </a:lnRef>
+        <a:fillRef idx="3">
+          <a:schemeClr val="accent1"/>
+        </a:fillRef>
+        <a:effectRef idx="2">
+          <a:schemeClr val="accent1"/>
+        </a:effectRef>
+        <a:fontRef idx="minor">
+          <a:schemeClr val="lt1"/>
+        </a:fontRef>
+      </a:style>
+    </a:spDef>
+    <a:lnDef>
+      <a:spPr/>
+      <a:bodyPr/>
+      <a:lstStyle/>
+      <a:style>
+        <a:lnRef idx="2">
+          <a:schemeClr val="accent1"/>
+        </a:lnRef>
+        <a:fillRef idx="0">
+          <a:schemeClr val="accent1"/>
+        </a:fillRef>
+        <a:effectRef idx="1">
+          <a:schemeClr val="accent1"/>
+        </a:effectRef>
+        <a:fontRef idx="minor">
+          <a:schemeClr val="tx1"/>
+        </a:fontRef>
+      </a:style>
+    </a:lnDef>
+  </a:objectDefaults>
+  <a:extraClrSchemeLst/>
+</a:theme>
 </file>
</xml_diff>

<commit_message>
Added Wick Video to "Made with Kraken" section
</commit_message>
<xml_diff>
--- a/made-with-kraken.pptx
+++ b/made-with-kraken.pptx
@@ -13,6 +13,7 @@
     <p:sldId id="260" r:id="rId7"/>
     <p:sldId id="261" r:id="rId8"/>
     <p:sldId id="262" r:id="rId9"/>
+    <p:sldId id="263" r:id="rId10"/>
   </p:sldIdLst>
   <p:sldSz cx="1938338" cy="1087438"/>
   <p:notesSz cx="6858000" cy="9144000"/>
@@ -295,7 +296,7 @@
           <a:p>
             <a:fld id="{34C6AA67-E7EC-BD42-94FC-5443D25F9C23}" type="datetimeFigureOut">
               <a:rPr lang="en-US" smtClean="0"/>
-              <a:t>8/5/13</a:t>
+              <a:t>8/6/13</a:t>
             </a:fld>
             <a:endParaRPr lang="en-US"/>
           </a:p>
@@ -465,7 +466,7 @@
           <a:p>
             <a:fld id="{34C6AA67-E7EC-BD42-94FC-5443D25F9C23}" type="datetimeFigureOut">
               <a:rPr lang="en-US" smtClean="0"/>
-              <a:t>8/5/13</a:t>
+              <a:t>8/6/13</a:t>
             </a:fld>
             <a:endParaRPr lang="en-US"/>
           </a:p>
@@ -645,7 +646,7 @@
           <a:p>
             <a:fld id="{34C6AA67-E7EC-BD42-94FC-5443D25F9C23}" type="datetimeFigureOut">
               <a:rPr lang="en-US" smtClean="0"/>
-              <a:t>8/5/13</a:t>
+              <a:t>8/6/13</a:t>
             </a:fld>
             <a:endParaRPr lang="en-US"/>
           </a:p>
@@ -1241,7 +1242,7 @@
                 <a:latin typeface="Calibri"/>
               </a:rPr>
               <a:pPr/>
-              <a:t>8/5/13</a:t>
+              <a:t>8/6/13</a:t>
             </a:fld>
             <a:endParaRPr lang="en-US">
               <a:solidFill>
@@ -1448,7 +1449,7 @@
                 <a:latin typeface="Calibri"/>
               </a:rPr>
               <a:pPr/>
-              <a:t>8/5/13</a:t>
+              <a:t>8/6/13</a:t>
             </a:fld>
             <a:endParaRPr lang="en-US">
               <a:solidFill>
@@ -1731,7 +1732,7 @@
                 <a:latin typeface="Calibri"/>
               </a:rPr>
               <a:pPr/>
-              <a:t>8/5/13</a:t>
+              <a:t>8/6/13</a:t>
             </a:fld>
             <a:endParaRPr lang="en-US">
               <a:solidFill>
@@ -2056,7 +2057,7 @@
                 <a:latin typeface="Calibri"/>
               </a:rPr>
               <a:pPr/>
-              <a:t>8/5/13</a:t>
+              <a:t>8/6/13</a:t>
             </a:fld>
             <a:endParaRPr lang="en-US">
               <a:solidFill>
@@ -2520,7 +2521,7 @@
                 <a:latin typeface="Calibri"/>
               </a:rPr>
               <a:pPr/>
-              <a:t>8/5/13</a:t>
+              <a:t>8/6/13</a:t>
             </a:fld>
             <a:endParaRPr lang="en-US">
               <a:solidFill>
@@ -2675,7 +2676,7 @@
                 <a:latin typeface="Calibri"/>
               </a:rPr>
               <a:pPr/>
-              <a:t>8/5/13</a:t>
+              <a:t>8/6/13</a:t>
             </a:fld>
             <a:endParaRPr lang="en-US">
               <a:solidFill>
@@ -2807,7 +2808,7 @@
                 <a:latin typeface="Calibri"/>
               </a:rPr>
               <a:pPr/>
-              <a:t>8/5/13</a:t>
+              <a:t>8/6/13</a:t>
             </a:fld>
             <a:endParaRPr lang="en-US">
               <a:solidFill>
@@ -3006,7 +3007,7 @@
           <a:p>
             <a:fld id="{34C6AA67-E7EC-BD42-94FC-5443D25F9C23}" type="datetimeFigureOut">
               <a:rPr lang="en-US" smtClean="0"/>
-              <a:t>8/5/13</a:t>
+              <a:t>8/6/13</a:t>
             </a:fld>
             <a:endParaRPr lang="en-US"/>
           </a:p>
@@ -3291,7 +3292,7 @@
                 <a:latin typeface="Calibri"/>
               </a:rPr>
               <a:pPr/>
-              <a:t>8/5/13</a:t>
+              <a:t>8/6/13</a:t>
             </a:fld>
             <a:endParaRPr lang="en-US">
               <a:solidFill>
@@ -3581,7 +3582,7 @@
                 <a:latin typeface="Calibri"/>
               </a:rPr>
               <a:pPr/>
-              <a:t>8/5/13</a:t>
+              <a:t>8/6/13</a:t>
             </a:fld>
             <a:endParaRPr lang="en-US">
               <a:solidFill>
@@ -3788,7 +3789,7 @@
                 <a:latin typeface="Calibri"/>
               </a:rPr>
               <a:pPr/>
-              <a:t>8/5/13</a:t>
+              <a:t>8/6/13</a:t>
             </a:fld>
             <a:endParaRPr lang="en-US">
               <a:solidFill>
@@ -4005,7 +4006,7 @@
                 <a:latin typeface="Calibri"/>
               </a:rPr>
               <a:pPr/>
-              <a:t>8/5/13</a:t>
+              <a:t>8/6/13</a:t>
             </a:fld>
             <a:endParaRPr lang="en-US">
               <a:solidFill>
@@ -4284,7 +4285,7 @@
                 <a:latin typeface="Calibri"/>
               </a:rPr>
               <a:pPr/>
-              <a:t>8/5/13</a:t>
+              <a:t>8/6/13</a:t>
             </a:fld>
             <a:endParaRPr lang="en-US">
               <a:solidFill>
@@ -4491,7 +4492,7 @@
                 <a:latin typeface="Calibri"/>
               </a:rPr>
               <a:pPr/>
-              <a:t>8/5/13</a:t>
+              <a:t>8/6/13</a:t>
             </a:fld>
             <a:endParaRPr lang="en-US">
               <a:solidFill>
@@ -4774,7 +4775,7 @@
                 <a:latin typeface="Calibri"/>
               </a:rPr>
               <a:pPr/>
-              <a:t>8/5/13</a:t>
+              <a:t>8/6/13</a:t>
             </a:fld>
             <a:endParaRPr lang="en-US">
               <a:solidFill>
@@ -5099,7 +5100,7 @@
                 <a:latin typeface="Calibri"/>
               </a:rPr>
               <a:pPr/>
-              <a:t>8/5/13</a:t>
+              <a:t>8/6/13</a:t>
             </a:fld>
             <a:endParaRPr lang="en-US">
               <a:solidFill>
@@ -5558,7 +5559,7 @@
                 <a:latin typeface="Calibri"/>
               </a:rPr>
               <a:pPr/>
-              <a:t>8/5/13</a:t>
+              <a:t>8/6/13</a:t>
             </a:fld>
             <a:endParaRPr lang="en-US">
               <a:solidFill>
@@ -5713,7 +5714,7 @@
                 <a:latin typeface="Calibri"/>
               </a:rPr>
               <a:pPr/>
-              <a:t>8/5/13</a:t>
+              <a:t>8/6/13</a:t>
             </a:fld>
             <a:endParaRPr lang="en-US">
               <a:solidFill>
@@ -5998,7 +5999,7 @@
           <a:p>
             <a:fld id="{34C6AA67-E7EC-BD42-94FC-5443D25F9C23}" type="datetimeFigureOut">
               <a:rPr lang="en-US" smtClean="0"/>
-              <a:t>8/5/13</a:t>
+              <a:t>8/6/13</a:t>
             </a:fld>
             <a:endParaRPr lang="en-US"/>
           </a:p>
@@ -6101,7 +6102,7 @@
                 <a:latin typeface="Calibri"/>
               </a:rPr>
               <a:pPr/>
-              <a:t>8/5/13</a:t>
+              <a:t>8/6/13</a:t>
             </a:fld>
             <a:endParaRPr lang="en-US">
               <a:solidFill>
@@ -6415,7 +6416,7 @@
                 <a:latin typeface="Calibri"/>
               </a:rPr>
               <a:pPr/>
-              <a:t>8/5/13</a:t>
+              <a:t>8/6/13</a:t>
             </a:fld>
             <a:endParaRPr lang="en-US">
               <a:solidFill>
@@ -6705,7 +6706,7 @@
                 <a:latin typeface="Calibri"/>
               </a:rPr>
               <a:pPr/>
-              <a:t>8/5/13</a:t>
+              <a:t>8/6/13</a:t>
             </a:fld>
             <a:endParaRPr lang="en-US">
               <a:solidFill>
@@ -6912,7 +6913,7 @@
                 <a:latin typeface="Calibri"/>
               </a:rPr>
               <a:pPr/>
-              <a:t>8/5/13</a:t>
+              <a:t>8/6/13</a:t>
             </a:fld>
             <a:endParaRPr lang="en-US">
               <a:solidFill>
@@ -7129,7 +7130,7 @@
                 <a:latin typeface="Calibri"/>
               </a:rPr>
               <a:pPr/>
-              <a:t>8/5/13</a:t>
+              <a:t>8/6/13</a:t>
             </a:fld>
             <a:endParaRPr lang="en-US">
               <a:solidFill>
@@ -7759,7 +7760,7 @@
                 <a:latin typeface="Calibri"/>
               </a:rPr>
               <a:pPr/>
-              <a:t>8/5/13</a:t>
+              <a:t>8/6/13</a:t>
             </a:fld>
             <a:endParaRPr lang="en-US">
               <a:solidFill>
@@ -7966,7 +7967,7 @@
                 <a:latin typeface="Calibri"/>
               </a:rPr>
               <a:pPr/>
-              <a:t>8/5/13</a:t>
+              <a:t>8/6/13</a:t>
             </a:fld>
             <a:endParaRPr lang="en-US">
               <a:solidFill>
@@ -8249,7 +8250,7 @@
                 <a:latin typeface="Calibri"/>
               </a:rPr>
               <a:pPr/>
-              <a:t>8/5/13</a:t>
+              <a:t>8/6/13</a:t>
             </a:fld>
             <a:endParaRPr lang="en-US">
               <a:solidFill>
@@ -8574,7 +8575,7 @@
                 <a:latin typeface="Calibri"/>
               </a:rPr>
               <a:pPr/>
-              <a:t>8/5/13</a:t>
+              <a:t>8/6/13</a:t>
             </a:fld>
             <a:endParaRPr lang="en-US">
               <a:solidFill>
@@ -8891,7 +8892,7 @@
           <a:p>
             <a:fld id="{34C6AA67-E7EC-BD42-94FC-5443D25F9C23}" type="datetimeFigureOut">
               <a:rPr lang="en-US" smtClean="0"/>
-              <a:t>8/5/13</a:t>
+              <a:t>8/6/13</a:t>
             </a:fld>
             <a:endParaRPr lang="en-US"/>
           </a:p>
@@ -9321,7 +9322,7 @@
                 <a:latin typeface="Calibri"/>
               </a:rPr>
               <a:pPr/>
-              <a:t>8/5/13</a:t>
+              <a:t>8/6/13</a:t>
             </a:fld>
             <a:endParaRPr lang="en-US">
               <a:solidFill>
@@ -9476,7 +9477,7 @@
                 <a:latin typeface="Calibri"/>
               </a:rPr>
               <a:pPr/>
-              <a:t>8/5/13</a:t>
+              <a:t>8/6/13</a:t>
             </a:fld>
             <a:endParaRPr lang="en-US">
               <a:solidFill>
@@ -9618,7 +9619,7 @@
                 <a:latin typeface="Calibri"/>
               </a:rPr>
               <a:pPr/>
-              <a:t>8/5/13</a:t>
+              <a:t>8/6/13</a:t>
             </a:fld>
             <a:endParaRPr lang="en-US">
               <a:solidFill>
@@ -9932,7 +9933,7 @@
                 <a:latin typeface="Calibri"/>
               </a:rPr>
               <a:pPr/>
-              <a:t>8/5/13</a:t>
+              <a:t>8/6/13</a:t>
             </a:fld>
             <a:endParaRPr lang="en-US">
               <a:solidFill>
@@ -10222,7 +10223,7 @@
                 <a:latin typeface="Calibri"/>
               </a:rPr>
               <a:pPr/>
-              <a:t>8/5/13</a:t>
+              <a:t>8/6/13</a:t>
             </a:fld>
             <a:endParaRPr lang="en-US">
               <a:solidFill>
@@ -10429,7 +10430,7 @@
                 <a:latin typeface="Calibri"/>
               </a:rPr>
               <a:pPr/>
-              <a:t>8/5/13</a:t>
+              <a:t>8/6/13</a:t>
             </a:fld>
             <a:endParaRPr lang="en-US">
               <a:solidFill>
@@ -10646,7 +10647,7 @@
                 <a:latin typeface="Calibri"/>
               </a:rPr>
               <a:pPr/>
-              <a:t>8/5/13</a:t>
+              <a:t>8/6/13</a:t>
             </a:fld>
             <a:endParaRPr lang="en-US">
               <a:solidFill>
@@ -11448,7 +11449,7 @@
           <a:p>
             <a:fld id="{34C6AA67-E7EC-BD42-94FC-5443D25F9C23}" type="datetimeFigureOut">
               <a:rPr lang="en-US" smtClean="0"/>
-              <a:t>8/5/13</a:t>
+              <a:t>8/6/13</a:t>
             </a:fld>
             <a:endParaRPr lang="en-US"/>
           </a:p>
@@ -11566,7 +11567,7 @@
           <a:p>
             <a:fld id="{34C6AA67-E7EC-BD42-94FC-5443D25F9C23}" type="datetimeFigureOut">
               <a:rPr lang="en-US" smtClean="0"/>
-              <a:t>8/5/13</a:t>
+              <a:t>8/6/13</a:t>
             </a:fld>
             <a:endParaRPr lang="en-US"/>
           </a:p>
@@ -11671,7 +11672,7 @@
           <a:p>
             <a:fld id="{34C6AA67-E7EC-BD42-94FC-5443D25F9C23}" type="datetimeFigureOut">
               <a:rPr lang="en-US" smtClean="0"/>
-              <a:t>8/5/13</a:t>
+              <a:t>8/6/13</a:t>
             </a:fld>
             <a:endParaRPr lang="en-US"/>
           </a:p>
@@ -11948,7 +11949,7 @@
           <a:p>
             <a:fld id="{34C6AA67-E7EC-BD42-94FC-5443D25F9C23}" type="datetimeFigureOut">
               <a:rPr lang="en-US" smtClean="0"/>
-              <a:t>8/5/13</a:t>
+              <a:t>8/6/13</a:t>
             </a:fld>
             <a:endParaRPr lang="en-US"/>
           </a:p>
@@ -12201,7 +12202,7 @@
           <a:p>
             <a:fld id="{34C6AA67-E7EC-BD42-94FC-5443D25F9C23}" type="datetimeFigureOut">
               <a:rPr lang="en-US" smtClean="0"/>
-              <a:t>8/5/13</a:t>
+              <a:t>8/6/13</a:t>
             </a:fld>
             <a:endParaRPr lang="en-US"/>
           </a:p>
@@ -12414,7 +12415,7 @@
           <a:p>
             <a:fld id="{34C6AA67-E7EC-BD42-94FC-5443D25F9C23}" type="datetimeFigureOut">
               <a:rPr lang="en-US" smtClean="0"/>
-              <a:t>8/5/13</a:t>
+              <a:t>8/6/13</a:t>
             </a:fld>
             <a:endParaRPr lang="en-US"/>
           </a:p>
@@ -12947,7 +12948,7 @@
                 <a:latin typeface="Calibri"/>
               </a:rPr>
               <a:pPr defTabSz="86263"/>
-              <a:t>8/5/13</a:t>
+              <a:t>8/6/13</a:t>
             </a:fld>
             <a:endParaRPr lang="en-US">
               <a:solidFill>
@@ -13496,7 +13497,7 @@
                 <a:latin typeface="Calibri"/>
               </a:rPr>
               <a:pPr/>
-              <a:t>8/5/13</a:t>
+              <a:t>8/6/13</a:t>
             </a:fld>
             <a:endParaRPr lang="en-US">
               <a:solidFill>
@@ -14054,7 +14055,7 @@
                 <a:latin typeface="Calibri"/>
               </a:rPr>
               <a:pPr/>
-              <a:t>8/5/13</a:t>
+              <a:t>8/6/13</a:t>
             </a:fld>
             <a:endParaRPr lang="en-US">
               <a:solidFill>
@@ -15193,6 +15194,81 @@
   <p:transition xmlns:p14="http://schemas.microsoft.com/office/powerpoint/2010/main">
     <p:fade/>
   </p:transition>
+  <p:timing>
+    <p:tnLst>
+      <p:par>
+        <p:cTn xmlns:p14="http://schemas.microsoft.com/office/powerpoint/2010/main" id="1" dur="indefinite" restart="never" nodeType="tmRoot"/>
+      </p:par>
+    </p:tnLst>
+  </p:timing>
+</p:sld>
+</file>
+
+<file path=ppt/slides/slide6.xml><?xml version="1.0" encoding="utf-8"?>
+<p:sld xmlns:a="http://schemas.openxmlformats.org/drawingml/2006/main" xmlns:r="http://schemas.openxmlformats.org/officeDocument/2006/relationships" xmlns:p="http://schemas.openxmlformats.org/presentationml/2006/main">
+  <p:cSld>
+    <p:bg>
+      <p:bgPr>
+        <a:solidFill>
+          <a:srgbClr val="CADEEA"/>
+        </a:solidFill>
+        <a:effectLst/>
+      </p:bgPr>
+    </p:bg>
+    <p:spTree>
+      <p:nvGrpSpPr>
+        <p:cNvPr id="1" name=""/>
+        <p:cNvGrpSpPr/>
+        <p:nvPr/>
+      </p:nvGrpSpPr>
+      <p:grpSpPr>
+        <a:xfrm>
+          <a:off x="0" y="0"/>
+          <a:ext cx="0" cy="0"/>
+          <a:chOff x="0" y="0"/>
+          <a:chExt cx="0" cy="0"/>
+        </a:xfrm>
+      </p:grpSpPr>
+      <p:pic>
+        <p:nvPicPr>
+          <p:cNvPr id="4" name="Picture 3" descr="wick-video-logo.png"/>
+          <p:cNvPicPr>
+            <a:picLocks noChangeAspect="1"/>
+          </p:cNvPicPr>
+          <p:nvPr/>
+        </p:nvPicPr>
+        <p:blipFill>
+          <a:blip r:embed="rId2">
+            <a:extLst>
+              <a:ext uri="{28A0092B-C50C-407E-A947-70E740481C1C}">
+                <a14:useLocalDpi xmlns:a14="http://schemas.microsoft.com/office/drawing/2010/main" val="0"/>
+              </a:ext>
+            </a:extLst>
+          </a:blip>
+          <a:stretch>
+            <a:fillRect/>
+          </a:stretch>
+        </p:blipFill>
+        <p:spPr>
+          <a:xfrm>
+            <a:off x="163513" y="330427"/>
+            <a:ext cx="1611312" cy="332578"/>
+          </a:xfrm>
+          <a:prstGeom prst="rect">
+            <a:avLst/>
+          </a:prstGeom>
+        </p:spPr>
+      </p:pic>
+    </p:spTree>
+    <p:extLst>
+      <p:ext uri="{BB962C8B-B14F-4D97-AF65-F5344CB8AC3E}">
+        <p14:creationId xmlns:p14="http://schemas.microsoft.com/office/powerpoint/2010/main" val="25209879"/>
+      </p:ext>
+    </p:extLst>
+  </p:cSld>
+  <p:clrMapOvr>
+    <a:masterClrMapping/>
+  </p:clrMapOvr>
   <p:timing>
     <p:tnLst>
       <p:par>

</xml_diff>

<commit_message>
Added Exis to "Made with Kraken"
</commit_message>
<xml_diff>
--- a/made-with-kraken.pptx
+++ b/made-with-kraken.pptx
@@ -14,6 +14,7 @@
     <p:sldId id="261" r:id="rId8"/>
     <p:sldId id="262" r:id="rId9"/>
     <p:sldId id="263" r:id="rId10"/>
+    <p:sldId id="264" r:id="rId11"/>
   </p:sldIdLst>
   <p:sldSz cx="1938338" cy="1087438"/>
   <p:notesSz cx="6858000" cy="9144000"/>
@@ -296,7 +297,7 @@
           <a:p>
             <a:fld id="{34C6AA67-E7EC-BD42-94FC-5443D25F9C23}" type="datetimeFigureOut">
               <a:rPr lang="en-US" smtClean="0"/>
-              <a:t>8/6/13</a:t>
+              <a:t>8/15/13</a:t>
             </a:fld>
             <a:endParaRPr lang="en-US"/>
           </a:p>
@@ -466,7 +467,7 @@
           <a:p>
             <a:fld id="{34C6AA67-E7EC-BD42-94FC-5443D25F9C23}" type="datetimeFigureOut">
               <a:rPr lang="en-US" smtClean="0"/>
-              <a:t>8/6/13</a:t>
+              <a:t>8/15/13</a:t>
             </a:fld>
             <a:endParaRPr lang="en-US"/>
           </a:p>
@@ -646,7 +647,7 @@
           <a:p>
             <a:fld id="{34C6AA67-E7EC-BD42-94FC-5443D25F9C23}" type="datetimeFigureOut">
               <a:rPr lang="en-US" smtClean="0"/>
-              <a:t>8/6/13</a:t>
+              <a:t>8/15/13</a:t>
             </a:fld>
             <a:endParaRPr lang="en-US"/>
           </a:p>
@@ -1242,7 +1243,7 @@
                 <a:latin typeface="Calibri"/>
               </a:rPr>
               <a:pPr/>
-              <a:t>8/6/13</a:t>
+              <a:t>8/15/13</a:t>
             </a:fld>
             <a:endParaRPr lang="en-US">
               <a:solidFill>
@@ -1449,7 +1450,7 @@
                 <a:latin typeface="Calibri"/>
               </a:rPr>
               <a:pPr/>
-              <a:t>8/6/13</a:t>
+              <a:t>8/15/13</a:t>
             </a:fld>
             <a:endParaRPr lang="en-US">
               <a:solidFill>
@@ -1732,7 +1733,7 @@
                 <a:latin typeface="Calibri"/>
               </a:rPr>
               <a:pPr/>
-              <a:t>8/6/13</a:t>
+              <a:t>8/15/13</a:t>
             </a:fld>
             <a:endParaRPr lang="en-US">
               <a:solidFill>
@@ -2057,7 +2058,7 @@
                 <a:latin typeface="Calibri"/>
               </a:rPr>
               <a:pPr/>
-              <a:t>8/6/13</a:t>
+              <a:t>8/15/13</a:t>
             </a:fld>
             <a:endParaRPr lang="en-US">
               <a:solidFill>
@@ -2521,7 +2522,7 @@
                 <a:latin typeface="Calibri"/>
               </a:rPr>
               <a:pPr/>
-              <a:t>8/6/13</a:t>
+              <a:t>8/15/13</a:t>
             </a:fld>
             <a:endParaRPr lang="en-US">
               <a:solidFill>
@@ -2676,7 +2677,7 @@
                 <a:latin typeface="Calibri"/>
               </a:rPr>
               <a:pPr/>
-              <a:t>8/6/13</a:t>
+              <a:t>8/15/13</a:t>
             </a:fld>
             <a:endParaRPr lang="en-US">
               <a:solidFill>
@@ -2808,7 +2809,7 @@
                 <a:latin typeface="Calibri"/>
               </a:rPr>
               <a:pPr/>
-              <a:t>8/6/13</a:t>
+              <a:t>8/15/13</a:t>
             </a:fld>
             <a:endParaRPr lang="en-US">
               <a:solidFill>
@@ -3007,7 +3008,7 @@
           <a:p>
             <a:fld id="{34C6AA67-E7EC-BD42-94FC-5443D25F9C23}" type="datetimeFigureOut">
               <a:rPr lang="en-US" smtClean="0"/>
-              <a:t>8/6/13</a:t>
+              <a:t>8/15/13</a:t>
             </a:fld>
             <a:endParaRPr lang="en-US"/>
           </a:p>
@@ -3292,7 +3293,7 @@
                 <a:latin typeface="Calibri"/>
               </a:rPr>
               <a:pPr/>
-              <a:t>8/6/13</a:t>
+              <a:t>8/15/13</a:t>
             </a:fld>
             <a:endParaRPr lang="en-US">
               <a:solidFill>
@@ -3582,7 +3583,7 @@
                 <a:latin typeface="Calibri"/>
               </a:rPr>
               <a:pPr/>
-              <a:t>8/6/13</a:t>
+              <a:t>8/15/13</a:t>
             </a:fld>
             <a:endParaRPr lang="en-US">
               <a:solidFill>
@@ -3789,7 +3790,7 @@
                 <a:latin typeface="Calibri"/>
               </a:rPr>
               <a:pPr/>
-              <a:t>8/6/13</a:t>
+              <a:t>8/15/13</a:t>
             </a:fld>
             <a:endParaRPr lang="en-US">
               <a:solidFill>
@@ -4006,7 +4007,7 @@
                 <a:latin typeface="Calibri"/>
               </a:rPr>
               <a:pPr/>
-              <a:t>8/6/13</a:t>
+              <a:t>8/15/13</a:t>
             </a:fld>
             <a:endParaRPr lang="en-US">
               <a:solidFill>
@@ -4285,7 +4286,7 @@
                 <a:latin typeface="Calibri"/>
               </a:rPr>
               <a:pPr/>
-              <a:t>8/6/13</a:t>
+              <a:t>8/15/13</a:t>
             </a:fld>
             <a:endParaRPr lang="en-US">
               <a:solidFill>
@@ -4492,7 +4493,7 @@
                 <a:latin typeface="Calibri"/>
               </a:rPr>
               <a:pPr/>
-              <a:t>8/6/13</a:t>
+              <a:t>8/15/13</a:t>
             </a:fld>
             <a:endParaRPr lang="en-US">
               <a:solidFill>
@@ -4775,7 +4776,7 @@
                 <a:latin typeface="Calibri"/>
               </a:rPr>
               <a:pPr/>
-              <a:t>8/6/13</a:t>
+              <a:t>8/15/13</a:t>
             </a:fld>
             <a:endParaRPr lang="en-US">
               <a:solidFill>
@@ -5100,7 +5101,7 @@
                 <a:latin typeface="Calibri"/>
               </a:rPr>
               <a:pPr/>
-              <a:t>8/6/13</a:t>
+              <a:t>8/15/13</a:t>
             </a:fld>
             <a:endParaRPr lang="en-US">
               <a:solidFill>
@@ -5559,7 +5560,7 @@
                 <a:latin typeface="Calibri"/>
               </a:rPr>
               <a:pPr/>
-              <a:t>8/6/13</a:t>
+              <a:t>8/15/13</a:t>
             </a:fld>
             <a:endParaRPr lang="en-US">
               <a:solidFill>
@@ -5714,7 +5715,7 @@
                 <a:latin typeface="Calibri"/>
               </a:rPr>
               <a:pPr/>
-              <a:t>8/6/13</a:t>
+              <a:t>8/15/13</a:t>
             </a:fld>
             <a:endParaRPr lang="en-US">
               <a:solidFill>
@@ -5999,7 +6000,7 @@
           <a:p>
             <a:fld id="{34C6AA67-E7EC-BD42-94FC-5443D25F9C23}" type="datetimeFigureOut">
               <a:rPr lang="en-US" smtClean="0"/>
-              <a:t>8/6/13</a:t>
+              <a:t>8/15/13</a:t>
             </a:fld>
             <a:endParaRPr lang="en-US"/>
           </a:p>
@@ -6102,7 +6103,7 @@
                 <a:latin typeface="Calibri"/>
               </a:rPr>
               <a:pPr/>
-              <a:t>8/6/13</a:t>
+              <a:t>8/15/13</a:t>
             </a:fld>
             <a:endParaRPr lang="en-US">
               <a:solidFill>
@@ -6416,7 +6417,7 @@
                 <a:latin typeface="Calibri"/>
               </a:rPr>
               <a:pPr/>
-              <a:t>8/6/13</a:t>
+              <a:t>8/15/13</a:t>
             </a:fld>
             <a:endParaRPr lang="en-US">
               <a:solidFill>
@@ -6706,7 +6707,7 @@
                 <a:latin typeface="Calibri"/>
               </a:rPr>
               <a:pPr/>
-              <a:t>8/6/13</a:t>
+              <a:t>8/15/13</a:t>
             </a:fld>
             <a:endParaRPr lang="en-US">
               <a:solidFill>
@@ -6913,7 +6914,7 @@
                 <a:latin typeface="Calibri"/>
               </a:rPr>
               <a:pPr/>
-              <a:t>8/6/13</a:t>
+              <a:t>8/15/13</a:t>
             </a:fld>
             <a:endParaRPr lang="en-US">
               <a:solidFill>
@@ -7130,7 +7131,7 @@
                 <a:latin typeface="Calibri"/>
               </a:rPr>
               <a:pPr/>
-              <a:t>8/6/13</a:t>
+              <a:t>8/15/13</a:t>
             </a:fld>
             <a:endParaRPr lang="en-US">
               <a:solidFill>
@@ -7760,7 +7761,7 @@
                 <a:latin typeface="Calibri"/>
               </a:rPr>
               <a:pPr/>
-              <a:t>8/6/13</a:t>
+              <a:t>8/15/13</a:t>
             </a:fld>
             <a:endParaRPr lang="en-US">
               <a:solidFill>
@@ -7967,7 +7968,7 @@
                 <a:latin typeface="Calibri"/>
               </a:rPr>
               <a:pPr/>
-              <a:t>8/6/13</a:t>
+              <a:t>8/15/13</a:t>
             </a:fld>
             <a:endParaRPr lang="en-US">
               <a:solidFill>
@@ -8250,7 +8251,7 @@
                 <a:latin typeface="Calibri"/>
               </a:rPr>
               <a:pPr/>
-              <a:t>8/6/13</a:t>
+              <a:t>8/15/13</a:t>
             </a:fld>
             <a:endParaRPr lang="en-US">
               <a:solidFill>
@@ -8575,7 +8576,7 @@
                 <a:latin typeface="Calibri"/>
               </a:rPr>
               <a:pPr/>
-              <a:t>8/6/13</a:t>
+              <a:t>8/15/13</a:t>
             </a:fld>
             <a:endParaRPr lang="en-US">
               <a:solidFill>
@@ -8892,7 +8893,7 @@
           <a:p>
             <a:fld id="{34C6AA67-E7EC-BD42-94FC-5443D25F9C23}" type="datetimeFigureOut">
               <a:rPr lang="en-US" smtClean="0"/>
-              <a:t>8/6/13</a:t>
+              <a:t>8/15/13</a:t>
             </a:fld>
             <a:endParaRPr lang="en-US"/>
           </a:p>
@@ -9322,7 +9323,7 @@
                 <a:latin typeface="Calibri"/>
               </a:rPr>
               <a:pPr/>
-              <a:t>8/6/13</a:t>
+              <a:t>8/15/13</a:t>
             </a:fld>
             <a:endParaRPr lang="en-US">
               <a:solidFill>
@@ -9477,7 +9478,7 @@
                 <a:latin typeface="Calibri"/>
               </a:rPr>
               <a:pPr/>
-              <a:t>8/6/13</a:t>
+              <a:t>8/15/13</a:t>
             </a:fld>
             <a:endParaRPr lang="en-US">
               <a:solidFill>
@@ -9619,7 +9620,7 @@
                 <a:latin typeface="Calibri"/>
               </a:rPr>
               <a:pPr/>
-              <a:t>8/6/13</a:t>
+              <a:t>8/15/13</a:t>
             </a:fld>
             <a:endParaRPr lang="en-US">
               <a:solidFill>
@@ -9933,7 +9934,7 @@
                 <a:latin typeface="Calibri"/>
               </a:rPr>
               <a:pPr/>
-              <a:t>8/6/13</a:t>
+              <a:t>8/15/13</a:t>
             </a:fld>
             <a:endParaRPr lang="en-US">
               <a:solidFill>
@@ -10223,7 +10224,7 @@
                 <a:latin typeface="Calibri"/>
               </a:rPr>
               <a:pPr/>
-              <a:t>8/6/13</a:t>
+              <a:t>8/15/13</a:t>
             </a:fld>
             <a:endParaRPr lang="en-US">
               <a:solidFill>
@@ -10430,7 +10431,7 @@
                 <a:latin typeface="Calibri"/>
               </a:rPr>
               <a:pPr/>
-              <a:t>8/6/13</a:t>
+              <a:t>8/15/13</a:t>
             </a:fld>
             <a:endParaRPr lang="en-US">
               <a:solidFill>
@@ -10647,7 +10648,7 @@
                 <a:latin typeface="Calibri"/>
               </a:rPr>
               <a:pPr/>
-              <a:t>8/6/13</a:t>
+              <a:t>8/15/13</a:t>
             </a:fld>
             <a:endParaRPr lang="en-US">
               <a:solidFill>
@@ -11449,7 +11450,7 @@
           <a:p>
             <a:fld id="{34C6AA67-E7EC-BD42-94FC-5443D25F9C23}" type="datetimeFigureOut">
               <a:rPr lang="en-US" smtClean="0"/>
-              <a:t>8/6/13</a:t>
+              <a:t>8/15/13</a:t>
             </a:fld>
             <a:endParaRPr lang="en-US"/>
           </a:p>
@@ -11567,7 +11568,7 @@
           <a:p>
             <a:fld id="{34C6AA67-E7EC-BD42-94FC-5443D25F9C23}" type="datetimeFigureOut">
               <a:rPr lang="en-US" smtClean="0"/>
-              <a:t>8/6/13</a:t>
+              <a:t>8/15/13</a:t>
             </a:fld>
             <a:endParaRPr lang="en-US"/>
           </a:p>
@@ -11672,7 +11673,7 @@
           <a:p>
             <a:fld id="{34C6AA67-E7EC-BD42-94FC-5443D25F9C23}" type="datetimeFigureOut">
               <a:rPr lang="en-US" smtClean="0"/>
-              <a:t>8/6/13</a:t>
+              <a:t>8/15/13</a:t>
             </a:fld>
             <a:endParaRPr lang="en-US"/>
           </a:p>
@@ -11949,7 +11950,7 @@
           <a:p>
             <a:fld id="{34C6AA67-E7EC-BD42-94FC-5443D25F9C23}" type="datetimeFigureOut">
               <a:rPr lang="en-US" smtClean="0"/>
-              <a:t>8/6/13</a:t>
+              <a:t>8/15/13</a:t>
             </a:fld>
             <a:endParaRPr lang="en-US"/>
           </a:p>
@@ -12202,7 +12203,7 @@
           <a:p>
             <a:fld id="{34C6AA67-E7EC-BD42-94FC-5443D25F9C23}" type="datetimeFigureOut">
               <a:rPr lang="en-US" smtClean="0"/>
-              <a:t>8/6/13</a:t>
+              <a:t>8/15/13</a:t>
             </a:fld>
             <a:endParaRPr lang="en-US"/>
           </a:p>
@@ -12415,7 +12416,7 @@
           <a:p>
             <a:fld id="{34C6AA67-E7EC-BD42-94FC-5443D25F9C23}" type="datetimeFigureOut">
               <a:rPr lang="en-US" smtClean="0"/>
-              <a:t>8/6/13</a:t>
+              <a:t>8/15/13</a:t>
             </a:fld>
             <a:endParaRPr lang="en-US"/>
           </a:p>
@@ -12948,7 +12949,7 @@
                 <a:latin typeface="Calibri"/>
               </a:rPr>
               <a:pPr defTabSz="86263"/>
-              <a:t>8/6/13</a:t>
+              <a:t>8/15/13</a:t>
             </a:fld>
             <a:endParaRPr lang="en-US">
               <a:solidFill>
@@ -13497,7 +13498,7 @@
                 <a:latin typeface="Calibri"/>
               </a:rPr>
               <a:pPr/>
-              <a:t>8/6/13</a:t>
+              <a:t>8/15/13</a:t>
             </a:fld>
             <a:endParaRPr lang="en-US">
               <a:solidFill>
@@ -14055,7 +14056,7 @@
                 <a:latin typeface="Calibri"/>
               </a:rPr>
               <a:pPr/>
-              <a:t>8/6/13</a:t>
+              <a:t>8/15/13</a:t>
             </a:fld>
             <a:endParaRPr lang="en-US">
               <a:solidFill>
@@ -15276,6 +15277,74 @@
       </p:par>
     </p:tnLst>
   </p:timing>
+</p:sld>
+</file>
+
+<file path=ppt/slides/slide7.xml><?xml version="1.0" encoding="utf-8"?>
+<p:sld xmlns:a="http://schemas.openxmlformats.org/drawingml/2006/main" xmlns:r="http://schemas.openxmlformats.org/officeDocument/2006/relationships" xmlns:p="http://schemas.openxmlformats.org/presentationml/2006/main">
+  <p:cSld>
+    <p:bg>
+      <p:bgPr>
+        <a:solidFill>
+          <a:srgbClr val="F2F2E8"/>
+        </a:solidFill>
+        <a:effectLst/>
+      </p:bgPr>
+    </p:bg>
+    <p:spTree>
+      <p:nvGrpSpPr>
+        <p:cNvPr id="1" name=""/>
+        <p:cNvGrpSpPr/>
+        <p:nvPr/>
+      </p:nvGrpSpPr>
+      <p:grpSpPr>
+        <a:xfrm>
+          <a:off x="0" y="0"/>
+          <a:ext cx="0" cy="0"/>
+          <a:chOff x="0" y="0"/>
+          <a:chExt cx="0" cy="0"/>
+        </a:xfrm>
+      </p:grpSpPr>
+      <p:pic>
+        <p:nvPicPr>
+          <p:cNvPr id="2" name="Picture 1" descr="exisweblogo.png"/>
+          <p:cNvPicPr>
+            <a:picLocks noChangeAspect="1"/>
+          </p:cNvPicPr>
+          <p:nvPr/>
+        </p:nvPicPr>
+        <p:blipFill>
+          <a:blip r:embed="rId2">
+            <a:extLst>
+              <a:ext uri="{28A0092B-C50C-407E-A947-70E740481C1C}">
+                <a14:useLocalDpi xmlns:a14="http://schemas.microsoft.com/office/drawing/2010/main" val="0"/>
+              </a:ext>
+            </a:extLst>
+          </a:blip>
+          <a:stretch>
+            <a:fillRect/>
+          </a:stretch>
+        </p:blipFill>
+        <p:spPr>
+          <a:xfrm>
+            <a:off x="163513" y="354829"/>
+            <a:ext cx="1611312" cy="367856"/>
+          </a:xfrm>
+          <a:prstGeom prst="rect">
+            <a:avLst/>
+          </a:prstGeom>
+        </p:spPr>
+      </p:pic>
+    </p:spTree>
+    <p:extLst>
+      <p:ext uri="{BB962C8B-B14F-4D97-AF65-F5344CB8AC3E}">
+        <p14:creationId xmlns:p14="http://schemas.microsoft.com/office/powerpoint/2010/main" val="2440016276"/>
+      </p:ext>
+    </p:extLst>
+  </p:cSld>
+  <p:clrMapOvr>
+    <a:masterClrMapping/>
+  </p:clrMapOvr>
 </p:sld>
 </file>
 

</xml_diff>